<commit_message>
Update UG DG to reflect latest images
</commit_message>
<xml_diff>
--- a/docs/diagrams/LogicCommandFindPackage.pptx
+++ b/docs/diagrams/LogicCommandFindPackage.pptx
@@ -4,8 +4,11 @@
   <p:sldMasterIdLst>
     <p:sldMasterId id="2147483648" r:id="rId1"/>
   </p:sldMasterIdLst>
+  <p:notesMasterIdLst>
+    <p:notesMasterId r:id="rId3"/>
+  </p:notesMasterIdLst>
   <p:sldIdLst>
-    <p:sldId id="256" r:id="rId2"/>
+    <p:sldId id="265" r:id="rId2"/>
   </p:sldIdLst>
   <p:sldSz cx="12192000" cy="6858000"/>
   <p:notesSz cx="6858000" cy="9144000"/>
@@ -112,6 +115,440 @@
 </p:presentation>
 </file>
 
+<file path=ppt/notesMasters/notesMaster1.xml><?xml version="1.0" encoding="utf-8"?>
+<p:notesMaster xmlns:a="http://schemas.openxmlformats.org/drawingml/2006/main" xmlns:r="http://schemas.openxmlformats.org/officeDocument/2006/relationships" xmlns:p="http://schemas.openxmlformats.org/presentationml/2006/main">
+  <p:cSld>
+    <p:bg>
+      <p:bgRef idx="1001">
+        <a:schemeClr val="bg1"/>
+      </p:bgRef>
+    </p:bg>
+    <p:spTree>
+      <p:nvGrpSpPr>
+        <p:cNvPr id="1" name=""/>
+        <p:cNvGrpSpPr/>
+        <p:nvPr/>
+      </p:nvGrpSpPr>
+      <p:grpSpPr>
+        <a:xfrm>
+          <a:off x="0" y="0"/>
+          <a:ext cx="0" cy="0"/>
+          <a:chOff x="0" y="0"/>
+          <a:chExt cx="0" cy="0"/>
+        </a:xfrm>
+      </p:grpSpPr>
+      <p:sp>
+        <p:nvSpPr>
+          <p:cNvPr id="2" name="Header Placeholder 1"/>
+          <p:cNvSpPr>
+            <a:spLocks noGrp="1"/>
+          </p:cNvSpPr>
+          <p:nvPr>
+            <p:ph type="hdr" sz="quarter"/>
+          </p:nvPr>
+        </p:nvSpPr>
+        <p:spPr>
+          <a:xfrm>
+            <a:off x="0" y="0"/>
+            <a:ext cx="2971800" cy="458788"/>
+          </a:xfrm>
+          <a:prstGeom prst="rect">
+            <a:avLst/>
+          </a:prstGeom>
+        </p:spPr>
+        <p:txBody>
+          <a:bodyPr vert="horz" lIns="91440" tIns="45720" rIns="91440" bIns="45720" rtlCol="0"/>
+          <a:lstStyle>
+            <a:lvl1pPr algn="l">
+              <a:defRPr sz="1200"/>
+            </a:lvl1pPr>
+          </a:lstStyle>
+          <a:p>
+            <a:endParaRPr lang="en-SG"/>
+          </a:p>
+        </p:txBody>
+      </p:sp>
+      <p:sp>
+        <p:nvSpPr>
+          <p:cNvPr id="3" name="Date Placeholder 2"/>
+          <p:cNvSpPr>
+            <a:spLocks noGrp="1"/>
+          </p:cNvSpPr>
+          <p:nvPr>
+            <p:ph type="dt" idx="1"/>
+          </p:nvPr>
+        </p:nvSpPr>
+        <p:spPr>
+          <a:xfrm>
+            <a:off x="3884613" y="0"/>
+            <a:ext cx="2971800" cy="458788"/>
+          </a:xfrm>
+          <a:prstGeom prst="rect">
+            <a:avLst/>
+          </a:prstGeom>
+        </p:spPr>
+        <p:txBody>
+          <a:bodyPr vert="horz" lIns="91440" tIns="45720" rIns="91440" bIns="45720" rtlCol="0"/>
+          <a:lstStyle>
+            <a:lvl1pPr algn="r">
+              <a:defRPr sz="1200"/>
+            </a:lvl1pPr>
+          </a:lstStyle>
+          <a:p>
+            <a:fld id="{99CB4BDB-33F1-4250-8F67-27CE1E5B6766}" type="datetimeFigureOut">
+              <a:rPr lang="en-SG" smtClean="0"/>
+              <a:t>29/10/2019</a:t>
+            </a:fld>
+            <a:endParaRPr lang="en-SG"/>
+          </a:p>
+        </p:txBody>
+      </p:sp>
+      <p:sp>
+        <p:nvSpPr>
+          <p:cNvPr id="4" name="Slide Image Placeholder 3"/>
+          <p:cNvSpPr>
+            <a:spLocks noGrp="1" noRot="1" noChangeAspect="1"/>
+          </p:cNvSpPr>
+          <p:nvPr>
+            <p:ph type="sldImg" idx="2"/>
+          </p:nvPr>
+        </p:nvSpPr>
+        <p:spPr>
+          <a:xfrm>
+            <a:off x="685800" y="1143000"/>
+            <a:ext cx="5486400" cy="3086100"/>
+          </a:xfrm>
+          <a:prstGeom prst="rect">
+            <a:avLst/>
+          </a:prstGeom>
+          <a:noFill/>
+          <a:ln w="12700">
+            <a:solidFill>
+              <a:prstClr val="black"/>
+            </a:solidFill>
+          </a:ln>
+        </p:spPr>
+        <p:txBody>
+          <a:bodyPr vert="horz" lIns="91440" tIns="45720" rIns="91440" bIns="45720" rtlCol="0" anchor="ctr"/>
+          <a:lstStyle/>
+          <a:p>
+            <a:endParaRPr lang="en-SG"/>
+          </a:p>
+        </p:txBody>
+      </p:sp>
+      <p:sp>
+        <p:nvSpPr>
+          <p:cNvPr id="5" name="Notes Placeholder 4"/>
+          <p:cNvSpPr>
+            <a:spLocks noGrp="1"/>
+          </p:cNvSpPr>
+          <p:nvPr>
+            <p:ph type="body" sz="quarter" idx="3"/>
+          </p:nvPr>
+        </p:nvSpPr>
+        <p:spPr>
+          <a:xfrm>
+            <a:off x="685800" y="4400550"/>
+            <a:ext cx="5486400" cy="3600450"/>
+          </a:xfrm>
+          <a:prstGeom prst="rect">
+            <a:avLst/>
+          </a:prstGeom>
+        </p:spPr>
+        <p:txBody>
+          <a:bodyPr vert="horz" lIns="91440" tIns="45720" rIns="91440" bIns="45720" rtlCol="0"/>
+          <a:lstStyle/>
+          <a:p>
+            <a:pPr lvl="0"/>
+            <a:r>
+              <a:rPr lang="en-US"/>
+              <a:t>Click to edit Master text styles</a:t>
+            </a:r>
+          </a:p>
+          <a:p>
+            <a:pPr lvl="1"/>
+            <a:r>
+              <a:rPr lang="en-US"/>
+              <a:t>Second level</a:t>
+            </a:r>
+          </a:p>
+          <a:p>
+            <a:pPr lvl="2"/>
+            <a:r>
+              <a:rPr lang="en-US"/>
+              <a:t>Third level</a:t>
+            </a:r>
+          </a:p>
+          <a:p>
+            <a:pPr lvl="3"/>
+            <a:r>
+              <a:rPr lang="en-US"/>
+              <a:t>Fourth level</a:t>
+            </a:r>
+          </a:p>
+          <a:p>
+            <a:pPr lvl="4"/>
+            <a:r>
+              <a:rPr lang="en-US"/>
+              <a:t>Fifth level</a:t>
+            </a:r>
+            <a:endParaRPr lang="en-SG"/>
+          </a:p>
+        </p:txBody>
+      </p:sp>
+      <p:sp>
+        <p:nvSpPr>
+          <p:cNvPr id="6" name="Footer Placeholder 5"/>
+          <p:cNvSpPr>
+            <a:spLocks noGrp="1"/>
+          </p:cNvSpPr>
+          <p:nvPr>
+            <p:ph type="ftr" sz="quarter" idx="4"/>
+          </p:nvPr>
+        </p:nvSpPr>
+        <p:spPr>
+          <a:xfrm>
+            <a:off x="0" y="8685213"/>
+            <a:ext cx="2971800" cy="458787"/>
+          </a:xfrm>
+          <a:prstGeom prst="rect">
+            <a:avLst/>
+          </a:prstGeom>
+        </p:spPr>
+        <p:txBody>
+          <a:bodyPr vert="horz" lIns="91440" tIns="45720" rIns="91440" bIns="45720" rtlCol="0" anchor="b"/>
+          <a:lstStyle>
+            <a:lvl1pPr algn="l">
+              <a:defRPr sz="1200"/>
+            </a:lvl1pPr>
+          </a:lstStyle>
+          <a:p>
+            <a:endParaRPr lang="en-SG"/>
+          </a:p>
+        </p:txBody>
+      </p:sp>
+      <p:sp>
+        <p:nvSpPr>
+          <p:cNvPr id="7" name="Slide Number Placeholder 6"/>
+          <p:cNvSpPr>
+            <a:spLocks noGrp="1"/>
+          </p:cNvSpPr>
+          <p:nvPr>
+            <p:ph type="sldNum" sz="quarter" idx="5"/>
+          </p:nvPr>
+        </p:nvSpPr>
+        <p:spPr>
+          <a:xfrm>
+            <a:off x="3884613" y="8685213"/>
+            <a:ext cx="2971800" cy="458787"/>
+          </a:xfrm>
+          <a:prstGeom prst="rect">
+            <a:avLst/>
+          </a:prstGeom>
+        </p:spPr>
+        <p:txBody>
+          <a:bodyPr vert="horz" lIns="91440" tIns="45720" rIns="91440" bIns="45720" rtlCol="0" anchor="b"/>
+          <a:lstStyle>
+            <a:lvl1pPr algn="r">
+              <a:defRPr sz="1200"/>
+            </a:lvl1pPr>
+          </a:lstStyle>
+          <a:p>
+            <a:fld id="{C22506FA-876D-4938-8DF8-6C185B697591}" type="slidenum">
+              <a:rPr lang="en-SG" smtClean="0"/>
+              <a:t>‹#›</a:t>
+            </a:fld>
+            <a:endParaRPr lang="en-SG"/>
+          </a:p>
+        </p:txBody>
+      </p:sp>
+    </p:spTree>
+    <p:extLst>
+      <p:ext uri="{BB962C8B-B14F-4D97-AF65-F5344CB8AC3E}">
+        <p14:creationId xmlns:p14="http://schemas.microsoft.com/office/powerpoint/2010/main" val="2359967952"/>
+      </p:ext>
+    </p:extLst>
+  </p:cSld>
+  <p:clrMap bg1="lt1" tx1="dk1" bg2="lt2" tx2="dk2" accent1="accent1" accent2="accent2" accent3="accent3" accent4="accent4" accent5="accent5" accent6="accent6" hlink="hlink" folHlink="folHlink"/>
+  <p:notesStyle>
+    <a:lvl1pPr marL="0" algn="l" defTabSz="914400" rtl="0" eaLnBrk="1" latinLnBrk="0" hangingPunct="1">
+      <a:defRPr sz="1200" kern="1200">
+        <a:solidFill>
+          <a:schemeClr val="tx1"/>
+        </a:solidFill>
+        <a:latin typeface="+mn-lt"/>
+        <a:ea typeface="+mn-ea"/>
+        <a:cs typeface="+mn-cs"/>
+      </a:defRPr>
+    </a:lvl1pPr>
+    <a:lvl2pPr marL="457200" algn="l" defTabSz="914400" rtl="0" eaLnBrk="1" latinLnBrk="0" hangingPunct="1">
+      <a:defRPr sz="1200" kern="1200">
+        <a:solidFill>
+          <a:schemeClr val="tx1"/>
+        </a:solidFill>
+        <a:latin typeface="+mn-lt"/>
+        <a:ea typeface="+mn-ea"/>
+        <a:cs typeface="+mn-cs"/>
+      </a:defRPr>
+    </a:lvl2pPr>
+    <a:lvl3pPr marL="914400" algn="l" defTabSz="914400" rtl="0" eaLnBrk="1" latinLnBrk="0" hangingPunct="1">
+      <a:defRPr sz="1200" kern="1200">
+        <a:solidFill>
+          <a:schemeClr val="tx1"/>
+        </a:solidFill>
+        <a:latin typeface="+mn-lt"/>
+        <a:ea typeface="+mn-ea"/>
+        <a:cs typeface="+mn-cs"/>
+      </a:defRPr>
+    </a:lvl3pPr>
+    <a:lvl4pPr marL="1371600" algn="l" defTabSz="914400" rtl="0" eaLnBrk="1" latinLnBrk="0" hangingPunct="1">
+      <a:defRPr sz="1200" kern="1200">
+        <a:solidFill>
+          <a:schemeClr val="tx1"/>
+        </a:solidFill>
+        <a:latin typeface="+mn-lt"/>
+        <a:ea typeface="+mn-ea"/>
+        <a:cs typeface="+mn-cs"/>
+      </a:defRPr>
+    </a:lvl4pPr>
+    <a:lvl5pPr marL="1828800" algn="l" defTabSz="914400" rtl="0" eaLnBrk="1" latinLnBrk="0" hangingPunct="1">
+      <a:defRPr sz="1200" kern="1200">
+        <a:solidFill>
+          <a:schemeClr val="tx1"/>
+        </a:solidFill>
+        <a:latin typeface="+mn-lt"/>
+        <a:ea typeface="+mn-ea"/>
+        <a:cs typeface="+mn-cs"/>
+      </a:defRPr>
+    </a:lvl5pPr>
+    <a:lvl6pPr marL="2286000" algn="l" defTabSz="914400" rtl="0" eaLnBrk="1" latinLnBrk="0" hangingPunct="1">
+      <a:defRPr sz="1200" kern="1200">
+        <a:solidFill>
+          <a:schemeClr val="tx1"/>
+        </a:solidFill>
+        <a:latin typeface="+mn-lt"/>
+        <a:ea typeface="+mn-ea"/>
+        <a:cs typeface="+mn-cs"/>
+      </a:defRPr>
+    </a:lvl6pPr>
+    <a:lvl7pPr marL="2743200" algn="l" defTabSz="914400" rtl="0" eaLnBrk="1" latinLnBrk="0" hangingPunct="1">
+      <a:defRPr sz="1200" kern="1200">
+        <a:solidFill>
+          <a:schemeClr val="tx1"/>
+        </a:solidFill>
+        <a:latin typeface="+mn-lt"/>
+        <a:ea typeface="+mn-ea"/>
+        <a:cs typeface="+mn-cs"/>
+      </a:defRPr>
+    </a:lvl7pPr>
+    <a:lvl8pPr marL="3200400" algn="l" defTabSz="914400" rtl="0" eaLnBrk="1" latinLnBrk="0" hangingPunct="1">
+      <a:defRPr sz="1200" kern="1200">
+        <a:solidFill>
+          <a:schemeClr val="tx1"/>
+        </a:solidFill>
+        <a:latin typeface="+mn-lt"/>
+        <a:ea typeface="+mn-ea"/>
+        <a:cs typeface="+mn-cs"/>
+      </a:defRPr>
+    </a:lvl8pPr>
+    <a:lvl9pPr marL="3657600" algn="l" defTabSz="914400" rtl="0" eaLnBrk="1" latinLnBrk="0" hangingPunct="1">
+      <a:defRPr sz="1200" kern="1200">
+        <a:solidFill>
+          <a:schemeClr val="tx1"/>
+        </a:solidFill>
+        <a:latin typeface="+mn-lt"/>
+        <a:ea typeface="+mn-ea"/>
+        <a:cs typeface="+mn-cs"/>
+      </a:defRPr>
+    </a:lvl9pPr>
+  </p:notesStyle>
+</p:notesMaster>
+</file>
+
+<file path=ppt/notesSlides/notesSlide1.xml><?xml version="1.0" encoding="utf-8"?>
+<p:notes xmlns:a="http://schemas.openxmlformats.org/drawingml/2006/main" xmlns:r="http://schemas.openxmlformats.org/officeDocument/2006/relationships" xmlns:p="http://schemas.openxmlformats.org/presentationml/2006/main">
+  <p:cSld>
+    <p:spTree>
+      <p:nvGrpSpPr>
+        <p:cNvPr id="1" name=""/>
+        <p:cNvGrpSpPr/>
+        <p:nvPr/>
+      </p:nvGrpSpPr>
+      <p:grpSpPr>
+        <a:xfrm>
+          <a:off x="0" y="0"/>
+          <a:ext cx="0" cy="0"/>
+          <a:chOff x="0" y="0"/>
+          <a:chExt cx="0" cy="0"/>
+        </a:xfrm>
+      </p:grpSpPr>
+      <p:sp>
+        <p:nvSpPr>
+          <p:cNvPr id="2" name="Slide Image Placeholder 1"/>
+          <p:cNvSpPr>
+            <a:spLocks noGrp="1" noRot="1" noChangeAspect="1"/>
+          </p:cNvSpPr>
+          <p:nvPr>
+            <p:ph type="sldImg"/>
+          </p:nvPr>
+        </p:nvSpPr>
+        <p:spPr/>
+      </p:sp>
+      <p:sp>
+        <p:nvSpPr>
+          <p:cNvPr id="3" name="Notes Placeholder 2"/>
+          <p:cNvSpPr>
+            <a:spLocks noGrp="1"/>
+          </p:cNvSpPr>
+          <p:nvPr>
+            <p:ph type="body" idx="1"/>
+          </p:nvPr>
+        </p:nvSpPr>
+        <p:spPr/>
+        <p:txBody>
+          <a:bodyPr/>
+          <a:lstStyle/>
+          <a:p>
+            <a:endParaRPr lang="en-US"/>
+          </a:p>
+        </p:txBody>
+      </p:sp>
+      <p:sp>
+        <p:nvSpPr>
+          <p:cNvPr id="4" name="Slide Number Placeholder 3"/>
+          <p:cNvSpPr>
+            <a:spLocks noGrp="1"/>
+          </p:cNvSpPr>
+          <p:nvPr>
+            <p:ph type="sldNum" sz="quarter" idx="5"/>
+          </p:nvPr>
+        </p:nvSpPr>
+        <p:spPr/>
+        <p:txBody>
+          <a:bodyPr/>
+          <a:lstStyle/>
+          <a:p>
+            <a:fld id="{6F28D633-EB95-434A-9700-4AEF1B6AA739}" type="slidenum">
+              <a:rPr lang="en-US" smtClean="0"/>
+              <a:t>1</a:t>
+            </a:fld>
+            <a:endParaRPr lang="en-US"/>
+          </a:p>
+        </p:txBody>
+      </p:sp>
+    </p:spTree>
+    <p:extLst>
+      <p:ext uri="{BB962C8B-B14F-4D97-AF65-F5344CB8AC3E}">
+        <p14:creationId xmlns:p14="http://schemas.microsoft.com/office/powerpoint/2010/main" val="658175102"/>
+      </p:ext>
+    </p:extLst>
+  </p:cSld>
+  <p:clrMapOvr>
+    <a:masterClrMapping/>
+  </p:clrMapOvr>
+</p:notes>
+</file>
+
 <file path=ppt/slideLayouts/slideLayout1.xml><?xml version="1.0" encoding="utf-8"?>
 <p:sldLayout xmlns:a="http://schemas.openxmlformats.org/drawingml/2006/main" xmlns:r="http://schemas.openxmlformats.org/officeDocument/2006/relationships" xmlns:p="http://schemas.openxmlformats.org/presentationml/2006/main" type="title" preserve="1">
   <p:cSld name="Title Slide">
@@ -261,7 +698,7 @@
           <a:p>
             <a:fld id="{576451FB-5461-474E-8B04-C2B4E4DC9742}" type="datetimeFigureOut">
               <a:rPr lang="en-US" smtClean="0"/>
-              <a:t>10/24/2019</a:t>
+              <a:t>10/29/2019</a:t>
             </a:fld>
             <a:endParaRPr lang="en-US"/>
           </a:p>
@@ -461,7 +898,7 @@
           <a:p>
             <a:fld id="{576451FB-5461-474E-8B04-C2B4E4DC9742}" type="datetimeFigureOut">
               <a:rPr lang="en-US" smtClean="0"/>
-              <a:t>10/24/2019</a:t>
+              <a:t>10/29/2019</a:t>
             </a:fld>
             <a:endParaRPr lang="en-US"/>
           </a:p>
@@ -671,7 +1108,7 @@
           <a:p>
             <a:fld id="{576451FB-5461-474E-8B04-C2B4E4DC9742}" type="datetimeFigureOut">
               <a:rPr lang="en-US" smtClean="0"/>
-              <a:t>10/24/2019</a:t>
+              <a:t>10/29/2019</a:t>
             </a:fld>
             <a:endParaRPr lang="en-US"/>
           </a:p>
@@ -871,7 +1308,7 @@
           <a:p>
             <a:fld id="{576451FB-5461-474E-8B04-C2B4E4DC9742}" type="datetimeFigureOut">
               <a:rPr lang="en-US" smtClean="0"/>
-              <a:t>10/24/2019</a:t>
+              <a:t>10/29/2019</a:t>
             </a:fld>
             <a:endParaRPr lang="en-US"/>
           </a:p>
@@ -1147,7 +1584,7 @@
           <a:p>
             <a:fld id="{576451FB-5461-474E-8B04-C2B4E4DC9742}" type="datetimeFigureOut">
               <a:rPr lang="en-US" smtClean="0"/>
-              <a:t>10/24/2019</a:t>
+              <a:t>10/29/2019</a:t>
             </a:fld>
             <a:endParaRPr lang="en-US"/>
           </a:p>
@@ -1415,7 +1852,7 @@
           <a:p>
             <a:fld id="{576451FB-5461-474E-8B04-C2B4E4DC9742}" type="datetimeFigureOut">
               <a:rPr lang="en-US" smtClean="0"/>
-              <a:t>10/24/2019</a:t>
+              <a:t>10/29/2019</a:t>
             </a:fld>
             <a:endParaRPr lang="en-US"/>
           </a:p>
@@ -1830,7 +2267,7 @@
           <a:p>
             <a:fld id="{576451FB-5461-474E-8B04-C2B4E4DC9742}" type="datetimeFigureOut">
               <a:rPr lang="en-US" smtClean="0"/>
-              <a:t>10/24/2019</a:t>
+              <a:t>10/29/2019</a:t>
             </a:fld>
             <a:endParaRPr lang="en-US"/>
           </a:p>
@@ -1972,7 +2409,7 @@
           <a:p>
             <a:fld id="{576451FB-5461-474E-8B04-C2B4E4DC9742}" type="datetimeFigureOut">
               <a:rPr lang="en-US" smtClean="0"/>
-              <a:t>10/24/2019</a:t>
+              <a:t>10/29/2019</a:t>
             </a:fld>
             <a:endParaRPr lang="en-US"/>
           </a:p>
@@ -2085,7 +2522,7 @@
           <a:p>
             <a:fld id="{576451FB-5461-474E-8B04-C2B4E4DC9742}" type="datetimeFigureOut">
               <a:rPr lang="en-US" smtClean="0"/>
-              <a:t>10/24/2019</a:t>
+              <a:t>10/29/2019</a:t>
             </a:fld>
             <a:endParaRPr lang="en-US"/>
           </a:p>
@@ -2398,7 +2835,7 @@
           <a:p>
             <a:fld id="{576451FB-5461-474E-8B04-C2B4E4DC9742}" type="datetimeFigureOut">
               <a:rPr lang="en-US" smtClean="0"/>
-              <a:t>10/24/2019</a:t>
+              <a:t>10/29/2019</a:t>
             </a:fld>
             <a:endParaRPr lang="en-US"/>
           </a:p>
@@ -2687,7 +3124,7 @@
           <a:p>
             <a:fld id="{576451FB-5461-474E-8B04-C2B4E4DC9742}" type="datetimeFigureOut">
               <a:rPr lang="en-US" smtClean="0"/>
-              <a:t>10/24/2019</a:t>
+              <a:t>10/29/2019</a:t>
             </a:fld>
             <a:endParaRPr lang="en-US"/>
           </a:p>
@@ -2930,7 +3367,7 @@
           <a:p>
             <a:fld id="{576451FB-5461-474E-8B04-C2B4E4DC9742}" type="datetimeFigureOut">
               <a:rPr lang="en-US" smtClean="0"/>
-              <a:t>10/24/2019</a:t>
+              <a:t>10/29/2019</a:t>
             </a:fld>
             <a:endParaRPr lang="en-US"/>
           </a:p>
@@ -3347,1189 +3784,1060 @@
           <a:chExt cx="0" cy="0"/>
         </a:xfrm>
       </p:grpSpPr>
-      <p:grpSp>
-        <p:nvGrpSpPr>
-          <p:cNvPr id="79" name="Group 78">
-            <a:extLst>
-              <a:ext uri="{FF2B5EF4-FFF2-40B4-BE49-F238E27FC236}">
-                <a16:creationId xmlns:a16="http://schemas.microsoft.com/office/drawing/2014/main" id="{9109112B-2C08-624B-9E81-424BB682190B}"/>
-              </a:ext>
-            </a:extLst>
-          </p:cNvPr>
-          <p:cNvGrpSpPr/>
+      <p:sp>
+        <p:nvSpPr>
+          <p:cNvPr id="55" name="Rounded Rectangle 145">
+            <a:extLst>
+              <a:ext uri="{FF2B5EF4-FFF2-40B4-BE49-F238E27FC236}">
+                <a16:creationId xmlns:a16="http://schemas.microsoft.com/office/drawing/2014/main" id="{B90B093E-61DD-4276-86F1-FF57ECD0CD3D}"/>
+              </a:ext>
+            </a:extLst>
+          </p:cNvPr>
+          <p:cNvSpPr/>
           <p:nvPr/>
-        </p:nvGrpSpPr>
-        <p:grpSpPr>
+        </p:nvSpPr>
+        <p:spPr>
           <a:xfrm>
-            <a:off x="383233" y="248117"/>
-            <a:ext cx="11425533" cy="6282078"/>
-            <a:chOff x="383233" y="248117"/>
-            <a:chExt cx="11425533" cy="6282078"/>
+            <a:off x="1245599" y="283938"/>
+            <a:ext cx="10563167" cy="5590979"/>
           </a:xfrm>
-        </p:grpSpPr>
-        <p:sp>
-          <p:nvSpPr>
-            <p:cNvPr id="80" name="Rounded Rectangle 145">
-              <a:extLst>
-                <a:ext uri="{FF2B5EF4-FFF2-40B4-BE49-F238E27FC236}">
-                  <a16:creationId xmlns:a16="http://schemas.microsoft.com/office/drawing/2014/main" id="{742A5549-6848-3141-869D-4A0AB60E3313}"/>
-                </a:ext>
-              </a:extLst>
-            </p:cNvPr>
-            <p:cNvSpPr/>
-            <p:nvPr/>
-          </p:nvSpPr>
-          <p:spPr>
-            <a:xfrm>
-              <a:off x="1245599" y="283938"/>
-              <a:ext cx="10563167" cy="5590979"/>
-            </a:xfrm>
-            <a:prstGeom prst="roundRect">
-              <a:avLst>
-                <a:gd name="adj" fmla="val 4363"/>
-              </a:avLst>
-            </a:prstGeom>
+          <a:prstGeom prst="roundRect">
+            <a:avLst>
+              <a:gd name="adj" fmla="val 4363"/>
+            </a:avLst>
+          </a:prstGeom>
+          <a:solidFill>
+            <a:schemeClr val="accent4">
+              <a:lumMod val="20000"/>
+              <a:lumOff val="80000"/>
+            </a:schemeClr>
+          </a:solidFill>
+          <a:ln>
             <a:solidFill>
               <a:schemeClr val="accent4">
                 <a:lumMod val="20000"/>
                 <a:lumOff val="80000"/>
               </a:schemeClr>
             </a:solidFill>
-            <a:ln>
-              <a:solidFill>
-                <a:schemeClr val="accent4">
-                  <a:lumMod val="20000"/>
-                  <a:lumOff val="80000"/>
-                </a:schemeClr>
-              </a:solidFill>
-              <a:prstDash val="solid"/>
-            </a:ln>
-          </p:spPr>
-          <p:style>
-            <a:lnRef idx="2">
-              <a:schemeClr val="accent1">
-                <a:shade val="50000"/>
-              </a:schemeClr>
-            </a:lnRef>
-            <a:fillRef idx="1">
-              <a:schemeClr val="accent1"/>
-            </a:fillRef>
-            <a:effectRef idx="0">
-              <a:schemeClr val="accent1"/>
-            </a:effectRef>
-            <a:fontRef idx="minor">
-              <a:schemeClr val="lt1"/>
-            </a:fontRef>
-          </p:style>
-          <p:txBody>
-            <a:bodyPr rtlCol="0" anchor="ctr"/>
-            <a:lstStyle/>
-            <a:p>
-              <a:pPr algn="ctr"/>
-              <a:endParaRPr lang="en-US"/>
-            </a:p>
-          </p:txBody>
-        </p:sp>
-        <p:sp>
-          <p:nvSpPr>
-            <p:cNvPr id="81" name="TextBox 80">
-              <a:extLst>
-                <a:ext uri="{FF2B5EF4-FFF2-40B4-BE49-F238E27FC236}">
-                  <a16:creationId xmlns:a16="http://schemas.microsoft.com/office/drawing/2014/main" id="{31E86966-9752-EE4B-8DC3-FB707B10BA45}"/>
-                </a:ext>
-              </a:extLst>
-            </p:cNvPr>
-            <p:cNvSpPr txBox="1"/>
-            <p:nvPr/>
-          </p:nvSpPr>
-          <p:spPr>
-            <a:xfrm>
-              <a:off x="1303421" y="248117"/>
-              <a:ext cx="3227358" cy="369332"/>
-            </a:xfrm>
-            <a:prstGeom prst="rect">
-              <a:avLst/>
-            </a:prstGeom>
+            <a:prstDash val="solid"/>
+          </a:ln>
+        </p:spPr>
+        <p:style>
+          <a:lnRef idx="2">
+            <a:schemeClr val="accent1">
+              <a:shade val="50000"/>
+            </a:schemeClr>
+          </a:lnRef>
+          <a:fillRef idx="1">
+            <a:schemeClr val="accent1"/>
+          </a:fillRef>
+          <a:effectRef idx="0">
+            <a:schemeClr val="accent1"/>
+          </a:effectRef>
+          <a:fontRef idx="minor">
+            <a:schemeClr val="lt1"/>
+          </a:fontRef>
+        </p:style>
+        <p:txBody>
+          <a:bodyPr rtlCol="0" anchor="ctr"/>
+          <a:lstStyle/>
+          <a:p>
+            <a:pPr algn="ctr"/>
+            <a:endParaRPr lang="en-US"/>
+          </a:p>
+        </p:txBody>
+      </p:sp>
+      <p:sp>
+        <p:nvSpPr>
+          <p:cNvPr id="114" name="TextBox 113">
+            <a:extLst>
+              <a:ext uri="{FF2B5EF4-FFF2-40B4-BE49-F238E27FC236}">
+                <a16:creationId xmlns:a16="http://schemas.microsoft.com/office/drawing/2014/main" id="{17298479-E675-4BC0-A8E2-E0C55B489B0B}"/>
+              </a:ext>
+            </a:extLst>
+          </p:cNvPr>
+          <p:cNvSpPr txBox="1"/>
+          <p:nvPr/>
+        </p:nvSpPr>
+        <p:spPr>
+          <a:xfrm>
+            <a:off x="1303421" y="248117"/>
+            <a:ext cx="3227358" cy="369332"/>
+          </a:xfrm>
+          <a:prstGeom prst="rect">
+            <a:avLst/>
+          </a:prstGeom>
+          <a:noFill/>
+        </p:spPr>
+        <p:txBody>
+          <a:bodyPr wrap="none" rtlCol="0">
+            <a:spAutoFit/>
+          </a:bodyPr>
+          <a:lstStyle/>
+          <a:p>
+            <a:r>
+              <a:rPr lang="en-US" b="1" dirty="0"/>
+              <a:t>Logic, Command, Find Package</a:t>
+            </a:r>
+          </a:p>
+        </p:txBody>
+      </p:sp>
+      <p:sp>
+        <p:nvSpPr>
+          <p:cNvPr id="26" name="Rounded Rectangle 144">
+            <a:extLst>
+              <a:ext uri="{FF2B5EF4-FFF2-40B4-BE49-F238E27FC236}">
+                <a16:creationId xmlns:a16="http://schemas.microsoft.com/office/drawing/2014/main" id="{0771A240-A5D8-4093-A18A-5AC912607234}"/>
+              </a:ext>
+            </a:extLst>
+          </p:cNvPr>
+          <p:cNvSpPr/>
+          <p:nvPr/>
+        </p:nvSpPr>
+        <p:spPr>
+          <a:xfrm>
+            <a:off x="1303421" y="6000533"/>
+            <a:ext cx="10483775" cy="529662"/>
+          </a:xfrm>
+          <a:prstGeom prst="roundRect">
+            <a:avLst/>
+          </a:prstGeom>
+          <a:solidFill>
+            <a:schemeClr val="accent5">
+              <a:lumMod val="60000"/>
+              <a:lumOff val="40000"/>
+            </a:schemeClr>
+          </a:solidFill>
+          <a:ln>
             <a:noFill/>
-          </p:spPr>
-          <p:txBody>
-            <a:bodyPr wrap="none" rtlCol="0">
-              <a:spAutoFit/>
-            </a:bodyPr>
-            <a:lstStyle/>
-            <a:p>
-              <a:r>
-                <a:rPr lang="en-US" b="1"/>
-                <a:t>Logic, Command, Find Package</a:t>
-              </a:r>
-            </a:p>
-          </p:txBody>
-        </p:sp>
-        <p:sp>
-          <p:nvSpPr>
-            <p:cNvPr id="82" name="Rounded Rectangle 144">
-              <a:extLst>
-                <a:ext uri="{FF2B5EF4-FFF2-40B4-BE49-F238E27FC236}">
-                  <a16:creationId xmlns:a16="http://schemas.microsoft.com/office/drawing/2014/main" id="{E5591075-809F-8840-831B-17E781A6E10C}"/>
-                </a:ext>
-              </a:extLst>
-            </p:cNvPr>
-            <p:cNvSpPr/>
-            <p:nvPr/>
-          </p:nvSpPr>
-          <p:spPr>
-            <a:xfrm>
-              <a:off x="1303421" y="6000533"/>
-              <a:ext cx="10483775" cy="529662"/>
-            </a:xfrm>
-            <a:prstGeom prst="roundRect">
-              <a:avLst/>
-            </a:prstGeom>
-            <a:solidFill>
-              <a:schemeClr val="accent5">
-                <a:lumMod val="60000"/>
-                <a:lumOff val="40000"/>
-              </a:schemeClr>
-            </a:solidFill>
-            <a:ln>
-              <a:noFill/>
-            </a:ln>
-          </p:spPr>
-          <p:style>
-            <a:lnRef idx="2">
-              <a:schemeClr val="accent1">
-                <a:shade val="50000"/>
-              </a:schemeClr>
-            </a:lnRef>
-            <a:fillRef idx="1">
-              <a:schemeClr val="accent1"/>
-            </a:fillRef>
-            <a:effectRef idx="0">
-              <a:schemeClr val="accent1"/>
-            </a:effectRef>
-            <a:fontRef idx="minor">
-              <a:schemeClr val="lt1"/>
-            </a:fontRef>
-          </p:style>
-          <p:txBody>
-            <a:bodyPr rtlCol="0" anchor="ctr"/>
-            <a:lstStyle/>
-            <a:p>
-              <a:pPr algn="ctr"/>
-              <a:r>
-                <a:rPr lang="en-US" sz="1300" b="1">
-                  <a:solidFill>
-                    <a:schemeClr val="tx1"/>
-                  </a:solidFill>
-                  <a:latin typeface="Arial" panose="020B0604020202020204" pitchFamily="34" charset="0"/>
-                  <a:cs typeface="Arial" panose="020B0604020202020204" pitchFamily="34" charset="0"/>
-                </a:rPr>
-                <a:t>Model</a:t>
-              </a:r>
-            </a:p>
-          </p:txBody>
-        </p:sp>
-        <p:sp>
-          <p:nvSpPr>
-            <p:cNvPr id="83" name="Rounded Rectangle 12">
-              <a:extLst>
-                <a:ext uri="{FF2B5EF4-FFF2-40B4-BE49-F238E27FC236}">
-                  <a16:creationId xmlns:a16="http://schemas.microsoft.com/office/drawing/2014/main" id="{B4339E07-1EAC-9447-8BC4-E72F177C1134}"/>
-                </a:ext>
-              </a:extLst>
-            </p:cNvPr>
-            <p:cNvSpPr/>
-            <p:nvPr/>
-          </p:nvSpPr>
-          <p:spPr>
-            <a:xfrm rot="16200000">
-              <a:off x="-2045605" y="2712777"/>
-              <a:ext cx="5568378" cy="710702"/>
-            </a:xfrm>
-            <a:prstGeom prst="roundRect">
-              <a:avLst/>
-            </a:prstGeom>
+          </a:ln>
+        </p:spPr>
+        <p:style>
+          <a:lnRef idx="2">
+            <a:schemeClr val="accent1">
+              <a:shade val="50000"/>
+            </a:schemeClr>
+          </a:lnRef>
+          <a:fillRef idx="1">
+            <a:schemeClr val="accent1"/>
+          </a:fillRef>
+          <a:effectRef idx="0">
+            <a:schemeClr val="accent1"/>
+          </a:effectRef>
+          <a:fontRef idx="minor">
+            <a:schemeClr val="lt1"/>
+          </a:fontRef>
+        </p:style>
+        <p:txBody>
+          <a:bodyPr rtlCol="0" anchor="ctr"/>
+          <a:lstStyle/>
+          <a:p>
+            <a:pPr algn="ctr"/>
+            <a:r>
+              <a:rPr lang="en-US" sz="1300" b="1">
+                <a:solidFill>
+                  <a:schemeClr val="tx1"/>
+                </a:solidFill>
+                <a:latin typeface="Arial" panose="020B0604020202020204" pitchFamily="34" charset="0"/>
+                <a:cs typeface="Arial" panose="020B0604020202020204" pitchFamily="34" charset="0"/>
+              </a:rPr>
+              <a:t>Model</a:t>
+            </a:r>
+          </a:p>
+        </p:txBody>
+      </p:sp>
+      <p:sp>
+        <p:nvSpPr>
+          <p:cNvPr id="6" name="Rounded Rectangle 12">
+            <a:extLst>
+              <a:ext uri="{FF2B5EF4-FFF2-40B4-BE49-F238E27FC236}">
+                <a16:creationId xmlns:a16="http://schemas.microsoft.com/office/drawing/2014/main" id="{11C4439C-4DC4-4FA3-84E9-7A9227701F03}"/>
+              </a:ext>
+            </a:extLst>
+          </p:cNvPr>
+          <p:cNvSpPr/>
+          <p:nvPr/>
+        </p:nvSpPr>
+        <p:spPr>
+          <a:xfrm rot="16200000">
+            <a:off x="-2045605" y="2712777"/>
+            <a:ext cx="5568378" cy="710702"/>
+          </a:xfrm>
+          <a:prstGeom prst="roundRect">
+            <a:avLst/>
+          </a:prstGeom>
+          <a:solidFill>
+            <a:schemeClr val="accent3">
+              <a:lumMod val="60000"/>
+              <a:lumOff val="40000"/>
+            </a:schemeClr>
+          </a:solidFill>
+          <a:ln>
             <a:solidFill>
               <a:schemeClr val="accent3">
                 <a:lumMod val="60000"/>
                 <a:lumOff val="40000"/>
               </a:schemeClr>
             </a:solidFill>
-            <a:ln>
-              <a:solidFill>
-                <a:schemeClr val="accent3">
-                  <a:lumMod val="60000"/>
-                  <a:lumOff val="40000"/>
-                </a:schemeClr>
-              </a:solidFill>
-            </a:ln>
-          </p:spPr>
-          <p:style>
-            <a:lnRef idx="2">
-              <a:schemeClr val="accent1">
-                <a:shade val="50000"/>
-              </a:schemeClr>
-            </a:lnRef>
-            <a:fillRef idx="1">
-              <a:schemeClr val="accent1"/>
-            </a:fillRef>
-            <a:effectRef idx="0">
-              <a:schemeClr val="accent1"/>
-            </a:effectRef>
-            <a:fontRef idx="minor">
-              <a:schemeClr val="lt1"/>
-            </a:fontRef>
-          </p:style>
-          <p:txBody>
-            <a:bodyPr rtlCol="0" anchor="ctr"/>
-            <a:lstStyle/>
-            <a:p>
-              <a:pPr algn="ctr"/>
-              <a:r>
-                <a:rPr lang="en-US" sz="1300" b="1">
-                  <a:solidFill>
-                    <a:schemeClr val="tx1"/>
-                  </a:solidFill>
-                  <a:latin typeface="Arial" panose="020B0604020202020204" pitchFamily="34" charset="0"/>
-                  <a:cs typeface="Arial" panose="020B0604020202020204" pitchFamily="34" charset="0"/>
-                </a:rPr>
-                <a:t>Main</a:t>
-              </a:r>
-            </a:p>
-          </p:txBody>
-        </p:sp>
-        <p:sp>
-          <p:nvSpPr>
-            <p:cNvPr id="84" name="Rounded Rectangle 14">
-              <a:extLst>
-                <a:ext uri="{FF2B5EF4-FFF2-40B4-BE49-F238E27FC236}">
-                  <a16:creationId xmlns:a16="http://schemas.microsoft.com/office/drawing/2014/main" id="{8D037691-90FE-294F-A87F-6B8E9A0B9D3F}"/>
-                </a:ext>
-              </a:extLst>
-            </p:cNvPr>
-            <p:cNvSpPr/>
-            <p:nvPr/>
-          </p:nvSpPr>
-          <p:spPr>
-            <a:xfrm>
-              <a:off x="5680421" y="1340446"/>
-              <a:ext cx="1982688" cy="369332"/>
-            </a:xfrm>
-            <a:prstGeom prst="roundRect">
-              <a:avLst>
-                <a:gd name="adj" fmla="val 0"/>
-              </a:avLst>
-            </a:prstGeom>
-            <a:solidFill>
-              <a:srgbClr val="FFC000"/>
-            </a:solidFill>
-            <a:ln>
-              <a:solidFill>
-                <a:srgbClr val="FFC000"/>
-              </a:solidFill>
-            </a:ln>
-          </p:spPr>
-          <p:style>
-            <a:lnRef idx="2">
-              <a:schemeClr val="accent1">
-                <a:shade val="50000"/>
-              </a:schemeClr>
-            </a:lnRef>
-            <a:fillRef idx="1">
-              <a:schemeClr val="accent1"/>
-            </a:fillRef>
-            <a:effectRef idx="0">
-              <a:schemeClr val="accent1"/>
-            </a:effectRef>
-            <a:fontRef idx="minor">
-              <a:schemeClr val="lt1"/>
-            </a:fontRef>
-          </p:style>
-          <p:txBody>
-            <a:bodyPr rtlCol="0" anchor="ctr"/>
-            <a:lstStyle/>
-            <a:p>
-              <a:pPr algn="ctr"/>
-              <a:r>
-                <a:rPr lang="en-US" sz="1300">
-                  <a:solidFill>
-                    <a:schemeClr val="tx1"/>
-                  </a:solidFill>
-                  <a:latin typeface="Arial" panose="020B0604020202020204" pitchFamily="34" charset="0"/>
-                  <a:cs typeface="Arial" panose="020B0604020202020204" pitchFamily="34" charset="0"/>
-                </a:rPr>
-                <a:t>{abstract}</a:t>
-              </a:r>
-            </a:p>
-            <a:p>
-              <a:pPr algn="ctr"/>
-              <a:r>
-                <a:rPr lang="en-US" sz="1300">
-                  <a:solidFill>
-                    <a:schemeClr val="tx1"/>
-                  </a:solidFill>
-                  <a:latin typeface="Arial" panose="020B0604020202020204" pitchFamily="34" charset="0"/>
-                  <a:cs typeface="Arial" panose="020B0604020202020204" pitchFamily="34" charset="0"/>
-                </a:rPr>
-                <a:t>Command</a:t>
-              </a:r>
-            </a:p>
-          </p:txBody>
-        </p:sp>
-        <p:sp>
-          <p:nvSpPr>
-            <p:cNvPr id="85" name="Rounded Rectangle 14">
-              <a:extLst>
-                <a:ext uri="{FF2B5EF4-FFF2-40B4-BE49-F238E27FC236}">
-                  <a16:creationId xmlns:a16="http://schemas.microsoft.com/office/drawing/2014/main" id="{AB77C0EF-B2B6-9042-BFD7-09E1D9AFC24F}"/>
-                </a:ext>
-              </a:extLst>
-            </p:cNvPr>
-            <p:cNvSpPr/>
-            <p:nvPr/>
-          </p:nvSpPr>
-          <p:spPr>
-            <a:xfrm>
-              <a:off x="1376256" y="2660051"/>
-              <a:ext cx="2290161" cy="342596"/>
-            </a:xfrm>
-            <a:prstGeom prst="roundRect">
-              <a:avLst>
-                <a:gd name="adj" fmla="val 0"/>
-              </a:avLst>
-            </a:prstGeom>
-            <a:solidFill>
-              <a:srgbClr val="FFC000"/>
-            </a:solidFill>
-            <a:ln>
-              <a:solidFill>
-                <a:srgbClr val="FFC000"/>
-              </a:solidFill>
-            </a:ln>
-          </p:spPr>
-          <p:style>
-            <a:lnRef idx="2">
-              <a:schemeClr val="accent1">
-                <a:shade val="50000"/>
-              </a:schemeClr>
-            </a:lnRef>
-            <a:fillRef idx="1">
-              <a:schemeClr val="accent1"/>
-            </a:fillRef>
-            <a:effectRef idx="0">
-              <a:schemeClr val="accent1"/>
-            </a:effectRef>
-            <a:fontRef idx="minor">
-              <a:schemeClr val="lt1"/>
-            </a:fontRef>
-          </p:style>
-          <p:txBody>
-            <a:bodyPr rtlCol="0" anchor="ctr"/>
-            <a:lstStyle/>
-            <a:p>
-              <a:pPr algn="ctr"/>
-              <a:r>
-                <a:rPr lang="en-US" sz="1300">
-                  <a:solidFill>
-                    <a:schemeClr val="tx1"/>
-                  </a:solidFill>
-                  <a:latin typeface="Arial"/>
-                  <a:cs typeface="Arial"/>
-                </a:rPr>
-                <a:t>FindBankOrCardCommand</a:t>
-              </a:r>
-              <a:endParaRPr lang="en-US" sz="1300">
+          </a:ln>
+        </p:spPr>
+        <p:style>
+          <a:lnRef idx="2">
+            <a:schemeClr val="accent1">
+              <a:shade val="50000"/>
+            </a:schemeClr>
+          </a:lnRef>
+          <a:fillRef idx="1">
+            <a:schemeClr val="accent1"/>
+          </a:fillRef>
+          <a:effectRef idx="0">
+            <a:schemeClr val="accent1"/>
+          </a:effectRef>
+          <a:fontRef idx="minor">
+            <a:schemeClr val="lt1"/>
+          </a:fontRef>
+        </p:style>
+        <p:txBody>
+          <a:bodyPr rtlCol="0" anchor="ctr"/>
+          <a:lstStyle/>
+          <a:p>
+            <a:pPr algn="ctr"/>
+            <a:r>
+              <a:rPr lang="en-US" sz="1300" b="1">
                 <a:solidFill>
                   <a:schemeClr val="tx1"/>
                 </a:solidFill>
                 <a:latin typeface="Arial" panose="020B0604020202020204" pitchFamily="34" charset="0"/>
                 <a:cs typeface="Arial" panose="020B0604020202020204" pitchFamily="34" charset="0"/>
-              </a:endParaRPr>
-            </a:p>
-          </p:txBody>
-        </p:sp>
-        <p:sp>
-          <p:nvSpPr>
-            <p:cNvPr id="86" name="Rounded Rectangle 14">
-              <a:extLst>
-                <a:ext uri="{FF2B5EF4-FFF2-40B4-BE49-F238E27FC236}">
-                  <a16:creationId xmlns:a16="http://schemas.microsoft.com/office/drawing/2014/main" id="{564DA49F-BC4D-D844-884C-C02EE1A6CA57}"/>
-                </a:ext>
-              </a:extLst>
-            </p:cNvPr>
-            <p:cNvSpPr/>
-            <p:nvPr/>
-          </p:nvSpPr>
-          <p:spPr>
-            <a:xfrm>
-              <a:off x="6855848" y="2667093"/>
-              <a:ext cx="2530793" cy="376016"/>
-            </a:xfrm>
-            <a:prstGeom prst="roundRect">
-              <a:avLst>
-                <a:gd name="adj" fmla="val 0"/>
-              </a:avLst>
-            </a:prstGeom>
+              </a:rPr>
+              <a:t>Main</a:t>
+            </a:r>
+          </a:p>
+        </p:txBody>
+      </p:sp>
+      <p:sp>
+        <p:nvSpPr>
+          <p:cNvPr id="7" name="Rounded Rectangle 14">
+            <a:extLst>
+              <a:ext uri="{FF2B5EF4-FFF2-40B4-BE49-F238E27FC236}">
+                <a16:creationId xmlns:a16="http://schemas.microsoft.com/office/drawing/2014/main" id="{750E1284-81E9-4C41-B515-A44C4DE3A46A}"/>
+              </a:ext>
+            </a:extLst>
+          </p:cNvPr>
+          <p:cNvSpPr/>
+          <p:nvPr/>
+        </p:nvSpPr>
+        <p:spPr>
+          <a:xfrm>
+            <a:off x="5680421" y="1340446"/>
+            <a:ext cx="1982688" cy="369332"/>
+          </a:xfrm>
+          <a:prstGeom prst="roundRect">
+            <a:avLst>
+              <a:gd name="adj" fmla="val 0"/>
+            </a:avLst>
+          </a:prstGeom>
+          <a:solidFill>
+            <a:srgbClr val="FFC000"/>
+          </a:solidFill>
+          <a:ln>
             <a:solidFill>
               <a:srgbClr val="FFC000"/>
             </a:solidFill>
-            <a:ln>
-              <a:solidFill>
-                <a:srgbClr val="FFC000"/>
-              </a:solidFill>
-            </a:ln>
-          </p:spPr>
-          <p:style>
-            <a:lnRef idx="2">
-              <a:schemeClr val="accent1">
-                <a:shade val="50000"/>
-              </a:schemeClr>
-            </a:lnRef>
-            <a:fillRef idx="1">
-              <a:schemeClr val="accent1"/>
-            </a:fillRef>
-            <a:effectRef idx="0">
-              <a:schemeClr val="accent1"/>
-            </a:effectRef>
-            <a:fontRef idx="minor">
-              <a:schemeClr val="lt1"/>
-            </a:fontRef>
-          </p:style>
-          <p:txBody>
-            <a:bodyPr rtlCol="0" anchor="ctr"/>
-            <a:lstStyle/>
-            <a:p>
-              <a:pPr algn="ctr"/>
-              <a:r>
-                <a:rPr lang="en-US" sz="1300" dirty="0" err="1">
-                  <a:solidFill>
-                    <a:schemeClr val="tx1"/>
-                  </a:solidFill>
-                  <a:latin typeface="Arial"/>
-                  <a:cs typeface="Arial"/>
-                </a:rPr>
-                <a:t>FindCardExpenditureCommand</a:t>
-              </a:r>
-              <a:endParaRPr lang="en-US" sz="1300" dirty="0">
+          </a:ln>
+        </p:spPr>
+        <p:style>
+          <a:lnRef idx="2">
+            <a:schemeClr val="accent1">
+              <a:shade val="50000"/>
+            </a:schemeClr>
+          </a:lnRef>
+          <a:fillRef idx="1">
+            <a:schemeClr val="accent1"/>
+          </a:fillRef>
+          <a:effectRef idx="0">
+            <a:schemeClr val="accent1"/>
+          </a:effectRef>
+          <a:fontRef idx="minor">
+            <a:schemeClr val="lt1"/>
+          </a:fontRef>
+        </p:style>
+        <p:txBody>
+          <a:bodyPr rtlCol="0" anchor="ctr"/>
+          <a:lstStyle/>
+          <a:p>
+            <a:pPr algn="ctr"/>
+            <a:r>
+              <a:rPr lang="en-US" sz="1300">
                 <a:solidFill>
                   <a:schemeClr val="tx1"/>
                 </a:solidFill>
                 <a:latin typeface="Arial" panose="020B0604020202020204" pitchFamily="34" charset="0"/>
                 <a:cs typeface="Arial" panose="020B0604020202020204" pitchFamily="34" charset="0"/>
-              </a:endParaRPr>
-            </a:p>
-          </p:txBody>
-        </p:sp>
-        <p:sp>
-          <p:nvSpPr>
-            <p:cNvPr id="87" name="Rounded Rectangle 14">
-              <a:extLst>
-                <a:ext uri="{FF2B5EF4-FFF2-40B4-BE49-F238E27FC236}">
-                  <a16:creationId xmlns:a16="http://schemas.microsoft.com/office/drawing/2014/main" id="{481E2AA7-5786-AA44-82DF-1633AFF01192}"/>
-                </a:ext>
-              </a:extLst>
-            </p:cNvPr>
-            <p:cNvSpPr/>
-            <p:nvPr/>
-          </p:nvSpPr>
-          <p:spPr>
-            <a:xfrm>
-              <a:off x="4002369" y="2639999"/>
-              <a:ext cx="2557530" cy="362648"/>
-            </a:xfrm>
-            <a:prstGeom prst="roundRect">
-              <a:avLst>
-                <a:gd name="adj" fmla="val 0"/>
-              </a:avLst>
-            </a:prstGeom>
-            <a:solidFill>
-              <a:srgbClr val="FFC000"/>
-            </a:solidFill>
-            <a:ln>
-              <a:solidFill>
-                <a:srgbClr val="FFC000"/>
-              </a:solidFill>
-            </a:ln>
-          </p:spPr>
-          <p:style>
-            <a:lnRef idx="2">
-              <a:schemeClr val="accent1">
-                <a:shade val="50000"/>
-              </a:schemeClr>
-            </a:lnRef>
-            <a:fillRef idx="1">
-              <a:schemeClr val="accent1"/>
-            </a:fillRef>
-            <a:effectRef idx="0">
-              <a:schemeClr val="accent1"/>
-            </a:effectRef>
-            <a:fontRef idx="minor">
-              <a:schemeClr val="lt1"/>
-            </a:fontRef>
-          </p:style>
-          <p:txBody>
-            <a:bodyPr rtlCol="0" anchor="ctr"/>
-            <a:lstStyle/>
-            <a:p>
-              <a:pPr algn="ctr"/>
-              <a:r>
-                <a:rPr lang="en-US" sz="1300" dirty="0" err="1">
-                  <a:solidFill>
-                    <a:schemeClr val="tx1"/>
-                  </a:solidFill>
-                  <a:latin typeface="Arial"/>
-                  <a:cs typeface="Arial"/>
-                </a:rPr>
-                <a:t>FindBankExpenditureCommand</a:t>
-              </a:r>
-              <a:endParaRPr lang="en-US" sz="1300" dirty="0">
+              </a:rPr>
+              <a:t>{abstract}</a:t>
+            </a:r>
+          </a:p>
+          <a:p>
+            <a:pPr algn="ctr"/>
+            <a:r>
+              <a:rPr lang="en-US" sz="1300">
                 <a:solidFill>
                   <a:schemeClr val="tx1"/>
                 </a:solidFill>
                 <a:latin typeface="Arial" panose="020B0604020202020204" pitchFamily="34" charset="0"/>
                 <a:cs typeface="Arial" panose="020B0604020202020204" pitchFamily="34" charset="0"/>
-              </a:endParaRPr>
-            </a:p>
-          </p:txBody>
-        </p:sp>
-        <p:sp>
-          <p:nvSpPr>
-            <p:cNvPr id="88" name="Rounded Rectangle 14">
-              <a:extLst>
-                <a:ext uri="{FF2B5EF4-FFF2-40B4-BE49-F238E27FC236}">
-                  <a16:creationId xmlns:a16="http://schemas.microsoft.com/office/drawing/2014/main" id="{365F2051-51BA-224B-B842-13621DB39BCB}"/>
-                </a:ext>
-              </a:extLst>
-            </p:cNvPr>
-            <p:cNvSpPr/>
-            <p:nvPr/>
-          </p:nvSpPr>
-          <p:spPr>
-            <a:xfrm>
-              <a:off x="9682590" y="2621396"/>
-              <a:ext cx="1982688" cy="369332"/>
-            </a:xfrm>
-            <a:prstGeom prst="roundRect">
-              <a:avLst>
-                <a:gd name="adj" fmla="val 0"/>
-              </a:avLst>
-            </a:prstGeom>
+              </a:rPr>
+              <a:t>Command</a:t>
+            </a:r>
+          </a:p>
+        </p:txBody>
+      </p:sp>
+      <p:sp>
+        <p:nvSpPr>
+          <p:cNvPr id="10" name="Rounded Rectangle 14">
+            <a:extLst>
+              <a:ext uri="{FF2B5EF4-FFF2-40B4-BE49-F238E27FC236}">
+                <a16:creationId xmlns:a16="http://schemas.microsoft.com/office/drawing/2014/main" id="{40948013-7B71-4B11-AAB3-DF21F7C857D9}"/>
+              </a:ext>
+            </a:extLst>
+          </p:cNvPr>
+          <p:cNvSpPr/>
+          <p:nvPr/>
+        </p:nvSpPr>
+        <p:spPr>
+          <a:xfrm>
+            <a:off x="1376256" y="2660051"/>
+            <a:ext cx="2290161" cy="342596"/>
+          </a:xfrm>
+          <a:prstGeom prst="roundRect">
+            <a:avLst>
+              <a:gd name="adj" fmla="val 0"/>
+            </a:avLst>
+          </a:prstGeom>
+          <a:solidFill>
+            <a:srgbClr val="FFC000"/>
+          </a:solidFill>
+          <a:ln>
             <a:solidFill>
               <a:srgbClr val="FFC000"/>
             </a:solidFill>
-            <a:ln>
-              <a:solidFill>
-                <a:srgbClr val="FFC000"/>
-              </a:solidFill>
-            </a:ln>
-          </p:spPr>
-          <p:style>
-            <a:lnRef idx="2">
-              <a:schemeClr val="accent1">
-                <a:shade val="50000"/>
-              </a:schemeClr>
-            </a:lnRef>
-            <a:fillRef idx="1">
-              <a:schemeClr val="accent1"/>
-            </a:fillRef>
-            <a:effectRef idx="0">
-              <a:schemeClr val="accent1"/>
-            </a:effectRef>
-            <a:fontRef idx="minor">
-              <a:schemeClr val="lt1"/>
-            </a:fontRef>
-          </p:style>
-          <p:txBody>
-            <a:bodyPr rtlCol="0" anchor="ctr"/>
-            <a:lstStyle/>
-            <a:p>
-              <a:pPr algn="ctr"/>
-              <a:r>
-                <a:rPr lang="en-US" sz="1300">
-                  <a:solidFill>
-                    <a:schemeClr val="tx1"/>
-                  </a:solidFill>
-                  <a:latin typeface="Arial"/>
-                  <a:cs typeface="Arial"/>
-                </a:rPr>
-                <a:t>FindBondCommand</a:t>
-              </a:r>
-              <a:endParaRPr lang="en-US" sz="1300">
+          </a:ln>
+        </p:spPr>
+        <p:style>
+          <a:lnRef idx="2">
+            <a:schemeClr val="accent1">
+              <a:shade val="50000"/>
+            </a:schemeClr>
+          </a:lnRef>
+          <a:fillRef idx="1">
+            <a:schemeClr val="accent1"/>
+          </a:fillRef>
+          <a:effectRef idx="0">
+            <a:schemeClr val="accent1"/>
+          </a:effectRef>
+          <a:fontRef idx="minor">
+            <a:schemeClr val="lt1"/>
+          </a:fontRef>
+        </p:style>
+        <p:txBody>
+          <a:bodyPr rtlCol="0" anchor="ctr"/>
+          <a:lstStyle/>
+          <a:p>
+            <a:pPr algn="ctr"/>
+            <a:r>
+              <a:rPr lang="en-US" sz="1300">
                 <a:solidFill>
                   <a:schemeClr val="tx1"/>
                 </a:solidFill>
-                <a:latin typeface="Arial" panose="020B0604020202020204" pitchFamily="34" charset="0"/>
-                <a:cs typeface="Arial" panose="020B0604020202020204" pitchFamily="34" charset="0"/>
-              </a:endParaRPr>
-            </a:p>
-          </p:txBody>
-        </p:sp>
-        <p:sp>
-          <p:nvSpPr>
-            <p:cNvPr id="89" name="Triangle 55">
-              <a:extLst>
-                <a:ext uri="{FF2B5EF4-FFF2-40B4-BE49-F238E27FC236}">
-                  <a16:creationId xmlns:a16="http://schemas.microsoft.com/office/drawing/2014/main" id="{F6549EF7-CD66-6D41-9BC5-7FD83BD8B9A1}"/>
-                </a:ext>
-              </a:extLst>
-            </p:cNvPr>
-            <p:cNvSpPr/>
-            <p:nvPr/>
-          </p:nvSpPr>
-          <p:spPr>
-            <a:xfrm>
-              <a:off x="6529711" y="1754781"/>
-              <a:ext cx="238306" cy="98868"/>
-            </a:xfrm>
-            <a:prstGeom prst="triangle">
-              <a:avLst/>
-            </a:prstGeom>
-            <a:noFill/>
-            <a:ln>
+                <a:latin typeface="Arial"/>
+                <a:cs typeface="Arial"/>
+              </a:rPr>
+              <a:t>FindBankOrCardCommand</a:t>
+            </a:r>
+            <a:endParaRPr lang="en-US" sz="1300">
               <a:solidFill>
-                <a:srgbClr val="FFC000"/>
+                <a:schemeClr val="tx1"/>
               </a:solidFill>
-            </a:ln>
-          </p:spPr>
-          <p:style>
-            <a:lnRef idx="2">
-              <a:schemeClr val="accent1">
-                <a:shade val="50000"/>
-              </a:schemeClr>
-            </a:lnRef>
-            <a:fillRef idx="1">
-              <a:schemeClr val="accent1"/>
-            </a:fillRef>
-            <a:effectRef idx="0">
-              <a:schemeClr val="accent1"/>
-            </a:effectRef>
-            <a:fontRef idx="minor">
-              <a:schemeClr val="lt1"/>
-            </a:fontRef>
-          </p:style>
-          <p:txBody>
-            <a:bodyPr rtlCol="0" anchor="ctr"/>
-            <a:lstStyle/>
-            <a:p>
-              <a:pPr algn="ctr"/>
-              <a:endParaRPr lang="en-US" sz="1300">
-                <a:latin typeface="Arial" panose="020B0604020202020204" pitchFamily="34" charset="0"/>
-                <a:cs typeface="Arial" panose="020B0604020202020204" pitchFamily="34" charset="0"/>
-              </a:endParaRPr>
-            </a:p>
-          </p:txBody>
-        </p:sp>
-        <p:cxnSp>
-          <p:nvCxnSpPr>
-            <p:cNvPr id="90" name="Straight Connector 89">
-              <a:extLst>
-                <a:ext uri="{FF2B5EF4-FFF2-40B4-BE49-F238E27FC236}">
-                  <a16:creationId xmlns:a16="http://schemas.microsoft.com/office/drawing/2014/main" id="{6795270F-07B7-CF42-B84E-683BDAFBE175}"/>
-                </a:ext>
-              </a:extLst>
-            </p:cNvPr>
-            <p:cNvCxnSpPr>
-              <a:cxnSpLocks/>
-            </p:cNvCxnSpPr>
-            <p:nvPr/>
-          </p:nvCxnSpPr>
-          <p:spPr>
-            <a:xfrm flipV="1">
-              <a:off x="2474548" y="2233635"/>
-              <a:ext cx="8179332" cy="53472"/>
-            </a:xfrm>
-            <a:prstGeom prst="line">
-              <a:avLst/>
-            </a:prstGeom>
-          </p:spPr>
-          <p:style>
-            <a:lnRef idx="1">
-              <a:schemeClr val="accent4"/>
-            </a:lnRef>
-            <a:fillRef idx="0">
-              <a:schemeClr val="accent4"/>
-            </a:fillRef>
-            <a:effectRef idx="0">
-              <a:schemeClr val="accent4"/>
-            </a:effectRef>
-            <a:fontRef idx="minor">
-              <a:schemeClr val="tx1"/>
-            </a:fontRef>
-          </p:style>
-        </p:cxnSp>
-        <p:cxnSp>
-          <p:nvCxnSpPr>
-            <p:cNvPr id="91" name="Straight Connector 90">
-              <a:extLst>
-                <a:ext uri="{FF2B5EF4-FFF2-40B4-BE49-F238E27FC236}">
-                  <a16:creationId xmlns:a16="http://schemas.microsoft.com/office/drawing/2014/main" id="{03470154-FFFF-D545-A383-527DC70F4C49}"/>
-                </a:ext>
-              </a:extLst>
-            </p:cNvPr>
-            <p:cNvCxnSpPr>
-              <a:cxnSpLocks/>
-            </p:cNvCxnSpPr>
-            <p:nvPr/>
-          </p:nvCxnSpPr>
-          <p:spPr>
-            <a:xfrm flipV="1">
-              <a:off x="6648864" y="1853649"/>
-              <a:ext cx="0" cy="406722"/>
-            </a:xfrm>
-            <a:prstGeom prst="line">
-              <a:avLst/>
-            </a:prstGeom>
-          </p:spPr>
-          <p:style>
-            <a:lnRef idx="1">
-              <a:schemeClr val="accent4"/>
-            </a:lnRef>
-            <a:fillRef idx="0">
-              <a:schemeClr val="accent4"/>
-            </a:fillRef>
-            <a:effectRef idx="0">
-              <a:schemeClr val="accent4"/>
-            </a:effectRef>
-            <a:fontRef idx="minor">
-              <a:schemeClr val="tx1"/>
-            </a:fontRef>
-          </p:style>
-        </p:cxnSp>
-        <p:cxnSp>
-          <p:nvCxnSpPr>
-            <p:cNvPr id="92" name="Straight Connector 91">
-              <a:extLst>
-                <a:ext uri="{FF2B5EF4-FFF2-40B4-BE49-F238E27FC236}">
-                  <a16:creationId xmlns:a16="http://schemas.microsoft.com/office/drawing/2014/main" id="{511E3163-DC80-B349-BFDF-E6F296D3D4E8}"/>
-                </a:ext>
-              </a:extLst>
-            </p:cNvPr>
-            <p:cNvCxnSpPr>
-              <a:cxnSpLocks/>
-            </p:cNvCxnSpPr>
-            <p:nvPr/>
-          </p:nvCxnSpPr>
-          <p:spPr>
-            <a:xfrm flipH="1" flipV="1">
-              <a:off x="8104792" y="2253688"/>
-              <a:ext cx="6684" cy="421372"/>
-            </a:xfrm>
-            <a:prstGeom prst="line">
-              <a:avLst/>
-            </a:prstGeom>
-          </p:spPr>
-          <p:style>
-            <a:lnRef idx="1">
-              <a:schemeClr val="accent4"/>
-            </a:lnRef>
-            <a:fillRef idx="0">
-              <a:schemeClr val="accent4"/>
-            </a:fillRef>
-            <a:effectRef idx="0">
-              <a:schemeClr val="accent4"/>
-            </a:effectRef>
-            <a:fontRef idx="minor">
-              <a:schemeClr val="tx1"/>
-            </a:fontRef>
-          </p:style>
-        </p:cxnSp>
-        <p:cxnSp>
-          <p:nvCxnSpPr>
-            <p:cNvPr id="93" name="Straight Connector 92">
-              <a:extLst>
-                <a:ext uri="{FF2B5EF4-FFF2-40B4-BE49-F238E27FC236}">
-                  <a16:creationId xmlns:a16="http://schemas.microsoft.com/office/drawing/2014/main" id="{D44DC7B8-34C3-2944-AFE1-2D58C22D2965}"/>
-                </a:ext>
-              </a:extLst>
-            </p:cNvPr>
-            <p:cNvCxnSpPr>
-              <a:cxnSpLocks/>
-            </p:cNvCxnSpPr>
-            <p:nvPr/>
-          </p:nvCxnSpPr>
-          <p:spPr>
-            <a:xfrm>
-              <a:off x="2487916" y="4604313"/>
-              <a:ext cx="8165964" cy="6683"/>
-            </a:xfrm>
-            <a:prstGeom prst="line">
-              <a:avLst/>
-            </a:prstGeom>
-          </p:spPr>
-          <p:style>
-            <a:lnRef idx="1">
-              <a:schemeClr val="accent4"/>
-            </a:lnRef>
-            <a:fillRef idx="0">
-              <a:schemeClr val="accent4"/>
-            </a:fillRef>
-            <a:effectRef idx="0">
-              <a:schemeClr val="accent4"/>
-            </a:effectRef>
-            <a:fontRef idx="minor">
-              <a:schemeClr val="tx1"/>
-            </a:fontRef>
-          </p:style>
-        </p:cxnSp>
-        <p:cxnSp>
-          <p:nvCxnSpPr>
-            <p:cNvPr id="94" name="Straight Connector 93">
-              <a:extLst>
-                <a:ext uri="{FF2B5EF4-FFF2-40B4-BE49-F238E27FC236}">
-                  <a16:creationId xmlns:a16="http://schemas.microsoft.com/office/drawing/2014/main" id="{112E5CFA-8D6D-4A47-AE61-7D9F7D3D7EE8}"/>
-                </a:ext>
-              </a:extLst>
-            </p:cNvPr>
-            <p:cNvCxnSpPr>
-              <a:cxnSpLocks/>
-            </p:cNvCxnSpPr>
-            <p:nvPr/>
-          </p:nvCxnSpPr>
-          <p:spPr>
-            <a:xfrm flipV="1">
-              <a:off x="5203041" y="2990729"/>
-              <a:ext cx="0" cy="1613584"/>
-            </a:xfrm>
-            <a:prstGeom prst="line">
-              <a:avLst/>
-            </a:prstGeom>
-          </p:spPr>
-          <p:style>
-            <a:lnRef idx="1">
-              <a:schemeClr val="accent4"/>
-            </a:lnRef>
-            <a:fillRef idx="0">
-              <a:schemeClr val="accent4"/>
-            </a:fillRef>
-            <a:effectRef idx="0">
-              <a:schemeClr val="accent4"/>
-            </a:effectRef>
-            <a:fontRef idx="minor">
-              <a:schemeClr val="tx1"/>
-            </a:fontRef>
-          </p:style>
-        </p:cxnSp>
-        <p:cxnSp>
-          <p:nvCxnSpPr>
-            <p:cNvPr id="95" name="Straight Connector 94">
-              <a:extLst>
-                <a:ext uri="{FF2B5EF4-FFF2-40B4-BE49-F238E27FC236}">
-                  <a16:creationId xmlns:a16="http://schemas.microsoft.com/office/drawing/2014/main" id="{E6D064F0-EB44-9145-9D11-A6148A0D9BFC}"/>
-                </a:ext>
-              </a:extLst>
-            </p:cNvPr>
-            <p:cNvCxnSpPr>
-              <a:cxnSpLocks/>
-            </p:cNvCxnSpPr>
-            <p:nvPr/>
-          </p:nvCxnSpPr>
-          <p:spPr>
-            <a:xfrm flipV="1">
-              <a:off x="8111475" y="2957307"/>
-              <a:ext cx="0" cy="1613584"/>
-            </a:xfrm>
-            <a:prstGeom prst="line">
-              <a:avLst/>
-            </a:prstGeom>
-          </p:spPr>
-          <p:style>
-            <a:lnRef idx="1">
-              <a:schemeClr val="accent4"/>
-            </a:lnRef>
-            <a:fillRef idx="0">
-              <a:schemeClr val="accent4"/>
-            </a:fillRef>
-            <a:effectRef idx="0">
-              <a:schemeClr val="accent4"/>
-            </a:effectRef>
-            <a:fontRef idx="minor">
-              <a:schemeClr val="tx1"/>
-            </a:fontRef>
-          </p:style>
-        </p:cxnSp>
-        <p:cxnSp>
-          <p:nvCxnSpPr>
-            <p:cNvPr id="96" name="Straight Connector 95">
-              <a:extLst>
-                <a:ext uri="{FF2B5EF4-FFF2-40B4-BE49-F238E27FC236}">
-                  <a16:creationId xmlns:a16="http://schemas.microsoft.com/office/drawing/2014/main" id="{4015D54B-C862-5947-8743-C7C935895CF6}"/>
-                </a:ext>
-              </a:extLst>
-            </p:cNvPr>
-            <p:cNvCxnSpPr>
-              <a:cxnSpLocks/>
-            </p:cNvCxnSpPr>
-            <p:nvPr/>
-          </p:nvCxnSpPr>
-          <p:spPr>
-            <a:xfrm flipH="1" flipV="1">
-              <a:off x="10630273" y="2957307"/>
-              <a:ext cx="23607" cy="1653689"/>
-            </a:xfrm>
-            <a:prstGeom prst="line">
-              <a:avLst/>
-            </a:prstGeom>
-          </p:spPr>
-          <p:style>
-            <a:lnRef idx="1">
-              <a:schemeClr val="accent4"/>
-            </a:lnRef>
-            <a:fillRef idx="0">
-              <a:schemeClr val="accent4"/>
-            </a:fillRef>
-            <a:effectRef idx="0">
-              <a:schemeClr val="accent4"/>
-            </a:effectRef>
-            <a:fontRef idx="minor">
-              <a:schemeClr val="tx1"/>
-            </a:fontRef>
-          </p:style>
-        </p:cxnSp>
-        <p:cxnSp>
-          <p:nvCxnSpPr>
-            <p:cNvPr id="97" name="Straight Arrow Connector 96">
-              <a:extLst>
-                <a:ext uri="{FF2B5EF4-FFF2-40B4-BE49-F238E27FC236}">
-                  <a16:creationId xmlns:a16="http://schemas.microsoft.com/office/drawing/2014/main" id="{13772A8A-F320-2341-AB93-5D1BE67506CE}"/>
-                </a:ext>
-              </a:extLst>
-            </p:cNvPr>
-            <p:cNvCxnSpPr>
-              <a:cxnSpLocks/>
-            </p:cNvCxnSpPr>
-            <p:nvPr/>
-          </p:nvCxnSpPr>
-          <p:spPr>
-            <a:xfrm flipV="1">
-              <a:off x="6625519" y="4610996"/>
-              <a:ext cx="0" cy="1389537"/>
-            </a:xfrm>
-            <a:prstGeom prst="straightConnector1">
-              <a:avLst/>
-            </a:prstGeom>
-            <a:ln>
+              <a:latin typeface="Arial" panose="020B0604020202020204" pitchFamily="34" charset="0"/>
+              <a:cs typeface="Arial" panose="020B0604020202020204" pitchFamily="34" charset="0"/>
+            </a:endParaRPr>
+          </a:p>
+        </p:txBody>
+      </p:sp>
+      <p:sp>
+        <p:nvSpPr>
+          <p:cNvPr id="11" name="Rounded Rectangle 14">
+            <a:extLst>
+              <a:ext uri="{FF2B5EF4-FFF2-40B4-BE49-F238E27FC236}">
+                <a16:creationId xmlns:a16="http://schemas.microsoft.com/office/drawing/2014/main" id="{614726BF-74B4-47B0-A177-491067EDB194}"/>
+              </a:ext>
+            </a:extLst>
+          </p:cNvPr>
+          <p:cNvSpPr/>
+          <p:nvPr/>
+        </p:nvSpPr>
+        <p:spPr>
+          <a:xfrm>
+            <a:off x="5360121" y="2656831"/>
+            <a:ext cx="2530793" cy="376016"/>
+          </a:xfrm>
+          <a:prstGeom prst="roundRect">
+            <a:avLst>
+              <a:gd name="adj" fmla="val 0"/>
+            </a:avLst>
+          </a:prstGeom>
+          <a:solidFill>
+            <a:srgbClr val="FFC000"/>
+          </a:solidFill>
+          <a:ln>
+            <a:solidFill>
+              <a:srgbClr val="FFC000"/>
+            </a:solidFill>
+          </a:ln>
+        </p:spPr>
+        <p:style>
+          <a:lnRef idx="2">
+            <a:schemeClr val="accent1">
+              <a:shade val="50000"/>
+            </a:schemeClr>
+          </a:lnRef>
+          <a:fillRef idx="1">
+            <a:schemeClr val="accent1"/>
+          </a:fillRef>
+          <a:effectRef idx="0">
+            <a:schemeClr val="accent1"/>
+          </a:effectRef>
+          <a:fontRef idx="minor">
+            <a:schemeClr val="lt1"/>
+          </a:fontRef>
+        </p:style>
+        <p:txBody>
+          <a:bodyPr rtlCol="0" anchor="ctr"/>
+          <a:lstStyle/>
+          <a:p>
+            <a:pPr algn="ctr"/>
+            <a:r>
+              <a:rPr lang="en-US" sz="1300" dirty="0">
+                <a:solidFill>
+                  <a:schemeClr val="tx1"/>
+                </a:solidFill>
+                <a:latin typeface="Arial"/>
+                <a:cs typeface="Arial"/>
+              </a:rPr>
+              <a:t>FindTransactionCommand</a:t>
+            </a:r>
+            <a:endParaRPr lang="en-US" sz="1300" dirty="0">
               <a:solidFill>
-                <a:srgbClr val="FFC000"/>
+                <a:schemeClr val="tx1"/>
               </a:solidFill>
-              <a:prstDash val="solid"/>
-              <a:headEnd type="triangle"/>
-              <a:tailEnd type="none"/>
-            </a:ln>
-          </p:spPr>
-          <p:style>
-            <a:lnRef idx="1">
-              <a:schemeClr val="accent1"/>
-            </a:lnRef>
-            <a:fillRef idx="0">
-              <a:schemeClr val="accent1"/>
-            </a:fillRef>
-            <a:effectRef idx="0">
-              <a:schemeClr val="accent1"/>
-            </a:effectRef>
-            <a:fontRef idx="minor">
-              <a:schemeClr val="tx1"/>
-            </a:fontRef>
-          </p:style>
-        </p:cxnSp>
-        <p:cxnSp>
-          <p:nvCxnSpPr>
-            <p:cNvPr id="98" name="Straight Arrow Connector 97">
-              <a:extLst>
-                <a:ext uri="{FF2B5EF4-FFF2-40B4-BE49-F238E27FC236}">
-                  <a16:creationId xmlns:a16="http://schemas.microsoft.com/office/drawing/2014/main" id="{6DE28AE0-0A26-5D4D-AFDC-EE970D0912F4}"/>
-                </a:ext>
-              </a:extLst>
-            </p:cNvPr>
-            <p:cNvCxnSpPr>
-              <a:cxnSpLocks/>
-              <a:endCxn id="84" idx="1"/>
-            </p:cNvCxnSpPr>
-            <p:nvPr/>
-          </p:nvCxnSpPr>
-          <p:spPr>
-            <a:xfrm>
-              <a:off x="1220392" y="1525112"/>
-              <a:ext cx="4460029" cy="0"/>
-            </a:xfrm>
-            <a:prstGeom prst="straightConnector1">
-              <a:avLst/>
-            </a:prstGeom>
-            <a:ln>
-              <a:tailEnd type="triangle"/>
-            </a:ln>
-          </p:spPr>
-          <p:style>
-            <a:lnRef idx="1">
-              <a:schemeClr val="accent4"/>
-            </a:lnRef>
-            <a:fillRef idx="0">
-              <a:schemeClr val="accent4"/>
-            </a:fillRef>
-            <a:effectRef idx="0">
-              <a:schemeClr val="accent4"/>
-            </a:effectRef>
-            <a:fontRef idx="minor">
-              <a:schemeClr val="tx1"/>
-            </a:fontRef>
-          </p:style>
-        </p:cxnSp>
-        <p:cxnSp>
-          <p:nvCxnSpPr>
-            <p:cNvPr id="99" name="Straight Connector 98">
-              <a:extLst>
-                <a:ext uri="{FF2B5EF4-FFF2-40B4-BE49-F238E27FC236}">
-                  <a16:creationId xmlns:a16="http://schemas.microsoft.com/office/drawing/2014/main" id="{B606AD83-8940-7D45-A58F-1DD63D7B7E20}"/>
-                </a:ext>
-              </a:extLst>
-            </p:cNvPr>
-            <p:cNvCxnSpPr>
-              <a:cxnSpLocks/>
-            </p:cNvCxnSpPr>
-            <p:nvPr/>
-          </p:nvCxnSpPr>
-          <p:spPr>
-            <a:xfrm flipV="1">
-              <a:off x="2482567" y="2261154"/>
-              <a:ext cx="0" cy="377143"/>
-            </a:xfrm>
-            <a:prstGeom prst="line">
-              <a:avLst/>
-            </a:prstGeom>
-          </p:spPr>
-          <p:style>
-            <a:lnRef idx="1">
-              <a:schemeClr val="accent4"/>
-            </a:lnRef>
-            <a:fillRef idx="0">
-              <a:schemeClr val="accent4"/>
-            </a:fillRef>
-            <a:effectRef idx="0">
-              <a:schemeClr val="accent4"/>
-            </a:effectRef>
-            <a:fontRef idx="minor">
-              <a:schemeClr val="tx1"/>
-            </a:fontRef>
-          </p:style>
-        </p:cxnSp>
-        <p:cxnSp>
-          <p:nvCxnSpPr>
-            <p:cNvPr id="100" name="Straight Connector 99">
-              <a:extLst>
-                <a:ext uri="{FF2B5EF4-FFF2-40B4-BE49-F238E27FC236}">
-                  <a16:creationId xmlns:a16="http://schemas.microsoft.com/office/drawing/2014/main" id="{1EB1A1DD-E08D-8B4D-921F-F75CCD52C256}"/>
-                </a:ext>
-              </a:extLst>
-            </p:cNvPr>
-            <p:cNvCxnSpPr>
-              <a:cxnSpLocks/>
-            </p:cNvCxnSpPr>
-            <p:nvPr/>
-          </p:nvCxnSpPr>
-          <p:spPr>
-            <a:xfrm flipH="1" flipV="1">
-              <a:off x="5209724" y="2254470"/>
-              <a:ext cx="6684" cy="430616"/>
-            </a:xfrm>
-            <a:prstGeom prst="line">
-              <a:avLst/>
-            </a:prstGeom>
-          </p:spPr>
-          <p:style>
-            <a:lnRef idx="1">
-              <a:schemeClr val="accent4"/>
-            </a:lnRef>
-            <a:fillRef idx="0">
-              <a:schemeClr val="accent4"/>
-            </a:fillRef>
-            <a:effectRef idx="0">
-              <a:schemeClr val="accent4"/>
-            </a:effectRef>
-            <a:fontRef idx="minor">
-              <a:schemeClr val="tx1"/>
-            </a:fontRef>
-          </p:style>
-        </p:cxnSp>
-        <p:cxnSp>
-          <p:nvCxnSpPr>
-            <p:cNvPr id="101" name="Straight Connector 100">
-              <a:extLst>
-                <a:ext uri="{FF2B5EF4-FFF2-40B4-BE49-F238E27FC236}">
-                  <a16:creationId xmlns:a16="http://schemas.microsoft.com/office/drawing/2014/main" id="{043F5C6E-6422-9145-A027-F1AD99BBF67E}"/>
-                </a:ext>
-              </a:extLst>
-            </p:cNvPr>
-            <p:cNvCxnSpPr>
-              <a:cxnSpLocks/>
-            </p:cNvCxnSpPr>
-            <p:nvPr/>
-          </p:nvCxnSpPr>
-          <p:spPr>
-            <a:xfrm flipH="1" flipV="1">
-              <a:off x="10638107" y="2240319"/>
-              <a:ext cx="6684" cy="421372"/>
-            </a:xfrm>
-            <a:prstGeom prst="line">
-              <a:avLst/>
-            </a:prstGeom>
-          </p:spPr>
-          <p:style>
-            <a:lnRef idx="1">
-              <a:schemeClr val="accent4"/>
-            </a:lnRef>
-            <a:fillRef idx="0">
-              <a:schemeClr val="accent4"/>
-            </a:fillRef>
-            <a:effectRef idx="0">
-              <a:schemeClr val="accent4"/>
-            </a:effectRef>
-            <a:fontRef idx="minor">
-              <a:schemeClr val="tx1"/>
-            </a:fontRef>
-          </p:style>
-        </p:cxnSp>
-        <p:cxnSp>
-          <p:nvCxnSpPr>
-            <p:cNvPr id="102" name="Straight Connector 101">
-              <a:extLst>
-                <a:ext uri="{FF2B5EF4-FFF2-40B4-BE49-F238E27FC236}">
-                  <a16:creationId xmlns:a16="http://schemas.microsoft.com/office/drawing/2014/main" id="{7174E210-3620-CA46-9F86-36D93E46736B}"/>
-                </a:ext>
-              </a:extLst>
-            </p:cNvPr>
-            <p:cNvCxnSpPr>
-              <a:cxnSpLocks/>
-            </p:cNvCxnSpPr>
-            <p:nvPr/>
-          </p:nvCxnSpPr>
-          <p:spPr>
-            <a:xfrm flipV="1">
-              <a:off x="2482567" y="2997413"/>
-              <a:ext cx="0" cy="1613584"/>
-            </a:xfrm>
-            <a:prstGeom prst="line">
-              <a:avLst/>
-            </a:prstGeom>
-          </p:spPr>
-          <p:style>
-            <a:lnRef idx="1">
-              <a:schemeClr val="accent4"/>
-            </a:lnRef>
-            <a:fillRef idx="0">
-              <a:schemeClr val="accent4"/>
-            </a:fillRef>
-            <a:effectRef idx="0">
-              <a:schemeClr val="accent4"/>
-            </a:effectRef>
-            <a:fontRef idx="minor">
-              <a:schemeClr val="tx1"/>
-            </a:fontRef>
-          </p:style>
-        </p:cxnSp>
-      </p:grpSp>
+              <a:latin typeface="Arial" panose="020B0604020202020204" pitchFamily="34" charset="0"/>
+              <a:cs typeface="Arial" panose="020B0604020202020204" pitchFamily="34" charset="0"/>
+            </a:endParaRPr>
+          </a:p>
+        </p:txBody>
+      </p:sp>
+      <p:sp>
+        <p:nvSpPr>
+          <p:cNvPr id="13" name="Rounded Rectangle 14">
+            <a:extLst>
+              <a:ext uri="{FF2B5EF4-FFF2-40B4-BE49-F238E27FC236}">
+                <a16:creationId xmlns:a16="http://schemas.microsoft.com/office/drawing/2014/main" id="{5BDCC9E2-4684-41B2-85CD-415F73D25C00}"/>
+              </a:ext>
+            </a:extLst>
+          </p:cNvPr>
+          <p:cNvSpPr/>
+          <p:nvPr/>
+        </p:nvSpPr>
+        <p:spPr>
+          <a:xfrm>
+            <a:off x="9682590" y="2621396"/>
+            <a:ext cx="1982688" cy="369332"/>
+          </a:xfrm>
+          <a:prstGeom prst="roundRect">
+            <a:avLst>
+              <a:gd name="adj" fmla="val 0"/>
+            </a:avLst>
+          </a:prstGeom>
+          <a:solidFill>
+            <a:srgbClr val="FFC000"/>
+          </a:solidFill>
+          <a:ln>
+            <a:solidFill>
+              <a:srgbClr val="FFC000"/>
+            </a:solidFill>
+          </a:ln>
+        </p:spPr>
+        <p:style>
+          <a:lnRef idx="2">
+            <a:schemeClr val="accent1">
+              <a:shade val="50000"/>
+            </a:schemeClr>
+          </a:lnRef>
+          <a:fillRef idx="1">
+            <a:schemeClr val="accent1"/>
+          </a:fillRef>
+          <a:effectRef idx="0">
+            <a:schemeClr val="accent1"/>
+          </a:effectRef>
+          <a:fontRef idx="minor">
+            <a:schemeClr val="lt1"/>
+          </a:fontRef>
+        </p:style>
+        <p:txBody>
+          <a:bodyPr rtlCol="0" anchor="ctr"/>
+          <a:lstStyle/>
+          <a:p>
+            <a:pPr algn="ctr"/>
+            <a:r>
+              <a:rPr lang="en-US" sz="1300">
+                <a:solidFill>
+                  <a:schemeClr val="tx1"/>
+                </a:solidFill>
+                <a:latin typeface="Arial"/>
+                <a:cs typeface="Arial"/>
+              </a:rPr>
+              <a:t>FindBondCommand</a:t>
+            </a:r>
+            <a:endParaRPr lang="en-US" sz="1300">
+              <a:solidFill>
+                <a:schemeClr val="tx1"/>
+              </a:solidFill>
+              <a:latin typeface="Arial" panose="020B0604020202020204" pitchFamily="34" charset="0"/>
+              <a:cs typeface="Arial" panose="020B0604020202020204" pitchFamily="34" charset="0"/>
+            </a:endParaRPr>
+          </a:p>
+        </p:txBody>
+      </p:sp>
+      <p:sp>
+        <p:nvSpPr>
+          <p:cNvPr id="15" name="Triangle 55">
+            <a:extLst>
+              <a:ext uri="{FF2B5EF4-FFF2-40B4-BE49-F238E27FC236}">
+                <a16:creationId xmlns:a16="http://schemas.microsoft.com/office/drawing/2014/main" id="{572E674F-2A21-42AA-BE26-E06D49C273EC}"/>
+              </a:ext>
+            </a:extLst>
+          </p:cNvPr>
+          <p:cNvSpPr/>
+          <p:nvPr/>
+        </p:nvSpPr>
+        <p:spPr>
+          <a:xfrm>
+            <a:off x="6529711" y="1754781"/>
+            <a:ext cx="238306" cy="98868"/>
+          </a:xfrm>
+          <a:prstGeom prst="triangle">
+            <a:avLst/>
+          </a:prstGeom>
+          <a:noFill/>
+          <a:ln>
+            <a:solidFill>
+              <a:srgbClr val="FFC000"/>
+            </a:solidFill>
+          </a:ln>
+        </p:spPr>
+        <p:style>
+          <a:lnRef idx="2">
+            <a:schemeClr val="accent1">
+              <a:shade val="50000"/>
+            </a:schemeClr>
+          </a:lnRef>
+          <a:fillRef idx="1">
+            <a:schemeClr val="accent1"/>
+          </a:fillRef>
+          <a:effectRef idx="0">
+            <a:schemeClr val="accent1"/>
+          </a:effectRef>
+          <a:fontRef idx="minor">
+            <a:schemeClr val="lt1"/>
+          </a:fontRef>
+        </p:style>
+        <p:txBody>
+          <a:bodyPr rtlCol="0" anchor="ctr"/>
+          <a:lstStyle/>
+          <a:p>
+            <a:pPr algn="ctr"/>
+            <a:endParaRPr lang="en-US" sz="1300">
+              <a:latin typeface="Arial" panose="020B0604020202020204" pitchFamily="34" charset="0"/>
+              <a:cs typeface="Arial" panose="020B0604020202020204" pitchFamily="34" charset="0"/>
+            </a:endParaRPr>
+          </a:p>
+        </p:txBody>
+      </p:sp>
+      <p:cxnSp>
+        <p:nvCxnSpPr>
+          <p:cNvPr id="5" name="Straight Connector 4">
+            <a:extLst>
+              <a:ext uri="{FF2B5EF4-FFF2-40B4-BE49-F238E27FC236}">
+                <a16:creationId xmlns:a16="http://schemas.microsoft.com/office/drawing/2014/main" id="{AB5C86C6-6C48-41CC-8A7E-AA3FB97C9973}"/>
+              </a:ext>
+            </a:extLst>
+          </p:cNvPr>
+          <p:cNvCxnSpPr>
+            <a:cxnSpLocks/>
+          </p:cNvCxnSpPr>
+          <p:nvPr/>
+        </p:nvCxnSpPr>
+        <p:spPr>
+          <a:xfrm flipV="1">
+            <a:off x="2474548" y="2233635"/>
+            <a:ext cx="8179332" cy="53472"/>
+          </a:xfrm>
+          <a:prstGeom prst="line">
+            <a:avLst/>
+          </a:prstGeom>
+        </p:spPr>
+        <p:style>
+          <a:lnRef idx="1">
+            <a:schemeClr val="accent4"/>
+          </a:lnRef>
+          <a:fillRef idx="0">
+            <a:schemeClr val="accent4"/>
+          </a:fillRef>
+          <a:effectRef idx="0">
+            <a:schemeClr val="accent4"/>
+          </a:effectRef>
+          <a:fontRef idx="minor">
+            <a:schemeClr val="tx1"/>
+          </a:fontRef>
+        </p:style>
+      </p:cxnSp>
+      <p:cxnSp>
+        <p:nvCxnSpPr>
+          <p:cNvPr id="20" name="Straight Connector 19">
+            <a:extLst>
+              <a:ext uri="{FF2B5EF4-FFF2-40B4-BE49-F238E27FC236}">
+                <a16:creationId xmlns:a16="http://schemas.microsoft.com/office/drawing/2014/main" id="{C39938B6-0026-41C0-8A83-31CE2B474A04}"/>
+              </a:ext>
+            </a:extLst>
+          </p:cNvPr>
+          <p:cNvCxnSpPr>
+            <a:cxnSpLocks/>
+          </p:cNvCxnSpPr>
+          <p:nvPr/>
+        </p:nvCxnSpPr>
+        <p:spPr>
+          <a:xfrm flipV="1">
+            <a:off x="6648864" y="1853649"/>
+            <a:ext cx="0" cy="406722"/>
+          </a:xfrm>
+          <a:prstGeom prst="line">
+            <a:avLst/>
+          </a:prstGeom>
+        </p:spPr>
+        <p:style>
+          <a:lnRef idx="1">
+            <a:schemeClr val="accent4"/>
+          </a:lnRef>
+          <a:fillRef idx="0">
+            <a:schemeClr val="accent4"/>
+          </a:fillRef>
+          <a:effectRef idx="0">
+            <a:schemeClr val="accent4"/>
+          </a:effectRef>
+          <a:fontRef idx="minor">
+            <a:schemeClr val="tx1"/>
+          </a:fontRef>
+        </p:style>
+      </p:cxnSp>
+      <p:cxnSp>
+        <p:nvCxnSpPr>
+          <p:cNvPr id="31" name="Straight Connector 30">
+            <a:extLst>
+              <a:ext uri="{FF2B5EF4-FFF2-40B4-BE49-F238E27FC236}">
+                <a16:creationId xmlns:a16="http://schemas.microsoft.com/office/drawing/2014/main" id="{AA2A8D5C-66C2-4281-9070-B687F505609C}"/>
+              </a:ext>
+            </a:extLst>
+          </p:cNvPr>
+          <p:cNvCxnSpPr>
+            <a:cxnSpLocks/>
+          </p:cNvCxnSpPr>
+          <p:nvPr/>
+        </p:nvCxnSpPr>
+        <p:spPr>
+          <a:xfrm flipH="1" flipV="1">
+            <a:off x="6649845" y="2287009"/>
+            <a:ext cx="6684" cy="421372"/>
+          </a:xfrm>
+          <a:prstGeom prst="line">
+            <a:avLst/>
+          </a:prstGeom>
+        </p:spPr>
+        <p:style>
+          <a:lnRef idx="1">
+            <a:schemeClr val="accent4"/>
+          </a:lnRef>
+          <a:fillRef idx="0">
+            <a:schemeClr val="accent4"/>
+          </a:fillRef>
+          <a:effectRef idx="0">
+            <a:schemeClr val="accent4"/>
+          </a:effectRef>
+          <a:fontRef idx="minor">
+            <a:schemeClr val="tx1"/>
+          </a:fontRef>
+        </p:style>
+      </p:cxnSp>
+      <p:cxnSp>
+        <p:nvCxnSpPr>
+          <p:cNvPr id="36" name="Straight Connector 35">
+            <a:extLst>
+              <a:ext uri="{FF2B5EF4-FFF2-40B4-BE49-F238E27FC236}">
+                <a16:creationId xmlns:a16="http://schemas.microsoft.com/office/drawing/2014/main" id="{1099EB8E-8F38-4D6B-95CC-88C2E877C0B6}"/>
+              </a:ext>
+            </a:extLst>
+          </p:cNvPr>
+          <p:cNvCxnSpPr>
+            <a:cxnSpLocks/>
+            <a:stCxn id="13" idx="0"/>
+          </p:cNvCxnSpPr>
+          <p:nvPr/>
+        </p:nvCxnSpPr>
+        <p:spPr>
+          <a:xfrm flipV="1">
+            <a:off x="39176274" y="10104506"/>
+            <a:ext cx="0" cy="381077"/>
+          </a:xfrm>
+          <a:prstGeom prst="line">
+            <a:avLst/>
+          </a:prstGeom>
+        </p:spPr>
+        <p:style>
+          <a:lnRef idx="1">
+            <a:schemeClr val="accent4"/>
+          </a:lnRef>
+          <a:fillRef idx="0">
+            <a:schemeClr val="accent4"/>
+          </a:fillRef>
+          <a:effectRef idx="0">
+            <a:schemeClr val="accent4"/>
+          </a:effectRef>
+          <a:fontRef idx="minor">
+            <a:schemeClr val="tx1"/>
+          </a:fontRef>
+        </p:style>
+      </p:cxnSp>
+      <p:cxnSp>
+        <p:nvCxnSpPr>
+          <p:cNvPr id="39" name="Straight Connector 38">
+            <a:extLst>
+              <a:ext uri="{FF2B5EF4-FFF2-40B4-BE49-F238E27FC236}">
+                <a16:creationId xmlns:a16="http://schemas.microsoft.com/office/drawing/2014/main" id="{21A35BB4-0DBE-4B61-9042-C63F34F6B8C0}"/>
+              </a:ext>
+            </a:extLst>
+          </p:cNvPr>
+          <p:cNvCxnSpPr>
+            <a:cxnSpLocks/>
+          </p:cNvCxnSpPr>
+          <p:nvPr/>
+        </p:nvCxnSpPr>
+        <p:spPr>
+          <a:xfrm>
+            <a:off x="2487916" y="4604313"/>
+            <a:ext cx="8165964" cy="6683"/>
+          </a:xfrm>
+          <a:prstGeom prst="line">
+            <a:avLst/>
+          </a:prstGeom>
+        </p:spPr>
+        <p:style>
+          <a:lnRef idx="1">
+            <a:schemeClr val="accent4"/>
+          </a:lnRef>
+          <a:fillRef idx="0">
+            <a:schemeClr val="accent4"/>
+          </a:fillRef>
+          <a:effectRef idx="0">
+            <a:schemeClr val="accent4"/>
+          </a:effectRef>
+          <a:fontRef idx="minor">
+            <a:schemeClr val="tx1"/>
+          </a:fontRef>
+        </p:style>
+      </p:cxnSp>
+      <p:cxnSp>
+        <p:nvCxnSpPr>
+          <p:cNvPr id="46" name="Straight Connector 45">
+            <a:extLst>
+              <a:ext uri="{FF2B5EF4-FFF2-40B4-BE49-F238E27FC236}">
+                <a16:creationId xmlns:a16="http://schemas.microsoft.com/office/drawing/2014/main" id="{B597C30D-F74F-4F36-94ED-C20FAF5C1C6B}"/>
+              </a:ext>
+            </a:extLst>
+          </p:cNvPr>
+          <p:cNvCxnSpPr>
+            <a:cxnSpLocks/>
+          </p:cNvCxnSpPr>
+          <p:nvPr/>
+        </p:nvCxnSpPr>
+        <p:spPr>
+          <a:xfrm flipH="1" flipV="1">
+            <a:off x="10630273" y="2957307"/>
+            <a:ext cx="23607" cy="1653689"/>
+          </a:xfrm>
+          <a:prstGeom prst="line">
+            <a:avLst/>
+          </a:prstGeom>
+        </p:spPr>
+        <p:style>
+          <a:lnRef idx="1">
+            <a:schemeClr val="accent4"/>
+          </a:lnRef>
+          <a:fillRef idx="0">
+            <a:schemeClr val="accent4"/>
+          </a:fillRef>
+          <a:effectRef idx="0">
+            <a:schemeClr val="accent4"/>
+          </a:effectRef>
+          <a:fontRef idx="minor">
+            <a:schemeClr val="tx1"/>
+          </a:fontRef>
+        </p:style>
+      </p:cxnSp>
+      <p:cxnSp>
+        <p:nvCxnSpPr>
+          <p:cNvPr id="50" name="Straight Arrow Connector 49">
+            <a:extLst>
+              <a:ext uri="{FF2B5EF4-FFF2-40B4-BE49-F238E27FC236}">
+                <a16:creationId xmlns:a16="http://schemas.microsoft.com/office/drawing/2014/main" id="{5018F0A2-C414-4008-8BC1-F14101AC6093}"/>
+              </a:ext>
+            </a:extLst>
+          </p:cNvPr>
+          <p:cNvCxnSpPr>
+            <a:cxnSpLocks/>
+          </p:cNvCxnSpPr>
+          <p:nvPr/>
+        </p:nvCxnSpPr>
+        <p:spPr>
+          <a:xfrm flipV="1">
+            <a:off x="6625519" y="4610996"/>
+            <a:ext cx="0" cy="1389537"/>
+          </a:xfrm>
+          <a:prstGeom prst="straightConnector1">
+            <a:avLst/>
+          </a:prstGeom>
+          <a:ln>
+            <a:solidFill>
+              <a:srgbClr val="FFC000"/>
+            </a:solidFill>
+            <a:prstDash val="solid"/>
+            <a:headEnd type="triangle"/>
+            <a:tailEnd type="none"/>
+          </a:ln>
+        </p:spPr>
+        <p:style>
+          <a:lnRef idx="1">
+            <a:schemeClr val="accent1"/>
+          </a:lnRef>
+          <a:fillRef idx="0">
+            <a:schemeClr val="accent1"/>
+          </a:fillRef>
+          <a:effectRef idx="0">
+            <a:schemeClr val="accent1"/>
+          </a:effectRef>
+          <a:fontRef idx="minor">
+            <a:schemeClr val="tx1"/>
+          </a:fontRef>
+        </p:style>
+      </p:cxnSp>
+      <p:cxnSp>
+        <p:nvCxnSpPr>
+          <p:cNvPr id="54" name="Straight Arrow Connector 53">
+            <a:extLst>
+              <a:ext uri="{FF2B5EF4-FFF2-40B4-BE49-F238E27FC236}">
+                <a16:creationId xmlns:a16="http://schemas.microsoft.com/office/drawing/2014/main" id="{5A316980-8B70-4AD5-B827-E9A025560311}"/>
+              </a:ext>
+            </a:extLst>
+          </p:cNvPr>
+          <p:cNvCxnSpPr>
+            <a:cxnSpLocks/>
+            <a:endCxn id="7" idx="1"/>
+          </p:cNvCxnSpPr>
+          <p:nvPr/>
+        </p:nvCxnSpPr>
+        <p:spPr>
+          <a:xfrm>
+            <a:off x="1220392" y="1525112"/>
+            <a:ext cx="4460029" cy="0"/>
+          </a:xfrm>
+          <a:prstGeom prst="straightConnector1">
+            <a:avLst/>
+          </a:prstGeom>
+          <a:ln>
+            <a:tailEnd type="triangle"/>
+          </a:ln>
+        </p:spPr>
+        <p:style>
+          <a:lnRef idx="1">
+            <a:schemeClr val="accent4"/>
+          </a:lnRef>
+          <a:fillRef idx="0">
+            <a:schemeClr val="accent4"/>
+          </a:fillRef>
+          <a:effectRef idx="0">
+            <a:schemeClr val="accent4"/>
+          </a:effectRef>
+          <a:fontRef idx="minor">
+            <a:schemeClr val="tx1"/>
+          </a:fontRef>
+        </p:style>
+      </p:cxnSp>
+      <p:cxnSp>
+        <p:nvCxnSpPr>
+          <p:cNvPr id="25" name="Straight Connector 24">
+            <a:extLst>
+              <a:ext uri="{FF2B5EF4-FFF2-40B4-BE49-F238E27FC236}">
+                <a16:creationId xmlns:a16="http://schemas.microsoft.com/office/drawing/2014/main" id="{F6F597A6-C578-4C62-A573-DFA8DF038339}"/>
+              </a:ext>
+            </a:extLst>
+          </p:cNvPr>
+          <p:cNvCxnSpPr>
+            <a:cxnSpLocks/>
+          </p:cNvCxnSpPr>
+          <p:nvPr/>
+        </p:nvCxnSpPr>
+        <p:spPr>
+          <a:xfrm flipV="1">
+            <a:off x="2482567" y="2261154"/>
+            <a:ext cx="0" cy="377143"/>
+          </a:xfrm>
+          <a:prstGeom prst="line">
+            <a:avLst/>
+          </a:prstGeom>
+        </p:spPr>
+        <p:style>
+          <a:lnRef idx="1">
+            <a:schemeClr val="accent4"/>
+          </a:lnRef>
+          <a:fillRef idx="0">
+            <a:schemeClr val="accent4"/>
+          </a:fillRef>
+          <a:effectRef idx="0">
+            <a:schemeClr val="accent4"/>
+          </a:effectRef>
+          <a:fontRef idx="minor">
+            <a:schemeClr val="tx1"/>
+          </a:fontRef>
+        </p:style>
+      </p:cxnSp>
+      <p:cxnSp>
+        <p:nvCxnSpPr>
+          <p:cNvPr id="29" name="Straight Connector 28">
+            <a:extLst>
+              <a:ext uri="{FF2B5EF4-FFF2-40B4-BE49-F238E27FC236}">
+                <a16:creationId xmlns:a16="http://schemas.microsoft.com/office/drawing/2014/main" id="{88793CDA-DAAA-4BAC-BF86-992D6E72226B}"/>
+              </a:ext>
+            </a:extLst>
+          </p:cNvPr>
+          <p:cNvCxnSpPr>
+            <a:cxnSpLocks/>
+          </p:cNvCxnSpPr>
+          <p:nvPr/>
+        </p:nvCxnSpPr>
+        <p:spPr>
+          <a:xfrm flipH="1" flipV="1">
+            <a:off x="10638107" y="2240319"/>
+            <a:ext cx="6684" cy="421372"/>
+          </a:xfrm>
+          <a:prstGeom prst="line">
+            <a:avLst/>
+          </a:prstGeom>
+        </p:spPr>
+        <p:style>
+          <a:lnRef idx="1">
+            <a:schemeClr val="accent4"/>
+          </a:lnRef>
+          <a:fillRef idx="0">
+            <a:schemeClr val="accent4"/>
+          </a:fillRef>
+          <a:effectRef idx="0">
+            <a:schemeClr val="accent4"/>
+          </a:effectRef>
+          <a:fontRef idx="minor">
+            <a:schemeClr val="tx1"/>
+          </a:fontRef>
+        </p:style>
+      </p:cxnSp>
+      <p:cxnSp>
+        <p:nvCxnSpPr>
+          <p:cNvPr id="30" name="Straight Connector 29">
+            <a:extLst>
+              <a:ext uri="{FF2B5EF4-FFF2-40B4-BE49-F238E27FC236}">
+                <a16:creationId xmlns:a16="http://schemas.microsoft.com/office/drawing/2014/main" id="{4D101FE4-6192-4827-B853-BDBFDB44B5BC}"/>
+              </a:ext>
+            </a:extLst>
+          </p:cNvPr>
+          <p:cNvCxnSpPr>
+            <a:cxnSpLocks/>
+          </p:cNvCxnSpPr>
+          <p:nvPr/>
+        </p:nvCxnSpPr>
+        <p:spPr>
+          <a:xfrm flipV="1">
+            <a:off x="2482567" y="2997413"/>
+            <a:ext cx="0" cy="1613584"/>
+          </a:xfrm>
+          <a:prstGeom prst="line">
+            <a:avLst/>
+          </a:prstGeom>
+        </p:spPr>
+        <p:style>
+          <a:lnRef idx="1">
+            <a:schemeClr val="accent4"/>
+          </a:lnRef>
+          <a:fillRef idx="0">
+            <a:schemeClr val="accent4"/>
+          </a:fillRef>
+          <a:effectRef idx="0">
+            <a:schemeClr val="accent4"/>
+          </a:effectRef>
+          <a:fontRef idx="minor">
+            <a:schemeClr val="tx1"/>
+          </a:fontRef>
+        </p:style>
+      </p:cxnSp>
+      <p:cxnSp>
+        <p:nvCxnSpPr>
+          <p:cNvPr id="27" name="Straight Connector 26">
+            <a:extLst>
+              <a:ext uri="{FF2B5EF4-FFF2-40B4-BE49-F238E27FC236}">
+                <a16:creationId xmlns:a16="http://schemas.microsoft.com/office/drawing/2014/main" id="{0846EC11-0D99-468D-ADE0-0635FF6436B5}"/>
+              </a:ext>
+            </a:extLst>
+          </p:cNvPr>
+          <p:cNvCxnSpPr>
+            <a:cxnSpLocks/>
+            <a:endCxn id="11" idx="2"/>
+          </p:cNvCxnSpPr>
+          <p:nvPr/>
+        </p:nvCxnSpPr>
+        <p:spPr>
+          <a:xfrm flipH="1" flipV="1">
+            <a:off x="6625518" y="3032847"/>
+            <a:ext cx="2" cy="1648866"/>
+          </a:xfrm>
+          <a:prstGeom prst="line">
+            <a:avLst/>
+          </a:prstGeom>
+        </p:spPr>
+        <p:style>
+          <a:lnRef idx="1">
+            <a:schemeClr val="accent4"/>
+          </a:lnRef>
+          <a:fillRef idx="0">
+            <a:schemeClr val="accent4"/>
+          </a:fillRef>
+          <a:effectRef idx="0">
+            <a:schemeClr val="accent4"/>
+          </a:effectRef>
+          <a:fontRef idx="minor">
+            <a:schemeClr val="tx1"/>
+          </a:fontRef>
+        </p:style>
+      </p:cxnSp>
     </p:spTree>
     <p:extLst>
       <p:ext uri="{BB962C8B-B14F-4D97-AF65-F5344CB8AC3E}">
-        <p14:creationId xmlns:p14="http://schemas.microsoft.com/office/powerpoint/2010/main" val="4024204440"/>
+        <p14:creationId xmlns:p14="http://schemas.microsoft.com/office/powerpoint/2010/main" val="1014174321"/>
       </p:ext>
     </p:extLst>
   </p:cSld>
@@ -4832,4 +5140,299 @@
     </a:ext>
   </a:extLst>
 </a:theme>
+</file>
+
+<file path=ppt/theme/theme2.xml><?xml version="1.0" encoding="utf-8"?>
+<a:theme xmlns:a="http://schemas.openxmlformats.org/drawingml/2006/main" name="Office Theme">
+  <a:themeElements>
+    <a:clrScheme name="Office">
+      <a:dk1>
+        <a:sysClr val="windowText" lastClr="000000"/>
+      </a:dk1>
+      <a:lt1>
+        <a:sysClr val="window" lastClr="FFFFFF"/>
+      </a:lt1>
+      <a:dk2>
+        <a:srgbClr val="44546A"/>
+      </a:dk2>
+      <a:lt2>
+        <a:srgbClr val="E7E6E6"/>
+      </a:lt2>
+      <a:accent1>
+        <a:srgbClr val="4472C4"/>
+      </a:accent1>
+      <a:accent2>
+        <a:srgbClr val="ED7D31"/>
+      </a:accent2>
+      <a:accent3>
+        <a:srgbClr val="A5A5A5"/>
+      </a:accent3>
+      <a:accent4>
+        <a:srgbClr val="FFC000"/>
+      </a:accent4>
+      <a:accent5>
+        <a:srgbClr val="5B9BD5"/>
+      </a:accent5>
+      <a:accent6>
+        <a:srgbClr val="70AD47"/>
+      </a:accent6>
+      <a:hlink>
+        <a:srgbClr val="0563C1"/>
+      </a:hlink>
+      <a:folHlink>
+        <a:srgbClr val="954F72"/>
+      </a:folHlink>
+    </a:clrScheme>
+    <a:fontScheme name="Office">
+      <a:majorFont>
+        <a:latin typeface="Calibri Light" panose="020F0302020204030204"/>
+        <a:ea typeface=""/>
+        <a:cs typeface=""/>
+        <a:font script="Jpan" typeface="游ゴシック Light"/>
+        <a:font script="Hang" typeface="맑은 고딕"/>
+        <a:font script="Hans" typeface="等线 Light"/>
+        <a:font script="Hant" typeface="新細明體"/>
+        <a:font script="Arab" typeface="Times New Roman"/>
+        <a:font script="Hebr" typeface="Times New Roman"/>
+        <a:font script="Thai" typeface="Angsana New"/>
+        <a:font script="Ethi" typeface="Nyala"/>
+        <a:font script="Beng" typeface="Vrinda"/>
+        <a:font script="Gujr" typeface="Shruti"/>
+        <a:font script="Khmr" typeface="MoolBoran"/>
+        <a:font script="Knda" typeface="Tunga"/>
+        <a:font script="Guru" typeface="Raavi"/>
+        <a:font script="Cans" typeface="Euphemia"/>
+        <a:font script="Cher" typeface="Plantagenet Cherokee"/>
+        <a:font script="Yiii" typeface="Microsoft Yi Baiti"/>
+        <a:font script="Tibt" typeface="Microsoft Himalaya"/>
+        <a:font script="Thaa" typeface="MV Boli"/>
+        <a:font script="Deva" typeface="Mangal"/>
+        <a:font script="Telu" typeface="Gautami"/>
+        <a:font script="Taml" typeface="Latha"/>
+        <a:font script="Syrc" typeface="Estrangelo Edessa"/>
+        <a:font script="Orya" typeface="Kalinga"/>
+        <a:font script="Mlym" typeface="Kartika"/>
+        <a:font script="Laoo" typeface="DokChampa"/>
+        <a:font script="Sinh" typeface="Iskoola Pota"/>
+        <a:font script="Mong" typeface="Mongolian Baiti"/>
+        <a:font script="Viet" typeface="Times New Roman"/>
+        <a:font script="Uigh" typeface="Microsoft Uighur"/>
+        <a:font script="Geor" typeface="Sylfaen"/>
+        <a:font script="Armn" typeface="Arial"/>
+        <a:font script="Bugi" typeface="Leelawadee UI"/>
+        <a:font script="Bopo" typeface="Microsoft JhengHei"/>
+        <a:font script="Java" typeface="Javanese Text"/>
+        <a:font script="Lisu" typeface="Segoe UI"/>
+        <a:font script="Mymr" typeface="Myanmar Text"/>
+        <a:font script="Nkoo" typeface="Ebrima"/>
+        <a:font script="Olck" typeface="Nirmala UI"/>
+        <a:font script="Osma" typeface="Ebrima"/>
+        <a:font script="Phag" typeface="Phagspa"/>
+        <a:font script="Syrn" typeface="Estrangelo Edessa"/>
+        <a:font script="Syrj" typeface="Estrangelo Edessa"/>
+        <a:font script="Syre" typeface="Estrangelo Edessa"/>
+        <a:font script="Sora" typeface="Nirmala UI"/>
+        <a:font script="Tale" typeface="Microsoft Tai Le"/>
+        <a:font script="Talu" typeface="Microsoft New Tai Lue"/>
+        <a:font script="Tfng" typeface="Ebrima"/>
+      </a:majorFont>
+      <a:minorFont>
+        <a:latin typeface="Calibri" panose="020F0502020204030204"/>
+        <a:ea typeface=""/>
+        <a:cs typeface=""/>
+        <a:font script="Jpan" typeface="游ゴシック"/>
+        <a:font script="Hang" typeface="맑은 고딕"/>
+        <a:font script="Hans" typeface="等线"/>
+        <a:font script="Hant" typeface="新細明體"/>
+        <a:font script="Arab" typeface="Arial"/>
+        <a:font script="Hebr" typeface="Arial"/>
+        <a:font script="Thai" typeface="Cordia New"/>
+        <a:font script="Ethi" typeface="Nyala"/>
+        <a:font script="Beng" typeface="Vrinda"/>
+        <a:font script="Gujr" typeface="Shruti"/>
+        <a:font script="Khmr" typeface="DaunPenh"/>
+        <a:font script="Knda" typeface="Tunga"/>
+        <a:font script="Guru" typeface="Raavi"/>
+        <a:font script="Cans" typeface="Euphemia"/>
+        <a:font script="Cher" typeface="Plantagenet Cherokee"/>
+        <a:font script="Yiii" typeface="Microsoft Yi Baiti"/>
+        <a:font script="Tibt" typeface="Microsoft Himalaya"/>
+        <a:font script="Thaa" typeface="MV Boli"/>
+        <a:font script="Deva" typeface="Mangal"/>
+        <a:font script="Telu" typeface="Gautami"/>
+        <a:font script="Taml" typeface="Latha"/>
+        <a:font script="Syrc" typeface="Estrangelo Edessa"/>
+        <a:font script="Orya" typeface="Kalinga"/>
+        <a:font script="Mlym" typeface="Kartika"/>
+        <a:font script="Laoo" typeface="DokChampa"/>
+        <a:font script="Sinh" typeface="Iskoola Pota"/>
+        <a:font script="Mong" typeface="Mongolian Baiti"/>
+        <a:font script="Viet" typeface="Arial"/>
+        <a:font script="Uigh" typeface="Microsoft Uighur"/>
+        <a:font script="Geor" typeface="Sylfaen"/>
+        <a:font script="Armn" typeface="Arial"/>
+        <a:font script="Bugi" typeface="Leelawadee UI"/>
+        <a:font script="Bopo" typeface="Microsoft JhengHei"/>
+        <a:font script="Java" typeface="Javanese Text"/>
+        <a:font script="Lisu" typeface="Segoe UI"/>
+        <a:font script="Mymr" typeface="Myanmar Text"/>
+        <a:font script="Nkoo" typeface="Ebrima"/>
+        <a:font script="Olck" typeface="Nirmala UI"/>
+        <a:font script="Osma" typeface="Ebrima"/>
+        <a:font script="Phag" typeface="Phagspa"/>
+        <a:font script="Syrn" typeface="Estrangelo Edessa"/>
+        <a:font script="Syrj" typeface="Estrangelo Edessa"/>
+        <a:font script="Syre" typeface="Estrangelo Edessa"/>
+        <a:font script="Sora" typeface="Nirmala UI"/>
+        <a:font script="Tale" typeface="Microsoft Tai Le"/>
+        <a:font script="Talu" typeface="Microsoft New Tai Lue"/>
+        <a:font script="Tfng" typeface="Ebrima"/>
+      </a:minorFont>
+    </a:fontScheme>
+    <a:fmtScheme name="Office">
+      <a:fillStyleLst>
+        <a:solidFill>
+          <a:schemeClr val="phClr"/>
+        </a:solidFill>
+        <a:gradFill rotWithShape="1">
+          <a:gsLst>
+            <a:gs pos="0">
+              <a:schemeClr val="phClr">
+                <a:lumMod val="110000"/>
+                <a:satMod val="105000"/>
+                <a:tint val="67000"/>
+              </a:schemeClr>
+            </a:gs>
+            <a:gs pos="50000">
+              <a:schemeClr val="phClr">
+                <a:lumMod val="105000"/>
+                <a:satMod val="103000"/>
+                <a:tint val="73000"/>
+              </a:schemeClr>
+            </a:gs>
+            <a:gs pos="100000">
+              <a:schemeClr val="phClr">
+                <a:lumMod val="105000"/>
+                <a:satMod val="109000"/>
+                <a:tint val="81000"/>
+              </a:schemeClr>
+            </a:gs>
+          </a:gsLst>
+          <a:lin ang="5400000" scaled="0"/>
+        </a:gradFill>
+        <a:gradFill rotWithShape="1">
+          <a:gsLst>
+            <a:gs pos="0">
+              <a:schemeClr val="phClr">
+                <a:satMod val="103000"/>
+                <a:lumMod val="102000"/>
+                <a:tint val="94000"/>
+              </a:schemeClr>
+            </a:gs>
+            <a:gs pos="50000">
+              <a:schemeClr val="phClr">
+                <a:satMod val="110000"/>
+                <a:lumMod val="100000"/>
+                <a:shade val="100000"/>
+              </a:schemeClr>
+            </a:gs>
+            <a:gs pos="100000">
+              <a:schemeClr val="phClr">
+                <a:lumMod val="99000"/>
+                <a:satMod val="120000"/>
+                <a:shade val="78000"/>
+              </a:schemeClr>
+            </a:gs>
+          </a:gsLst>
+          <a:lin ang="5400000" scaled="0"/>
+        </a:gradFill>
+      </a:fillStyleLst>
+      <a:lnStyleLst>
+        <a:ln w="6350" cap="flat" cmpd="sng" algn="ctr">
+          <a:solidFill>
+            <a:schemeClr val="phClr"/>
+          </a:solidFill>
+          <a:prstDash val="solid"/>
+          <a:miter lim="800000"/>
+        </a:ln>
+        <a:ln w="12700" cap="flat" cmpd="sng" algn="ctr">
+          <a:solidFill>
+            <a:schemeClr val="phClr"/>
+          </a:solidFill>
+          <a:prstDash val="solid"/>
+          <a:miter lim="800000"/>
+        </a:ln>
+        <a:ln w="19050" cap="flat" cmpd="sng" algn="ctr">
+          <a:solidFill>
+            <a:schemeClr val="phClr"/>
+          </a:solidFill>
+          <a:prstDash val="solid"/>
+          <a:miter lim="800000"/>
+        </a:ln>
+      </a:lnStyleLst>
+      <a:effectStyleLst>
+        <a:effectStyle>
+          <a:effectLst/>
+        </a:effectStyle>
+        <a:effectStyle>
+          <a:effectLst/>
+        </a:effectStyle>
+        <a:effectStyle>
+          <a:effectLst>
+            <a:outerShdw blurRad="57150" dist="19050" dir="5400000" algn="ctr" rotWithShape="0">
+              <a:srgbClr val="000000">
+                <a:alpha val="63000"/>
+              </a:srgbClr>
+            </a:outerShdw>
+          </a:effectLst>
+        </a:effectStyle>
+      </a:effectStyleLst>
+      <a:bgFillStyleLst>
+        <a:solidFill>
+          <a:schemeClr val="phClr"/>
+        </a:solidFill>
+        <a:solidFill>
+          <a:schemeClr val="phClr">
+            <a:tint val="95000"/>
+            <a:satMod val="170000"/>
+          </a:schemeClr>
+        </a:solidFill>
+        <a:gradFill rotWithShape="1">
+          <a:gsLst>
+            <a:gs pos="0">
+              <a:schemeClr val="phClr">
+                <a:tint val="93000"/>
+                <a:satMod val="150000"/>
+                <a:shade val="98000"/>
+                <a:lumMod val="102000"/>
+              </a:schemeClr>
+            </a:gs>
+            <a:gs pos="50000">
+              <a:schemeClr val="phClr">
+                <a:tint val="98000"/>
+                <a:satMod val="130000"/>
+                <a:shade val="90000"/>
+                <a:lumMod val="103000"/>
+              </a:schemeClr>
+            </a:gs>
+            <a:gs pos="100000">
+              <a:schemeClr val="phClr">
+                <a:shade val="63000"/>
+                <a:satMod val="120000"/>
+              </a:schemeClr>
+            </a:gs>
+          </a:gsLst>
+          <a:lin ang="5400000" scaled="0"/>
+        </a:gradFill>
+      </a:bgFillStyleLst>
+    </a:fmtScheme>
+  </a:themeElements>
+  <a:objectDefaults/>
+  <a:extraClrSchemeLst/>
+  <a:extLst>
+    <a:ext uri="{05A4C25C-085E-4340-85A3-A5531E510DB2}">
+      <thm15:themeFamily xmlns:thm15="http://schemas.microsoft.com/office/thememl/2012/main" name="Office Theme" id="{62F939B6-93AF-4DB8-9C6B-D6C7DFDC589F}" vid="{4A3C46E8-61CC-4603-A589-7422A47A8E4A}"/>
+    </a:ext>
+  </a:extLst>
+</a:theme>
 </file>
</xml_diff>

<commit_message>
Urgent fixes to storage on jar files
</commit_message>
<xml_diff>
--- a/docs/diagrams/LogicCommandFindPackage.pptx
+++ b/docs/diagrams/LogicCommandFindPackage.pptx
@@ -3784,1056 +3784,1038 @@
           <a:chExt cx="0" cy="0"/>
         </a:xfrm>
       </p:grpSpPr>
-      <p:sp>
-        <p:nvSpPr>
-          <p:cNvPr id="55" name="Rounded Rectangle 145">
-            <a:extLst>
-              <a:ext uri="{FF2B5EF4-FFF2-40B4-BE49-F238E27FC236}">
-                <a16:creationId xmlns:a16="http://schemas.microsoft.com/office/drawing/2014/main" id="{B90B093E-61DD-4276-86F1-FF57ECD0CD3D}"/>
-              </a:ext>
-            </a:extLst>
-          </p:cNvPr>
-          <p:cNvSpPr/>
+      <p:grpSp>
+        <p:nvGrpSpPr>
+          <p:cNvPr id="3" name="Group 2">
+            <a:extLst>
+              <a:ext uri="{FF2B5EF4-FFF2-40B4-BE49-F238E27FC236}">
+                <a16:creationId xmlns:a16="http://schemas.microsoft.com/office/drawing/2014/main" id="{9CFB8160-CF8C-4229-B634-328C9D72C53E}"/>
+              </a:ext>
+            </a:extLst>
+          </p:cNvPr>
+          <p:cNvGrpSpPr/>
           <p:nvPr/>
-        </p:nvSpPr>
-        <p:spPr>
+        </p:nvGrpSpPr>
+        <p:grpSpPr>
           <a:xfrm>
-            <a:off x="1245599" y="283938"/>
-            <a:ext cx="10563167" cy="5590979"/>
+            <a:off x="383233" y="248117"/>
+            <a:ext cx="11425533" cy="6282078"/>
+            <a:chOff x="383233" y="248117"/>
+            <a:chExt cx="11425533" cy="6282078"/>
           </a:xfrm>
-          <a:prstGeom prst="roundRect">
-            <a:avLst>
-              <a:gd name="adj" fmla="val 4363"/>
-            </a:avLst>
-          </a:prstGeom>
-          <a:solidFill>
-            <a:schemeClr val="accent4">
-              <a:lumMod val="20000"/>
-              <a:lumOff val="80000"/>
-            </a:schemeClr>
-          </a:solidFill>
-          <a:ln>
+        </p:grpSpPr>
+        <p:sp>
+          <p:nvSpPr>
+            <p:cNvPr id="55" name="Rounded Rectangle 145">
+              <a:extLst>
+                <a:ext uri="{FF2B5EF4-FFF2-40B4-BE49-F238E27FC236}">
+                  <a16:creationId xmlns:a16="http://schemas.microsoft.com/office/drawing/2014/main" id="{B90B093E-61DD-4276-86F1-FF57ECD0CD3D}"/>
+                </a:ext>
+              </a:extLst>
+            </p:cNvPr>
+            <p:cNvSpPr/>
+            <p:nvPr/>
+          </p:nvSpPr>
+          <p:spPr>
+            <a:xfrm>
+              <a:off x="1245599" y="283938"/>
+              <a:ext cx="10563167" cy="5590979"/>
+            </a:xfrm>
+            <a:prstGeom prst="roundRect">
+              <a:avLst>
+                <a:gd name="adj" fmla="val 4363"/>
+              </a:avLst>
+            </a:prstGeom>
             <a:solidFill>
               <a:schemeClr val="accent4">
                 <a:lumMod val="20000"/>
                 <a:lumOff val="80000"/>
               </a:schemeClr>
             </a:solidFill>
-            <a:prstDash val="solid"/>
-          </a:ln>
-        </p:spPr>
-        <p:style>
-          <a:lnRef idx="2">
-            <a:schemeClr val="accent1">
-              <a:shade val="50000"/>
-            </a:schemeClr>
-          </a:lnRef>
-          <a:fillRef idx="1">
-            <a:schemeClr val="accent1"/>
-          </a:fillRef>
-          <a:effectRef idx="0">
-            <a:schemeClr val="accent1"/>
-          </a:effectRef>
-          <a:fontRef idx="minor">
-            <a:schemeClr val="lt1"/>
-          </a:fontRef>
-        </p:style>
-        <p:txBody>
-          <a:bodyPr rtlCol="0" anchor="ctr"/>
-          <a:lstStyle/>
-          <a:p>
-            <a:pPr algn="ctr"/>
-            <a:endParaRPr lang="en-US"/>
-          </a:p>
-        </p:txBody>
-      </p:sp>
-      <p:sp>
-        <p:nvSpPr>
-          <p:cNvPr id="114" name="TextBox 113">
-            <a:extLst>
-              <a:ext uri="{FF2B5EF4-FFF2-40B4-BE49-F238E27FC236}">
-                <a16:creationId xmlns:a16="http://schemas.microsoft.com/office/drawing/2014/main" id="{17298479-E675-4BC0-A8E2-E0C55B489B0B}"/>
-              </a:ext>
-            </a:extLst>
-          </p:cNvPr>
-          <p:cNvSpPr txBox="1"/>
-          <p:nvPr/>
-        </p:nvSpPr>
-        <p:spPr>
-          <a:xfrm>
-            <a:off x="1303421" y="248117"/>
-            <a:ext cx="3227358" cy="369332"/>
-          </a:xfrm>
-          <a:prstGeom prst="rect">
-            <a:avLst/>
-          </a:prstGeom>
-          <a:noFill/>
-        </p:spPr>
-        <p:txBody>
-          <a:bodyPr wrap="none" rtlCol="0">
-            <a:spAutoFit/>
-          </a:bodyPr>
-          <a:lstStyle/>
-          <a:p>
-            <a:r>
-              <a:rPr lang="en-US" b="1" dirty="0"/>
-              <a:t>Logic, Command, Find Package</a:t>
-            </a:r>
-          </a:p>
-        </p:txBody>
-      </p:sp>
-      <p:sp>
-        <p:nvSpPr>
-          <p:cNvPr id="26" name="Rounded Rectangle 144">
-            <a:extLst>
-              <a:ext uri="{FF2B5EF4-FFF2-40B4-BE49-F238E27FC236}">
-                <a16:creationId xmlns:a16="http://schemas.microsoft.com/office/drawing/2014/main" id="{0771A240-A5D8-4093-A18A-5AC912607234}"/>
-              </a:ext>
-            </a:extLst>
-          </p:cNvPr>
-          <p:cNvSpPr/>
-          <p:nvPr/>
-        </p:nvSpPr>
-        <p:spPr>
-          <a:xfrm>
-            <a:off x="1303421" y="6000533"/>
-            <a:ext cx="10483775" cy="529662"/>
-          </a:xfrm>
-          <a:prstGeom prst="roundRect">
-            <a:avLst/>
-          </a:prstGeom>
-          <a:solidFill>
-            <a:schemeClr val="accent5">
-              <a:lumMod val="60000"/>
-              <a:lumOff val="40000"/>
-            </a:schemeClr>
-          </a:solidFill>
-          <a:ln>
+            <a:ln>
+              <a:solidFill>
+                <a:schemeClr val="accent4">
+                  <a:lumMod val="20000"/>
+                  <a:lumOff val="80000"/>
+                </a:schemeClr>
+              </a:solidFill>
+              <a:prstDash val="solid"/>
+            </a:ln>
+          </p:spPr>
+          <p:style>
+            <a:lnRef idx="2">
+              <a:schemeClr val="accent1">
+                <a:shade val="50000"/>
+              </a:schemeClr>
+            </a:lnRef>
+            <a:fillRef idx="1">
+              <a:schemeClr val="accent1"/>
+            </a:fillRef>
+            <a:effectRef idx="0">
+              <a:schemeClr val="accent1"/>
+            </a:effectRef>
+            <a:fontRef idx="minor">
+              <a:schemeClr val="lt1"/>
+            </a:fontRef>
+          </p:style>
+          <p:txBody>
+            <a:bodyPr rtlCol="0" anchor="ctr"/>
+            <a:lstStyle/>
+            <a:p>
+              <a:pPr algn="ctr"/>
+              <a:endParaRPr lang="en-US"/>
+            </a:p>
+          </p:txBody>
+        </p:sp>
+        <p:sp>
+          <p:nvSpPr>
+            <p:cNvPr id="114" name="TextBox 113">
+              <a:extLst>
+                <a:ext uri="{FF2B5EF4-FFF2-40B4-BE49-F238E27FC236}">
+                  <a16:creationId xmlns:a16="http://schemas.microsoft.com/office/drawing/2014/main" id="{17298479-E675-4BC0-A8E2-E0C55B489B0B}"/>
+                </a:ext>
+              </a:extLst>
+            </p:cNvPr>
+            <p:cNvSpPr txBox="1"/>
+            <p:nvPr/>
+          </p:nvSpPr>
+          <p:spPr>
+            <a:xfrm>
+              <a:off x="1303421" y="248117"/>
+              <a:ext cx="3227358" cy="369332"/>
+            </a:xfrm>
+            <a:prstGeom prst="rect">
+              <a:avLst/>
+            </a:prstGeom>
             <a:noFill/>
-          </a:ln>
-        </p:spPr>
-        <p:style>
-          <a:lnRef idx="2">
-            <a:schemeClr val="accent1">
-              <a:shade val="50000"/>
-            </a:schemeClr>
-          </a:lnRef>
-          <a:fillRef idx="1">
-            <a:schemeClr val="accent1"/>
-          </a:fillRef>
-          <a:effectRef idx="0">
-            <a:schemeClr val="accent1"/>
-          </a:effectRef>
-          <a:fontRef idx="minor">
-            <a:schemeClr val="lt1"/>
-          </a:fontRef>
-        </p:style>
-        <p:txBody>
-          <a:bodyPr rtlCol="0" anchor="ctr"/>
-          <a:lstStyle/>
-          <a:p>
-            <a:pPr algn="ctr"/>
-            <a:r>
-              <a:rPr lang="en-US" sz="1300" b="1">
-                <a:solidFill>
-                  <a:schemeClr val="tx1"/>
-                </a:solidFill>
-                <a:latin typeface="Arial" panose="020B0604020202020204" pitchFamily="34" charset="0"/>
-                <a:cs typeface="Arial" panose="020B0604020202020204" pitchFamily="34" charset="0"/>
-              </a:rPr>
-              <a:t>Model</a:t>
-            </a:r>
-          </a:p>
-        </p:txBody>
-      </p:sp>
-      <p:sp>
-        <p:nvSpPr>
-          <p:cNvPr id="6" name="Rounded Rectangle 12">
-            <a:extLst>
-              <a:ext uri="{FF2B5EF4-FFF2-40B4-BE49-F238E27FC236}">
-                <a16:creationId xmlns:a16="http://schemas.microsoft.com/office/drawing/2014/main" id="{11C4439C-4DC4-4FA3-84E9-7A9227701F03}"/>
-              </a:ext>
-            </a:extLst>
-          </p:cNvPr>
-          <p:cNvSpPr/>
-          <p:nvPr/>
-        </p:nvSpPr>
-        <p:spPr>
-          <a:xfrm rot="16200000">
-            <a:off x="-2045605" y="2712777"/>
-            <a:ext cx="5568378" cy="710702"/>
-          </a:xfrm>
-          <a:prstGeom prst="roundRect">
-            <a:avLst/>
-          </a:prstGeom>
-          <a:solidFill>
-            <a:schemeClr val="accent3">
-              <a:lumMod val="60000"/>
-              <a:lumOff val="40000"/>
-            </a:schemeClr>
-          </a:solidFill>
-          <a:ln>
+          </p:spPr>
+          <p:txBody>
+            <a:bodyPr wrap="none" rtlCol="0">
+              <a:spAutoFit/>
+            </a:bodyPr>
+            <a:lstStyle/>
+            <a:p>
+              <a:r>
+                <a:rPr lang="en-US" b="1" dirty="0"/>
+                <a:t>Logic, Command, Find Package</a:t>
+              </a:r>
+            </a:p>
+          </p:txBody>
+        </p:sp>
+        <p:sp>
+          <p:nvSpPr>
+            <p:cNvPr id="26" name="Rounded Rectangle 144">
+              <a:extLst>
+                <a:ext uri="{FF2B5EF4-FFF2-40B4-BE49-F238E27FC236}">
+                  <a16:creationId xmlns:a16="http://schemas.microsoft.com/office/drawing/2014/main" id="{0771A240-A5D8-4093-A18A-5AC912607234}"/>
+                </a:ext>
+              </a:extLst>
+            </p:cNvPr>
+            <p:cNvSpPr/>
+            <p:nvPr/>
+          </p:nvSpPr>
+          <p:spPr>
+            <a:xfrm>
+              <a:off x="1303421" y="6000533"/>
+              <a:ext cx="10483775" cy="529662"/>
+            </a:xfrm>
+            <a:prstGeom prst="roundRect">
+              <a:avLst/>
+            </a:prstGeom>
+            <a:solidFill>
+              <a:schemeClr val="accent5">
+                <a:lumMod val="60000"/>
+                <a:lumOff val="40000"/>
+              </a:schemeClr>
+            </a:solidFill>
+            <a:ln>
+              <a:noFill/>
+            </a:ln>
+          </p:spPr>
+          <p:style>
+            <a:lnRef idx="2">
+              <a:schemeClr val="accent1">
+                <a:shade val="50000"/>
+              </a:schemeClr>
+            </a:lnRef>
+            <a:fillRef idx="1">
+              <a:schemeClr val="accent1"/>
+            </a:fillRef>
+            <a:effectRef idx="0">
+              <a:schemeClr val="accent1"/>
+            </a:effectRef>
+            <a:fontRef idx="minor">
+              <a:schemeClr val="lt1"/>
+            </a:fontRef>
+          </p:style>
+          <p:txBody>
+            <a:bodyPr rtlCol="0" anchor="ctr"/>
+            <a:lstStyle/>
+            <a:p>
+              <a:pPr algn="ctr"/>
+              <a:r>
+                <a:rPr lang="en-US" sz="1300" b="1">
+                  <a:solidFill>
+                    <a:schemeClr val="tx1"/>
+                  </a:solidFill>
+                  <a:latin typeface="Arial" panose="020B0604020202020204" pitchFamily="34" charset="0"/>
+                  <a:cs typeface="Arial" panose="020B0604020202020204" pitchFamily="34" charset="0"/>
+                </a:rPr>
+                <a:t>Model</a:t>
+              </a:r>
+            </a:p>
+          </p:txBody>
+        </p:sp>
+        <p:sp>
+          <p:nvSpPr>
+            <p:cNvPr id="6" name="Rounded Rectangle 12">
+              <a:extLst>
+                <a:ext uri="{FF2B5EF4-FFF2-40B4-BE49-F238E27FC236}">
+                  <a16:creationId xmlns:a16="http://schemas.microsoft.com/office/drawing/2014/main" id="{11C4439C-4DC4-4FA3-84E9-7A9227701F03}"/>
+                </a:ext>
+              </a:extLst>
+            </p:cNvPr>
+            <p:cNvSpPr/>
+            <p:nvPr/>
+          </p:nvSpPr>
+          <p:spPr>
+            <a:xfrm rot="16200000">
+              <a:off x="-2045605" y="2712777"/>
+              <a:ext cx="5568378" cy="710702"/>
+            </a:xfrm>
+            <a:prstGeom prst="roundRect">
+              <a:avLst/>
+            </a:prstGeom>
             <a:solidFill>
               <a:schemeClr val="accent3">
                 <a:lumMod val="60000"/>
                 <a:lumOff val="40000"/>
               </a:schemeClr>
             </a:solidFill>
-          </a:ln>
-        </p:spPr>
-        <p:style>
-          <a:lnRef idx="2">
-            <a:schemeClr val="accent1">
-              <a:shade val="50000"/>
-            </a:schemeClr>
-          </a:lnRef>
-          <a:fillRef idx="1">
-            <a:schemeClr val="accent1"/>
-          </a:fillRef>
-          <a:effectRef idx="0">
-            <a:schemeClr val="accent1"/>
-          </a:effectRef>
-          <a:fontRef idx="minor">
-            <a:schemeClr val="lt1"/>
-          </a:fontRef>
-        </p:style>
-        <p:txBody>
-          <a:bodyPr rtlCol="0" anchor="ctr"/>
-          <a:lstStyle/>
-          <a:p>
-            <a:pPr algn="ctr"/>
-            <a:r>
-              <a:rPr lang="en-US" sz="1300" b="1">
+            <a:ln>
+              <a:solidFill>
+                <a:schemeClr val="accent3">
+                  <a:lumMod val="60000"/>
+                  <a:lumOff val="40000"/>
+                </a:schemeClr>
+              </a:solidFill>
+            </a:ln>
+          </p:spPr>
+          <p:style>
+            <a:lnRef idx="2">
+              <a:schemeClr val="accent1">
+                <a:shade val="50000"/>
+              </a:schemeClr>
+            </a:lnRef>
+            <a:fillRef idx="1">
+              <a:schemeClr val="accent1"/>
+            </a:fillRef>
+            <a:effectRef idx="0">
+              <a:schemeClr val="accent1"/>
+            </a:effectRef>
+            <a:fontRef idx="minor">
+              <a:schemeClr val="lt1"/>
+            </a:fontRef>
+          </p:style>
+          <p:txBody>
+            <a:bodyPr rtlCol="0" anchor="ctr"/>
+            <a:lstStyle/>
+            <a:p>
+              <a:pPr algn="ctr"/>
+              <a:r>
+                <a:rPr lang="en-US" sz="1300" b="1">
+                  <a:solidFill>
+                    <a:schemeClr val="tx1"/>
+                  </a:solidFill>
+                  <a:latin typeface="Arial" panose="020B0604020202020204" pitchFamily="34" charset="0"/>
+                  <a:cs typeface="Arial" panose="020B0604020202020204" pitchFamily="34" charset="0"/>
+                </a:rPr>
+                <a:t>Main</a:t>
+              </a:r>
+            </a:p>
+          </p:txBody>
+        </p:sp>
+        <p:sp>
+          <p:nvSpPr>
+            <p:cNvPr id="7" name="Rounded Rectangle 14">
+              <a:extLst>
+                <a:ext uri="{FF2B5EF4-FFF2-40B4-BE49-F238E27FC236}">
+                  <a16:creationId xmlns:a16="http://schemas.microsoft.com/office/drawing/2014/main" id="{750E1284-81E9-4C41-B515-A44C4DE3A46A}"/>
+                </a:ext>
+              </a:extLst>
+            </p:cNvPr>
+            <p:cNvSpPr/>
+            <p:nvPr/>
+          </p:nvSpPr>
+          <p:spPr>
+            <a:xfrm>
+              <a:off x="5680421" y="1340446"/>
+              <a:ext cx="1982688" cy="369332"/>
+            </a:xfrm>
+            <a:prstGeom prst="roundRect">
+              <a:avLst>
+                <a:gd name="adj" fmla="val 0"/>
+              </a:avLst>
+            </a:prstGeom>
+            <a:solidFill>
+              <a:srgbClr val="FFC000"/>
+            </a:solidFill>
+            <a:ln>
+              <a:solidFill>
+                <a:srgbClr val="FFC000"/>
+              </a:solidFill>
+            </a:ln>
+          </p:spPr>
+          <p:style>
+            <a:lnRef idx="2">
+              <a:schemeClr val="accent1">
+                <a:shade val="50000"/>
+              </a:schemeClr>
+            </a:lnRef>
+            <a:fillRef idx="1">
+              <a:schemeClr val="accent1"/>
+            </a:fillRef>
+            <a:effectRef idx="0">
+              <a:schemeClr val="accent1"/>
+            </a:effectRef>
+            <a:fontRef idx="minor">
+              <a:schemeClr val="lt1"/>
+            </a:fontRef>
+          </p:style>
+          <p:txBody>
+            <a:bodyPr rtlCol="0" anchor="ctr"/>
+            <a:lstStyle/>
+            <a:p>
+              <a:pPr algn="ctr"/>
+              <a:r>
+                <a:rPr lang="en-US" sz="1300">
+                  <a:solidFill>
+                    <a:schemeClr val="tx1"/>
+                  </a:solidFill>
+                  <a:latin typeface="Arial" panose="020B0604020202020204" pitchFamily="34" charset="0"/>
+                  <a:cs typeface="Arial" panose="020B0604020202020204" pitchFamily="34" charset="0"/>
+                </a:rPr>
+                <a:t>{abstract}</a:t>
+              </a:r>
+            </a:p>
+            <a:p>
+              <a:pPr algn="ctr"/>
+              <a:r>
+                <a:rPr lang="en-US" sz="1300">
+                  <a:solidFill>
+                    <a:schemeClr val="tx1"/>
+                  </a:solidFill>
+                  <a:latin typeface="Arial" panose="020B0604020202020204" pitchFamily="34" charset="0"/>
+                  <a:cs typeface="Arial" panose="020B0604020202020204" pitchFamily="34" charset="0"/>
+                </a:rPr>
+                <a:t>Command</a:t>
+              </a:r>
+            </a:p>
+          </p:txBody>
+        </p:sp>
+        <p:sp>
+          <p:nvSpPr>
+            <p:cNvPr id="10" name="Rounded Rectangle 14">
+              <a:extLst>
+                <a:ext uri="{FF2B5EF4-FFF2-40B4-BE49-F238E27FC236}">
+                  <a16:creationId xmlns:a16="http://schemas.microsoft.com/office/drawing/2014/main" id="{40948013-7B71-4B11-AAB3-DF21F7C857D9}"/>
+                </a:ext>
+              </a:extLst>
+            </p:cNvPr>
+            <p:cNvSpPr/>
+            <p:nvPr/>
+          </p:nvSpPr>
+          <p:spPr>
+            <a:xfrm>
+              <a:off x="1376256" y="2660051"/>
+              <a:ext cx="2290161" cy="342596"/>
+            </a:xfrm>
+            <a:prstGeom prst="roundRect">
+              <a:avLst>
+                <a:gd name="adj" fmla="val 0"/>
+              </a:avLst>
+            </a:prstGeom>
+            <a:solidFill>
+              <a:srgbClr val="FFC000"/>
+            </a:solidFill>
+            <a:ln>
+              <a:solidFill>
+                <a:srgbClr val="FFC000"/>
+              </a:solidFill>
+            </a:ln>
+          </p:spPr>
+          <p:style>
+            <a:lnRef idx="2">
+              <a:schemeClr val="accent1">
+                <a:shade val="50000"/>
+              </a:schemeClr>
+            </a:lnRef>
+            <a:fillRef idx="1">
+              <a:schemeClr val="accent1"/>
+            </a:fillRef>
+            <a:effectRef idx="0">
+              <a:schemeClr val="accent1"/>
+            </a:effectRef>
+            <a:fontRef idx="minor">
+              <a:schemeClr val="lt1"/>
+            </a:fontRef>
+          </p:style>
+          <p:txBody>
+            <a:bodyPr rtlCol="0" anchor="ctr"/>
+            <a:lstStyle/>
+            <a:p>
+              <a:pPr algn="ctr"/>
+              <a:r>
+                <a:rPr lang="en-US" sz="1300">
+                  <a:solidFill>
+                    <a:schemeClr val="tx1"/>
+                  </a:solidFill>
+                  <a:latin typeface="Arial"/>
+                  <a:cs typeface="Arial"/>
+                </a:rPr>
+                <a:t>FindBankOrCardCommand</a:t>
+              </a:r>
+              <a:endParaRPr lang="en-US" sz="1300">
                 <a:solidFill>
                   <a:schemeClr val="tx1"/>
                 </a:solidFill>
                 <a:latin typeface="Arial" panose="020B0604020202020204" pitchFamily="34" charset="0"/>
                 <a:cs typeface="Arial" panose="020B0604020202020204" pitchFamily="34" charset="0"/>
-              </a:rPr>
-              <a:t>Main</a:t>
-            </a:r>
-          </a:p>
-        </p:txBody>
-      </p:sp>
-      <p:sp>
-        <p:nvSpPr>
-          <p:cNvPr id="7" name="Rounded Rectangle 14">
-            <a:extLst>
-              <a:ext uri="{FF2B5EF4-FFF2-40B4-BE49-F238E27FC236}">
-                <a16:creationId xmlns:a16="http://schemas.microsoft.com/office/drawing/2014/main" id="{750E1284-81E9-4C41-B515-A44C4DE3A46A}"/>
-              </a:ext>
-            </a:extLst>
-          </p:cNvPr>
-          <p:cNvSpPr/>
-          <p:nvPr/>
-        </p:nvSpPr>
-        <p:spPr>
-          <a:xfrm>
-            <a:off x="5680421" y="1340446"/>
-            <a:ext cx="1982688" cy="369332"/>
-          </a:xfrm>
-          <a:prstGeom prst="roundRect">
-            <a:avLst>
-              <a:gd name="adj" fmla="val 0"/>
-            </a:avLst>
-          </a:prstGeom>
-          <a:solidFill>
-            <a:srgbClr val="FFC000"/>
-          </a:solidFill>
-          <a:ln>
+              </a:endParaRPr>
+            </a:p>
+          </p:txBody>
+        </p:sp>
+        <p:sp>
+          <p:nvSpPr>
+            <p:cNvPr id="11" name="Rounded Rectangle 14">
+              <a:extLst>
+                <a:ext uri="{FF2B5EF4-FFF2-40B4-BE49-F238E27FC236}">
+                  <a16:creationId xmlns:a16="http://schemas.microsoft.com/office/drawing/2014/main" id="{614726BF-74B4-47B0-A177-491067EDB194}"/>
+                </a:ext>
+              </a:extLst>
+            </p:cNvPr>
+            <p:cNvSpPr/>
+            <p:nvPr/>
+          </p:nvSpPr>
+          <p:spPr>
+            <a:xfrm>
+              <a:off x="5360121" y="2656831"/>
+              <a:ext cx="2530793" cy="376016"/>
+            </a:xfrm>
+            <a:prstGeom prst="roundRect">
+              <a:avLst>
+                <a:gd name="adj" fmla="val 0"/>
+              </a:avLst>
+            </a:prstGeom>
             <a:solidFill>
               <a:srgbClr val="FFC000"/>
             </a:solidFill>
-          </a:ln>
-        </p:spPr>
-        <p:style>
-          <a:lnRef idx="2">
-            <a:schemeClr val="accent1">
-              <a:shade val="50000"/>
-            </a:schemeClr>
-          </a:lnRef>
-          <a:fillRef idx="1">
-            <a:schemeClr val="accent1"/>
-          </a:fillRef>
-          <a:effectRef idx="0">
-            <a:schemeClr val="accent1"/>
-          </a:effectRef>
-          <a:fontRef idx="minor">
-            <a:schemeClr val="lt1"/>
-          </a:fontRef>
-        </p:style>
-        <p:txBody>
-          <a:bodyPr rtlCol="0" anchor="ctr"/>
-          <a:lstStyle/>
-          <a:p>
-            <a:pPr algn="ctr"/>
-            <a:r>
-              <a:rPr lang="en-US" sz="1300">
+            <a:ln>
+              <a:solidFill>
+                <a:srgbClr val="FFC000"/>
+              </a:solidFill>
+            </a:ln>
+          </p:spPr>
+          <p:style>
+            <a:lnRef idx="2">
+              <a:schemeClr val="accent1">
+                <a:shade val="50000"/>
+              </a:schemeClr>
+            </a:lnRef>
+            <a:fillRef idx="1">
+              <a:schemeClr val="accent1"/>
+            </a:fillRef>
+            <a:effectRef idx="0">
+              <a:schemeClr val="accent1"/>
+            </a:effectRef>
+            <a:fontRef idx="minor">
+              <a:schemeClr val="lt1"/>
+            </a:fontRef>
+          </p:style>
+          <p:txBody>
+            <a:bodyPr rtlCol="0" anchor="ctr"/>
+            <a:lstStyle/>
+            <a:p>
+              <a:pPr algn="ctr"/>
+              <a:r>
+                <a:rPr lang="en-US" sz="1300" dirty="0">
+                  <a:solidFill>
+                    <a:schemeClr val="tx1"/>
+                  </a:solidFill>
+                  <a:latin typeface="Arial"/>
+                  <a:cs typeface="Arial"/>
+                </a:rPr>
+                <a:t>FindTransactionCommand</a:t>
+              </a:r>
+              <a:endParaRPr lang="en-US" sz="1300" dirty="0">
                 <a:solidFill>
                   <a:schemeClr val="tx1"/>
                 </a:solidFill>
                 <a:latin typeface="Arial" panose="020B0604020202020204" pitchFamily="34" charset="0"/>
                 <a:cs typeface="Arial" panose="020B0604020202020204" pitchFamily="34" charset="0"/>
-              </a:rPr>
-              <a:t>{abstract}</a:t>
-            </a:r>
-          </a:p>
-          <a:p>
-            <a:pPr algn="ctr"/>
-            <a:r>
-              <a:rPr lang="en-US" sz="1300">
+              </a:endParaRPr>
+            </a:p>
+          </p:txBody>
+        </p:sp>
+        <p:sp>
+          <p:nvSpPr>
+            <p:cNvPr id="13" name="Rounded Rectangle 14">
+              <a:extLst>
+                <a:ext uri="{FF2B5EF4-FFF2-40B4-BE49-F238E27FC236}">
+                  <a16:creationId xmlns:a16="http://schemas.microsoft.com/office/drawing/2014/main" id="{5BDCC9E2-4684-41B2-85CD-415F73D25C00}"/>
+                </a:ext>
+              </a:extLst>
+            </p:cNvPr>
+            <p:cNvSpPr/>
+            <p:nvPr/>
+          </p:nvSpPr>
+          <p:spPr>
+            <a:xfrm>
+              <a:off x="9682590" y="2621396"/>
+              <a:ext cx="1982688" cy="369332"/>
+            </a:xfrm>
+            <a:prstGeom prst="roundRect">
+              <a:avLst>
+                <a:gd name="adj" fmla="val 0"/>
+              </a:avLst>
+            </a:prstGeom>
+            <a:solidFill>
+              <a:srgbClr val="FFC000"/>
+            </a:solidFill>
+            <a:ln>
+              <a:solidFill>
+                <a:srgbClr val="FFC000"/>
+              </a:solidFill>
+            </a:ln>
+          </p:spPr>
+          <p:style>
+            <a:lnRef idx="2">
+              <a:schemeClr val="accent1">
+                <a:shade val="50000"/>
+              </a:schemeClr>
+            </a:lnRef>
+            <a:fillRef idx="1">
+              <a:schemeClr val="accent1"/>
+            </a:fillRef>
+            <a:effectRef idx="0">
+              <a:schemeClr val="accent1"/>
+            </a:effectRef>
+            <a:fontRef idx="minor">
+              <a:schemeClr val="lt1"/>
+            </a:fontRef>
+          </p:style>
+          <p:txBody>
+            <a:bodyPr rtlCol="0" anchor="ctr"/>
+            <a:lstStyle/>
+            <a:p>
+              <a:pPr algn="ctr"/>
+              <a:r>
+                <a:rPr lang="en-US" sz="1300">
+                  <a:solidFill>
+                    <a:schemeClr val="tx1"/>
+                  </a:solidFill>
+                  <a:latin typeface="Arial"/>
+                  <a:cs typeface="Arial"/>
+                </a:rPr>
+                <a:t>FindBondCommand</a:t>
+              </a:r>
+              <a:endParaRPr lang="en-US" sz="1300">
                 <a:solidFill>
                   <a:schemeClr val="tx1"/>
                 </a:solidFill>
                 <a:latin typeface="Arial" panose="020B0604020202020204" pitchFamily="34" charset="0"/>
                 <a:cs typeface="Arial" panose="020B0604020202020204" pitchFamily="34" charset="0"/>
-              </a:rPr>
-              <a:t>Command</a:t>
-            </a:r>
-          </a:p>
-        </p:txBody>
-      </p:sp>
-      <p:sp>
-        <p:nvSpPr>
-          <p:cNvPr id="10" name="Rounded Rectangle 14">
-            <a:extLst>
-              <a:ext uri="{FF2B5EF4-FFF2-40B4-BE49-F238E27FC236}">
-                <a16:creationId xmlns:a16="http://schemas.microsoft.com/office/drawing/2014/main" id="{40948013-7B71-4B11-AAB3-DF21F7C857D9}"/>
-              </a:ext>
-            </a:extLst>
-          </p:cNvPr>
-          <p:cNvSpPr/>
-          <p:nvPr/>
-        </p:nvSpPr>
-        <p:spPr>
-          <a:xfrm>
-            <a:off x="1376256" y="2660051"/>
-            <a:ext cx="2290161" cy="342596"/>
-          </a:xfrm>
-          <a:prstGeom prst="roundRect">
-            <a:avLst>
-              <a:gd name="adj" fmla="val 0"/>
-            </a:avLst>
-          </a:prstGeom>
-          <a:solidFill>
-            <a:srgbClr val="FFC000"/>
-          </a:solidFill>
-          <a:ln>
-            <a:solidFill>
-              <a:srgbClr val="FFC000"/>
-            </a:solidFill>
-          </a:ln>
-        </p:spPr>
-        <p:style>
-          <a:lnRef idx="2">
-            <a:schemeClr val="accent1">
-              <a:shade val="50000"/>
-            </a:schemeClr>
-          </a:lnRef>
-          <a:fillRef idx="1">
-            <a:schemeClr val="accent1"/>
-          </a:fillRef>
-          <a:effectRef idx="0">
-            <a:schemeClr val="accent1"/>
-          </a:effectRef>
-          <a:fontRef idx="minor">
-            <a:schemeClr val="lt1"/>
-          </a:fontRef>
-        </p:style>
-        <p:txBody>
-          <a:bodyPr rtlCol="0" anchor="ctr"/>
-          <a:lstStyle/>
-          <a:p>
-            <a:pPr algn="ctr"/>
-            <a:r>
-              <a:rPr lang="en-US" sz="1300">
-                <a:solidFill>
-                  <a:schemeClr val="tx1"/>
-                </a:solidFill>
-                <a:latin typeface="Arial"/>
-                <a:cs typeface="Arial"/>
-              </a:rPr>
-              <a:t>FindBankOrCardCommand</a:t>
-            </a:r>
-            <a:endParaRPr lang="en-US" sz="1300">
+              </a:endParaRPr>
+            </a:p>
+          </p:txBody>
+        </p:sp>
+        <p:sp>
+          <p:nvSpPr>
+            <p:cNvPr id="15" name="Triangle 55">
+              <a:extLst>
+                <a:ext uri="{FF2B5EF4-FFF2-40B4-BE49-F238E27FC236}">
+                  <a16:creationId xmlns:a16="http://schemas.microsoft.com/office/drawing/2014/main" id="{572E674F-2A21-42AA-BE26-E06D49C273EC}"/>
+                </a:ext>
+              </a:extLst>
+            </p:cNvPr>
+            <p:cNvSpPr/>
+            <p:nvPr/>
+          </p:nvSpPr>
+          <p:spPr>
+            <a:xfrm>
+              <a:off x="6529711" y="1754781"/>
+              <a:ext cx="238306" cy="98868"/>
+            </a:xfrm>
+            <a:prstGeom prst="triangle">
+              <a:avLst/>
+            </a:prstGeom>
+            <a:noFill/>
+            <a:ln>
               <a:solidFill>
-                <a:schemeClr val="tx1"/>
+                <a:srgbClr val="FFC000"/>
               </a:solidFill>
-              <a:latin typeface="Arial" panose="020B0604020202020204" pitchFamily="34" charset="0"/>
-              <a:cs typeface="Arial" panose="020B0604020202020204" pitchFamily="34" charset="0"/>
-            </a:endParaRPr>
-          </a:p>
-        </p:txBody>
-      </p:sp>
-      <p:sp>
-        <p:nvSpPr>
-          <p:cNvPr id="11" name="Rounded Rectangle 14">
-            <a:extLst>
-              <a:ext uri="{FF2B5EF4-FFF2-40B4-BE49-F238E27FC236}">
-                <a16:creationId xmlns:a16="http://schemas.microsoft.com/office/drawing/2014/main" id="{614726BF-74B4-47B0-A177-491067EDB194}"/>
-              </a:ext>
-            </a:extLst>
-          </p:cNvPr>
-          <p:cNvSpPr/>
-          <p:nvPr/>
-        </p:nvSpPr>
-        <p:spPr>
-          <a:xfrm>
-            <a:off x="5360121" y="2656831"/>
-            <a:ext cx="2530793" cy="376016"/>
-          </a:xfrm>
-          <a:prstGeom prst="roundRect">
-            <a:avLst>
-              <a:gd name="adj" fmla="val 0"/>
-            </a:avLst>
-          </a:prstGeom>
-          <a:solidFill>
-            <a:srgbClr val="FFC000"/>
-          </a:solidFill>
-          <a:ln>
-            <a:solidFill>
-              <a:srgbClr val="FFC000"/>
-            </a:solidFill>
-          </a:ln>
-        </p:spPr>
-        <p:style>
-          <a:lnRef idx="2">
-            <a:schemeClr val="accent1">
-              <a:shade val="50000"/>
-            </a:schemeClr>
-          </a:lnRef>
-          <a:fillRef idx="1">
-            <a:schemeClr val="accent1"/>
-          </a:fillRef>
-          <a:effectRef idx="0">
-            <a:schemeClr val="accent1"/>
-          </a:effectRef>
-          <a:fontRef idx="minor">
-            <a:schemeClr val="lt1"/>
-          </a:fontRef>
-        </p:style>
-        <p:txBody>
-          <a:bodyPr rtlCol="0" anchor="ctr"/>
-          <a:lstStyle/>
-          <a:p>
-            <a:pPr algn="ctr"/>
-            <a:r>
-              <a:rPr lang="en-US" sz="1300" dirty="0">
-                <a:solidFill>
-                  <a:schemeClr val="tx1"/>
-                </a:solidFill>
-                <a:latin typeface="Arial"/>
-                <a:cs typeface="Arial"/>
-              </a:rPr>
-              <a:t>FindTransactionCommand</a:t>
-            </a:r>
-            <a:endParaRPr lang="en-US" sz="1300" dirty="0">
+            </a:ln>
+          </p:spPr>
+          <p:style>
+            <a:lnRef idx="2">
+              <a:schemeClr val="accent1">
+                <a:shade val="50000"/>
+              </a:schemeClr>
+            </a:lnRef>
+            <a:fillRef idx="1">
+              <a:schemeClr val="accent1"/>
+            </a:fillRef>
+            <a:effectRef idx="0">
+              <a:schemeClr val="accent1"/>
+            </a:effectRef>
+            <a:fontRef idx="minor">
+              <a:schemeClr val="lt1"/>
+            </a:fontRef>
+          </p:style>
+          <p:txBody>
+            <a:bodyPr rtlCol="0" anchor="ctr"/>
+            <a:lstStyle/>
+            <a:p>
+              <a:pPr algn="ctr"/>
+              <a:endParaRPr lang="en-US" sz="1300">
+                <a:latin typeface="Arial" panose="020B0604020202020204" pitchFamily="34" charset="0"/>
+                <a:cs typeface="Arial" panose="020B0604020202020204" pitchFamily="34" charset="0"/>
+              </a:endParaRPr>
+            </a:p>
+          </p:txBody>
+        </p:sp>
+        <p:cxnSp>
+          <p:nvCxnSpPr>
+            <p:cNvPr id="5" name="Straight Connector 4">
+              <a:extLst>
+                <a:ext uri="{FF2B5EF4-FFF2-40B4-BE49-F238E27FC236}">
+                  <a16:creationId xmlns:a16="http://schemas.microsoft.com/office/drawing/2014/main" id="{AB5C86C6-6C48-41CC-8A7E-AA3FB97C9973}"/>
+                </a:ext>
+              </a:extLst>
+            </p:cNvPr>
+            <p:cNvCxnSpPr>
+              <a:cxnSpLocks/>
+            </p:cNvCxnSpPr>
+            <p:nvPr/>
+          </p:nvCxnSpPr>
+          <p:spPr>
+            <a:xfrm flipV="1">
+              <a:off x="2474548" y="2233635"/>
+              <a:ext cx="8179332" cy="53472"/>
+            </a:xfrm>
+            <a:prstGeom prst="line">
+              <a:avLst/>
+            </a:prstGeom>
+          </p:spPr>
+          <p:style>
+            <a:lnRef idx="1">
+              <a:schemeClr val="accent4"/>
+            </a:lnRef>
+            <a:fillRef idx="0">
+              <a:schemeClr val="accent4"/>
+            </a:fillRef>
+            <a:effectRef idx="0">
+              <a:schemeClr val="accent4"/>
+            </a:effectRef>
+            <a:fontRef idx="minor">
+              <a:schemeClr val="tx1"/>
+            </a:fontRef>
+          </p:style>
+        </p:cxnSp>
+        <p:cxnSp>
+          <p:nvCxnSpPr>
+            <p:cNvPr id="20" name="Straight Connector 19">
+              <a:extLst>
+                <a:ext uri="{FF2B5EF4-FFF2-40B4-BE49-F238E27FC236}">
+                  <a16:creationId xmlns:a16="http://schemas.microsoft.com/office/drawing/2014/main" id="{C39938B6-0026-41C0-8A83-31CE2B474A04}"/>
+                </a:ext>
+              </a:extLst>
+            </p:cNvPr>
+            <p:cNvCxnSpPr>
+              <a:cxnSpLocks/>
+            </p:cNvCxnSpPr>
+            <p:nvPr/>
+          </p:nvCxnSpPr>
+          <p:spPr>
+            <a:xfrm flipV="1">
+              <a:off x="6648864" y="1853649"/>
+              <a:ext cx="0" cy="406722"/>
+            </a:xfrm>
+            <a:prstGeom prst="line">
+              <a:avLst/>
+            </a:prstGeom>
+          </p:spPr>
+          <p:style>
+            <a:lnRef idx="1">
+              <a:schemeClr val="accent4"/>
+            </a:lnRef>
+            <a:fillRef idx="0">
+              <a:schemeClr val="accent4"/>
+            </a:fillRef>
+            <a:effectRef idx="0">
+              <a:schemeClr val="accent4"/>
+            </a:effectRef>
+            <a:fontRef idx="minor">
+              <a:schemeClr val="tx1"/>
+            </a:fontRef>
+          </p:style>
+        </p:cxnSp>
+        <p:cxnSp>
+          <p:nvCxnSpPr>
+            <p:cNvPr id="31" name="Straight Connector 30">
+              <a:extLst>
+                <a:ext uri="{FF2B5EF4-FFF2-40B4-BE49-F238E27FC236}">
+                  <a16:creationId xmlns:a16="http://schemas.microsoft.com/office/drawing/2014/main" id="{AA2A8D5C-66C2-4281-9070-B687F505609C}"/>
+                </a:ext>
+              </a:extLst>
+            </p:cNvPr>
+            <p:cNvCxnSpPr>
+              <a:cxnSpLocks/>
+            </p:cNvCxnSpPr>
+            <p:nvPr/>
+          </p:nvCxnSpPr>
+          <p:spPr>
+            <a:xfrm flipH="1" flipV="1">
+              <a:off x="6649845" y="2287009"/>
+              <a:ext cx="6684" cy="421372"/>
+            </a:xfrm>
+            <a:prstGeom prst="line">
+              <a:avLst/>
+            </a:prstGeom>
+          </p:spPr>
+          <p:style>
+            <a:lnRef idx="1">
+              <a:schemeClr val="accent4"/>
+            </a:lnRef>
+            <a:fillRef idx="0">
+              <a:schemeClr val="accent4"/>
+            </a:fillRef>
+            <a:effectRef idx="0">
+              <a:schemeClr val="accent4"/>
+            </a:effectRef>
+            <a:fontRef idx="minor">
+              <a:schemeClr val="tx1"/>
+            </a:fontRef>
+          </p:style>
+        </p:cxnSp>
+        <p:cxnSp>
+          <p:nvCxnSpPr>
+            <p:cNvPr id="39" name="Straight Connector 38">
+              <a:extLst>
+                <a:ext uri="{FF2B5EF4-FFF2-40B4-BE49-F238E27FC236}">
+                  <a16:creationId xmlns:a16="http://schemas.microsoft.com/office/drawing/2014/main" id="{21A35BB4-0DBE-4B61-9042-C63F34F6B8C0}"/>
+                </a:ext>
+              </a:extLst>
+            </p:cNvPr>
+            <p:cNvCxnSpPr>
+              <a:cxnSpLocks/>
+            </p:cNvCxnSpPr>
+            <p:nvPr/>
+          </p:nvCxnSpPr>
+          <p:spPr>
+            <a:xfrm>
+              <a:off x="2487916" y="4604313"/>
+              <a:ext cx="8165964" cy="6683"/>
+            </a:xfrm>
+            <a:prstGeom prst="line">
+              <a:avLst/>
+            </a:prstGeom>
+          </p:spPr>
+          <p:style>
+            <a:lnRef idx="1">
+              <a:schemeClr val="accent4"/>
+            </a:lnRef>
+            <a:fillRef idx="0">
+              <a:schemeClr val="accent4"/>
+            </a:fillRef>
+            <a:effectRef idx="0">
+              <a:schemeClr val="accent4"/>
+            </a:effectRef>
+            <a:fontRef idx="minor">
+              <a:schemeClr val="tx1"/>
+            </a:fontRef>
+          </p:style>
+        </p:cxnSp>
+        <p:cxnSp>
+          <p:nvCxnSpPr>
+            <p:cNvPr id="46" name="Straight Connector 45">
+              <a:extLst>
+                <a:ext uri="{FF2B5EF4-FFF2-40B4-BE49-F238E27FC236}">
+                  <a16:creationId xmlns:a16="http://schemas.microsoft.com/office/drawing/2014/main" id="{B597C30D-F74F-4F36-94ED-C20FAF5C1C6B}"/>
+                </a:ext>
+              </a:extLst>
+            </p:cNvPr>
+            <p:cNvCxnSpPr>
+              <a:cxnSpLocks/>
+            </p:cNvCxnSpPr>
+            <p:nvPr/>
+          </p:nvCxnSpPr>
+          <p:spPr>
+            <a:xfrm flipH="1" flipV="1">
+              <a:off x="10630273" y="2957307"/>
+              <a:ext cx="23607" cy="1653689"/>
+            </a:xfrm>
+            <a:prstGeom prst="line">
+              <a:avLst/>
+            </a:prstGeom>
+          </p:spPr>
+          <p:style>
+            <a:lnRef idx="1">
+              <a:schemeClr val="accent4"/>
+            </a:lnRef>
+            <a:fillRef idx="0">
+              <a:schemeClr val="accent4"/>
+            </a:fillRef>
+            <a:effectRef idx="0">
+              <a:schemeClr val="accent4"/>
+            </a:effectRef>
+            <a:fontRef idx="minor">
+              <a:schemeClr val="tx1"/>
+            </a:fontRef>
+          </p:style>
+        </p:cxnSp>
+        <p:cxnSp>
+          <p:nvCxnSpPr>
+            <p:cNvPr id="50" name="Straight Arrow Connector 49">
+              <a:extLst>
+                <a:ext uri="{FF2B5EF4-FFF2-40B4-BE49-F238E27FC236}">
+                  <a16:creationId xmlns:a16="http://schemas.microsoft.com/office/drawing/2014/main" id="{5018F0A2-C414-4008-8BC1-F14101AC6093}"/>
+                </a:ext>
+              </a:extLst>
+            </p:cNvPr>
+            <p:cNvCxnSpPr>
+              <a:cxnSpLocks/>
+            </p:cNvCxnSpPr>
+            <p:nvPr/>
+          </p:nvCxnSpPr>
+          <p:spPr>
+            <a:xfrm flipV="1">
+              <a:off x="6625519" y="4610996"/>
+              <a:ext cx="0" cy="1389537"/>
+            </a:xfrm>
+            <a:prstGeom prst="straightConnector1">
+              <a:avLst/>
+            </a:prstGeom>
+            <a:ln>
               <a:solidFill>
-                <a:schemeClr val="tx1"/>
+                <a:srgbClr val="FFC000"/>
               </a:solidFill>
-              <a:latin typeface="Arial" panose="020B0604020202020204" pitchFamily="34" charset="0"/>
-              <a:cs typeface="Arial" panose="020B0604020202020204" pitchFamily="34" charset="0"/>
-            </a:endParaRPr>
-          </a:p>
-        </p:txBody>
-      </p:sp>
-      <p:sp>
-        <p:nvSpPr>
-          <p:cNvPr id="13" name="Rounded Rectangle 14">
-            <a:extLst>
-              <a:ext uri="{FF2B5EF4-FFF2-40B4-BE49-F238E27FC236}">
-                <a16:creationId xmlns:a16="http://schemas.microsoft.com/office/drawing/2014/main" id="{5BDCC9E2-4684-41B2-85CD-415F73D25C00}"/>
-              </a:ext>
-            </a:extLst>
-          </p:cNvPr>
-          <p:cNvSpPr/>
-          <p:nvPr/>
-        </p:nvSpPr>
-        <p:spPr>
-          <a:xfrm>
-            <a:off x="9682590" y="2621396"/>
-            <a:ext cx="1982688" cy="369332"/>
-          </a:xfrm>
-          <a:prstGeom prst="roundRect">
-            <a:avLst>
-              <a:gd name="adj" fmla="val 0"/>
-            </a:avLst>
-          </a:prstGeom>
-          <a:solidFill>
-            <a:srgbClr val="FFC000"/>
-          </a:solidFill>
-          <a:ln>
-            <a:solidFill>
-              <a:srgbClr val="FFC000"/>
-            </a:solidFill>
-          </a:ln>
-        </p:spPr>
-        <p:style>
-          <a:lnRef idx="2">
-            <a:schemeClr val="accent1">
-              <a:shade val="50000"/>
-            </a:schemeClr>
-          </a:lnRef>
-          <a:fillRef idx="1">
-            <a:schemeClr val="accent1"/>
-          </a:fillRef>
-          <a:effectRef idx="0">
-            <a:schemeClr val="accent1"/>
-          </a:effectRef>
-          <a:fontRef idx="minor">
-            <a:schemeClr val="lt1"/>
-          </a:fontRef>
-        </p:style>
-        <p:txBody>
-          <a:bodyPr rtlCol="0" anchor="ctr"/>
-          <a:lstStyle/>
-          <a:p>
-            <a:pPr algn="ctr"/>
-            <a:r>
-              <a:rPr lang="en-US" sz="1300">
-                <a:solidFill>
-                  <a:schemeClr val="tx1"/>
-                </a:solidFill>
-                <a:latin typeface="Arial"/>
-                <a:cs typeface="Arial"/>
-              </a:rPr>
-              <a:t>FindBondCommand</a:t>
-            </a:r>
-            <a:endParaRPr lang="en-US" sz="1300">
-              <a:solidFill>
-                <a:schemeClr val="tx1"/>
-              </a:solidFill>
-              <a:latin typeface="Arial" panose="020B0604020202020204" pitchFamily="34" charset="0"/>
-              <a:cs typeface="Arial" panose="020B0604020202020204" pitchFamily="34" charset="0"/>
-            </a:endParaRPr>
-          </a:p>
-        </p:txBody>
-      </p:sp>
-      <p:sp>
-        <p:nvSpPr>
-          <p:cNvPr id="15" name="Triangle 55">
-            <a:extLst>
-              <a:ext uri="{FF2B5EF4-FFF2-40B4-BE49-F238E27FC236}">
-                <a16:creationId xmlns:a16="http://schemas.microsoft.com/office/drawing/2014/main" id="{572E674F-2A21-42AA-BE26-E06D49C273EC}"/>
-              </a:ext>
-            </a:extLst>
-          </p:cNvPr>
-          <p:cNvSpPr/>
-          <p:nvPr/>
-        </p:nvSpPr>
-        <p:spPr>
-          <a:xfrm>
-            <a:off x="6529711" y="1754781"/>
-            <a:ext cx="238306" cy="98868"/>
-          </a:xfrm>
-          <a:prstGeom prst="triangle">
-            <a:avLst/>
-          </a:prstGeom>
-          <a:noFill/>
-          <a:ln>
-            <a:solidFill>
-              <a:srgbClr val="FFC000"/>
-            </a:solidFill>
-          </a:ln>
-        </p:spPr>
-        <p:style>
-          <a:lnRef idx="2">
-            <a:schemeClr val="accent1">
-              <a:shade val="50000"/>
-            </a:schemeClr>
-          </a:lnRef>
-          <a:fillRef idx="1">
-            <a:schemeClr val="accent1"/>
-          </a:fillRef>
-          <a:effectRef idx="0">
-            <a:schemeClr val="accent1"/>
-          </a:effectRef>
-          <a:fontRef idx="minor">
-            <a:schemeClr val="lt1"/>
-          </a:fontRef>
-        </p:style>
-        <p:txBody>
-          <a:bodyPr rtlCol="0" anchor="ctr"/>
-          <a:lstStyle/>
-          <a:p>
-            <a:pPr algn="ctr"/>
-            <a:endParaRPr lang="en-US" sz="1300">
-              <a:latin typeface="Arial" panose="020B0604020202020204" pitchFamily="34" charset="0"/>
-              <a:cs typeface="Arial" panose="020B0604020202020204" pitchFamily="34" charset="0"/>
-            </a:endParaRPr>
-          </a:p>
-        </p:txBody>
-      </p:sp>
-      <p:cxnSp>
-        <p:nvCxnSpPr>
-          <p:cNvPr id="5" name="Straight Connector 4">
-            <a:extLst>
-              <a:ext uri="{FF2B5EF4-FFF2-40B4-BE49-F238E27FC236}">
-                <a16:creationId xmlns:a16="http://schemas.microsoft.com/office/drawing/2014/main" id="{AB5C86C6-6C48-41CC-8A7E-AA3FB97C9973}"/>
-              </a:ext>
-            </a:extLst>
-          </p:cNvPr>
-          <p:cNvCxnSpPr>
-            <a:cxnSpLocks/>
-          </p:cNvCxnSpPr>
-          <p:nvPr/>
-        </p:nvCxnSpPr>
-        <p:spPr>
-          <a:xfrm flipV="1">
-            <a:off x="2474548" y="2233635"/>
-            <a:ext cx="8179332" cy="53472"/>
-          </a:xfrm>
-          <a:prstGeom prst="line">
-            <a:avLst/>
-          </a:prstGeom>
-        </p:spPr>
-        <p:style>
-          <a:lnRef idx="1">
-            <a:schemeClr val="accent4"/>
-          </a:lnRef>
-          <a:fillRef idx="0">
-            <a:schemeClr val="accent4"/>
-          </a:fillRef>
-          <a:effectRef idx="0">
-            <a:schemeClr val="accent4"/>
-          </a:effectRef>
-          <a:fontRef idx="minor">
-            <a:schemeClr val="tx1"/>
-          </a:fontRef>
-        </p:style>
-      </p:cxnSp>
-      <p:cxnSp>
-        <p:nvCxnSpPr>
-          <p:cNvPr id="20" name="Straight Connector 19">
-            <a:extLst>
-              <a:ext uri="{FF2B5EF4-FFF2-40B4-BE49-F238E27FC236}">
-                <a16:creationId xmlns:a16="http://schemas.microsoft.com/office/drawing/2014/main" id="{C39938B6-0026-41C0-8A83-31CE2B474A04}"/>
-              </a:ext>
-            </a:extLst>
-          </p:cNvPr>
-          <p:cNvCxnSpPr>
-            <a:cxnSpLocks/>
-          </p:cNvCxnSpPr>
-          <p:nvPr/>
-        </p:nvCxnSpPr>
-        <p:spPr>
-          <a:xfrm flipV="1">
-            <a:off x="6648864" y="1853649"/>
-            <a:ext cx="0" cy="406722"/>
-          </a:xfrm>
-          <a:prstGeom prst="line">
-            <a:avLst/>
-          </a:prstGeom>
-        </p:spPr>
-        <p:style>
-          <a:lnRef idx="1">
-            <a:schemeClr val="accent4"/>
-          </a:lnRef>
-          <a:fillRef idx="0">
-            <a:schemeClr val="accent4"/>
-          </a:fillRef>
-          <a:effectRef idx="0">
-            <a:schemeClr val="accent4"/>
-          </a:effectRef>
-          <a:fontRef idx="minor">
-            <a:schemeClr val="tx1"/>
-          </a:fontRef>
-        </p:style>
-      </p:cxnSp>
-      <p:cxnSp>
-        <p:nvCxnSpPr>
-          <p:cNvPr id="31" name="Straight Connector 30">
-            <a:extLst>
-              <a:ext uri="{FF2B5EF4-FFF2-40B4-BE49-F238E27FC236}">
-                <a16:creationId xmlns:a16="http://schemas.microsoft.com/office/drawing/2014/main" id="{AA2A8D5C-66C2-4281-9070-B687F505609C}"/>
-              </a:ext>
-            </a:extLst>
-          </p:cNvPr>
-          <p:cNvCxnSpPr>
-            <a:cxnSpLocks/>
-          </p:cNvCxnSpPr>
-          <p:nvPr/>
-        </p:nvCxnSpPr>
-        <p:spPr>
-          <a:xfrm flipH="1" flipV="1">
-            <a:off x="6649845" y="2287009"/>
-            <a:ext cx="6684" cy="421372"/>
-          </a:xfrm>
-          <a:prstGeom prst="line">
-            <a:avLst/>
-          </a:prstGeom>
-        </p:spPr>
-        <p:style>
-          <a:lnRef idx="1">
-            <a:schemeClr val="accent4"/>
-          </a:lnRef>
-          <a:fillRef idx="0">
-            <a:schemeClr val="accent4"/>
-          </a:fillRef>
-          <a:effectRef idx="0">
-            <a:schemeClr val="accent4"/>
-          </a:effectRef>
-          <a:fontRef idx="minor">
-            <a:schemeClr val="tx1"/>
-          </a:fontRef>
-        </p:style>
-      </p:cxnSp>
-      <p:cxnSp>
-        <p:nvCxnSpPr>
-          <p:cNvPr id="36" name="Straight Connector 35">
-            <a:extLst>
-              <a:ext uri="{FF2B5EF4-FFF2-40B4-BE49-F238E27FC236}">
-                <a16:creationId xmlns:a16="http://schemas.microsoft.com/office/drawing/2014/main" id="{1099EB8E-8F38-4D6B-95CC-88C2E877C0B6}"/>
-              </a:ext>
-            </a:extLst>
-          </p:cNvPr>
-          <p:cNvCxnSpPr>
-            <a:cxnSpLocks/>
-            <a:stCxn id="13" idx="0"/>
-          </p:cNvCxnSpPr>
-          <p:nvPr/>
-        </p:nvCxnSpPr>
-        <p:spPr>
-          <a:xfrm flipV="1">
-            <a:off x="39176274" y="10104506"/>
-            <a:ext cx="0" cy="381077"/>
-          </a:xfrm>
-          <a:prstGeom prst="line">
-            <a:avLst/>
-          </a:prstGeom>
-        </p:spPr>
-        <p:style>
-          <a:lnRef idx="1">
-            <a:schemeClr val="accent4"/>
-          </a:lnRef>
-          <a:fillRef idx="0">
-            <a:schemeClr val="accent4"/>
-          </a:fillRef>
-          <a:effectRef idx="0">
-            <a:schemeClr val="accent4"/>
-          </a:effectRef>
-          <a:fontRef idx="minor">
-            <a:schemeClr val="tx1"/>
-          </a:fontRef>
-        </p:style>
-      </p:cxnSp>
-      <p:cxnSp>
-        <p:nvCxnSpPr>
-          <p:cNvPr id="39" name="Straight Connector 38">
-            <a:extLst>
-              <a:ext uri="{FF2B5EF4-FFF2-40B4-BE49-F238E27FC236}">
-                <a16:creationId xmlns:a16="http://schemas.microsoft.com/office/drawing/2014/main" id="{21A35BB4-0DBE-4B61-9042-C63F34F6B8C0}"/>
-              </a:ext>
-            </a:extLst>
-          </p:cNvPr>
-          <p:cNvCxnSpPr>
-            <a:cxnSpLocks/>
-          </p:cNvCxnSpPr>
-          <p:nvPr/>
-        </p:nvCxnSpPr>
-        <p:spPr>
-          <a:xfrm>
-            <a:off x="2487916" y="4604313"/>
-            <a:ext cx="8165964" cy="6683"/>
-          </a:xfrm>
-          <a:prstGeom prst="line">
-            <a:avLst/>
-          </a:prstGeom>
-        </p:spPr>
-        <p:style>
-          <a:lnRef idx="1">
-            <a:schemeClr val="accent4"/>
-          </a:lnRef>
-          <a:fillRef idx="0">
-            <a:schemeClr val="accent4"/>
-          </a:fillRef>
-          <a:effectRef idx="0">
-            <a:schemeClr val="accent4"/>
-          </a:effectRef>
-          <a:fontRef idx="minor">
-            <a:schemeClr val="tx1"/>
-          </a:fontRef>
-        </p:style>
-      </p:cxnSp>
-      <p:cxnSp>
-        <p:nvCxnSpPr>
-          <p:cNvPr id="46" name="Straight Connector 45">
-            <a:extLst>
-              <a:ext uri="{FF2B5EF4-FFF2-40B4-BE49-F238E27FC236}">
-                <a16:creationId xmlns:a16="http://schemas.microsoft.com/office/drawing/2014/main" id="{B597C30D-F74F-4F36-94ED-C20FAF5C1C6B}"/>
-              </a:ext>
-            </a:extLst>
-          </p:cNvPr>
-          <p:cNvCxnSpPr>
-            <a:cxnSpLocks/>
-          </p:cNvCxnSpPr>
-          <p:nvPr/>
-        </p:nvCxnSpPr>
-        <p:spPr>
-          <a:xfrm flipH="1" flipV="1">
-            <a:off x="10630273" y="2957307"/>
-            <a:ext cx="23607" cy="1653689"/>
-          </a:xfrm>
-          <a:prstGeom prst="line">
-            <a:avLst/>
-          </a:prstGeom>
-        </p:spPr>
-        <p:style>
-          <a:lnRef idx="1">
-            <a:schemeClr val="accent4"/>
-          </a:lnRef>
-          <a:fillRef idx="0">
-            <a:schemeClr val="accent4"/>
-          </a:fillRef>
-          <a:effectRef idx="0">
-            <a:schemeClr val="accent4"/>
-          </a:effectRef>
-          <a:fontRef idx="minor">
-            <a:schemeClr val="tx1"/>
-          </a:fontRef>
-        </p:style>
-      </p:cxnSp>
-      <p:cxnSp>
-        <p:nvCxnSpPr>
-          <p:cNvPr id="50" name="Straight Arrow Connector 49">
-            <a:extLst>
-              <a:ext uri="{FF2B5EF4-FFF2-40B4-BE49-F238E27FC236}">
-                <a16:creationId xmlns:a16="http://schemas.microsoft.com/office/drawing/2014/main" id="{5018F0A2-C414-4008-8BC1-F14101AC6093}"/>
-              </a:ext>
-            </a:extLst>
-          </p:cNvPr>
-          <p:cNvCxnSpPr>
-            <a:cxnSpLocks/>
-          </p:cNvCxnSpPr>
-          <p:nvPr/>
-        </p:nvCxnSpPr>
-        <p:spPr>
-          <a:xfrm flipV="1">
-            <a:off x="6625519" y="4610996"/>
-            <a:ext cx="0" cy="1389537"/>
-          </a:xfrm>
-          <a:prstGeom prst="straightConnector1">
-            <a:avLst/>
-          </a:prstGeom>
-          <a:ln>
-            <a:solidFill>
-              <a:srgbClr val="FFC000"/>
-            </a:solidFill>
-            <a:prstDash val="solid"/>
-            <a:headEnd type="triangle"/>
-            <a:tailEnd type="none"/>
-          </a:ln>
-        </p:spPr>
-        <p:style>
-          <a:lnRef idx="1">
-            <a:schemeClr val="accent1"/>
-          </a:lnRef>
-          <a:fillRef idx="0">
-            <a:schemeClr val="accent1"/>
-          </a:fillRef>
-          <a:effectRef idx="0">
-            <a:schemeClr val="accent1"/>
-          </a:effectRef>
-          <a:fontRef idx="minor">
-            <a:schemeClr val="tx1"/>
-          </a:fontRef>
-        </p:style>
-      </p:cxnSp>
-      <p:cxnSp>
-        <p:nvCxnSpPr>
-          <p:cNvPr id="54" name="Straight Arrow Connector 53">
-            <a:extLst>
-              <a:ext uri="{FF2B5EF4-FFF2-40B4-BE49-F238E27FC236}">
-                <a16:creationId xmlns:a16="http://schemas.microsoft.com/office/drawing/2014/main" id="{5A316980-8B70-4AD5-B827-E9A025560311}"/>
-              </a:ext>
-            </a:extLst>
-          </p:cNvPr>
-          <p:cNvCxnSpPr>
-            <a:cxnSpLocks/>
-            <a:endCxn id="7" idx="1"/>
-          </p:cNvCxnSpPr>
-          <p:nvPr/>
-        </p:nvCxnSpPr>
-        <p:spPr>
-          <a:xfrm>
-            <a:off x="1220392" y="1525112"/>
-            <a:ext cx="4460029" cy="0"/>
-          </a:xfrm>
-          <a:prstGeom prst="straightConnector1">
-            <a:avLst/>
-          </a:prstGeom>
-          <a:ln>
-            <a:tailEnd type="triangle"/>
-          </a:ln>
-        </p:spPr>
-        <p:style>
-          <a:lnRef idx="1">
-            <a:schemeClr val="accent4"/>
-          </a:lnRef>
-          <a:fillRef idx="0">
-            <a:schemeClr val="accent4"/>
-          </a:fillRef>
-          <a:effectRef idx="0">
-            <a:schemeClr val="accent4"/>
-          </a:effectRef>
-          <a:fontRef idx="minor">
-            <a:schemeClr val="tx1"/>
-          </a:fontRef>
-        </p:style>
-      </p:cxnSp>
-      <p:cxnSp>
-        <p:nvCxnSpPr>
-          <p:cNvPr id="25" name="Straight Connector 24">
-            <a:extLst>
-              <a:ext uri="{FF2B5EF4-FFF2-40B4-BE49-F238E27FC236}">
-                <a16:creationId xmlns:a16="http://schemas.microsoft.com/office/drawing/2014/main" id="{F6F597A6-C578-4C62-A573-DFA8DF038339}"/>
-              </a:ext>
-            </a:extLst>
-          </p:cNvPr>
-          <p:cNvCxnSpPr>
-            <a:cxnSpLocks/>
-          </p:cNvCxnSpPr>
-          <p:nvPr/>
-        </p:nvCxnSpPr>
-        <p:spPr>
-          <a:xfrm flipV="1">
-            <a:off x="2482567" y="2261154"/>
-            <a:ext cx="0" cy="377143"/>
-          </a:xfrm>
-          <a:prstGeom prst="line">
-            <a:avLst/>
-          </a:prstGeom>
-        </p:spPr>
-        <p:style>
-          <a:lnRef idx="1">
-            <a:schemeClr val="accent4"/>
-          </a:lnRef>
-          <a:fillRef idx="0">
-            <a:schemeClr val="accent4"/>
-          </a:fillRef>
-          <a:effectRef idx="0">
-            <a:schemeClr val="accent4"/>
-          </a:effectRef>
-          <a:fontRef idx="minor">
-            <a:schemeClr val="tx1"/>
-          </a:fontRef>
-        </p:style>
-      </p:cxnSp>
-      <p:cxnSp>
-        <p:nvCxnSpPr>
-          <p:cNvPr id="29" name="Straight Connector 28">
-            <a:extLst>
-              <a:ext uri="{FF2B5EF4-FFF2-40B4-BE49-F238E27FC236}">
-                <a16:creationId xmlns:a16="http://schemas.microsoft.com/office/drawing/2014/main" id="{88793CDA-DAAA-4BAC-BF86-992D6E72226B}"/>
-              </a:ext>
-            </a:extLst>
-          </p:cNvPr>
-          <p:cNvCxnSpPr>
-            <a:cxnSpLocks/>
-          </p:cNvCxnSpPr>
-          <p:nvPr/>
-        </p:nvCxnSpPr>
-        <p:spPr>
-          <a:xfrm flipH="1" flipV="1">
-            <a:off x="10638107" y="2240319"/>
-            <a:ext cx="6684" cy="421372"/>
-          </a:xfrm>
-          <a:prstGeom prst="line">
-            <a:avLst/>
-          </a:prstGeom>
-        </p:spPr>
-        <p:style>
-          <a:lnRef idx="1">
-            <a:schemeClr val="accent4"/>
-          </a:lnRef>
-          <a:fillRef idx="0">
-            <a:schemeClr val="accent4"/>
-          </a:fillRef>
-          <a:effectRef idx="0">
-            <a:schemeClr val="accent4"/>
-          </a:effectRef>
-          <a:fontRef idx="minor">
-            <a:schemeClr val="tx1"/>
-          </a:fontRef>
-        </p:style>
-      </p:cxnSp>
-      <p:cxnSp>
-        <p:nvCxnSpPr>
-          <p:cNvPr id="30" name="Straight Connector 29">
-            <a:extLst>
-              <a:ext uri="{FF2B5EF4-FFF2-40B4-BE49-F238E27FC236}">
-                <a16:creationId xmlns:a16="http://schemas.microsoft.com/office/drawing/2014/main" id="{4D101FE4-6192-4827-B853-BDBFDB44B5BC}"/>
-              </a:ext>
-            </a:extLst>
-          </p:cNvPr>
-          <p:cNvCxnSpPr>
-            <a:cxnSpLocks/>
-          </p:cNvCxnSpPr>
-          <p:nvPr/>
-        </p:nvCxnSpPr>
-        <p:spPr>
-          <a:xfrm flipV="1">
-            <a:off x="2482567" y="2997413"/>
-            <a:ext cx="0" cy="1613584"/>
-          </a:xfrm>
-          <a:prstGeom prst="line">
-            <a:avLst/>
-          </a:prstGeom>
-        </p:spPr>
-        <p:style>
-          <a:lnRef idx="1">
-            <a:schemeClr val="accent4"/>
-          </a:lnRef>
-          <a:fillRef idx="0">
-            <a:schemeClr val="accent4"/>
-          </a:fillRef>
-          <a:effectRef idx="0">
-            <a:schemeClr val="accent4"/>
-          </a:effectRef>
-          <a:fontRef idx="minor">
-            <a:schemeClr val="tx1"/>
-          </a:fontRef>
-        </p:style>
-      </p:cxnSp>
-      <p:cxnSp>
-        <p:nvCxnSpPr>
-          <p:cNvPr id="27" name="Straight Connector 26">
-            <a:extLst>
-              <a:ext uri="{FF2B5EF4-FFF2-40B4-BE49-F238E27FC236}">
-                <a16:creationId xmlns:a16="http://schemas.microsoft.com/office/drawing/2014/main" id="{0846EC11-0D99-468D-ADE0-0635FF6436B5}"/>
-              </a:ext>
-            </a:extLst>
-          </p:cNvPr>
-          <p:cNvCxnSpPr>
-            <a:cxnSpLocks/>
-            <a:endCxn id="11" idx="2"/>
-          </p:cNvCxnSpPr>
-          <p:nvPr/>
-        </p:nvCxnSpPr>
-        <p:spPr>
-          <a:xfrm flipH="1" flipV="1">
-            <a:off x="6625518" y="3032847"/>
-            <a:ext cx="2" cy="1648866"/>
-          </a:xfrm>
-          <a:prstGeom prst="line">
-            <a:avLst/>
-          </a:prstGeom>
-        </p:spPr>
-        <p:style>
-          <a:lnRef idx="1">
-            <a:schemeClr val="accent4"/>
-          </a:lnRef>
-          <a:fillRef idx="0">
-            <a:schemeClr val="accent4"/>
-          </a:fillRef>
-          <a:effectRef idx="0">
-            <a:schemeClr val="accent4"/>
-          </a:effectRef>
-          <a:fontRef idx="minor">
-            <a:schemeClr val="tx1"/>
-          </a:fontRef>
-        </p:style>
-      </p:cxnSp>
+              <a:prstDash val="solid"/>
+              <a:headEnd type="triangle"/>
+              <a:tailEnd type="none"/>
+            </a:ln>
+          </p:spPr>
+          <p:style>
+            <a:lnRef idx="1">
+              <a:schemeClr val="accent1"/>
+            </a:lnRef>
+            <a:fillRef idx="0">
+              <a:schemeClr val="accent1"/>
+            </a:fillRef>
+            <a:effectRef idx="0">
+              <a:schemeClr val="accent1"/>
+            </a:effectRef>
+            <a:fontRef idx="minor">
+              <a:schemeClr val="tx1"/>
+            </a:fontRef>
+          </p:style>
+        </p:cxnSp>
+        <p:cxnSp>
+          <p:nvCxnSpPr>
+            <p:cNvPr id="54" name="Straight Arrow Connector 53">
+              <a:extLst>
+                <a:ext uri="{FF2B5EF4-FFF2-40B4-BE49-F238E27FC236}">
+                  <a16:creationId xmlns:a16="http://schemas.microsoft.com/office/drawing/2014/main" id="{5A316980-8B70-4AD5-B827-E9A025560311}"/>
+                </a:ext>
+              </a:extLst>
+            </p:cNvPr>
+            <p:cNvCxnSpPr>
+              <a:cxnSpLocks/>
+              <a:endCxn id="7" idx="1"/>
+            </p:cNvCxnSpPr>
+            <p:nvPr/>
+          </p:nvCxnSpPr>
+          <p:spPr>
+            <a:xfrm>
+              <a:off x="1220392" y="1525112"/>
+              <a:ext cx="4460029" cy="0"/>
+            </a:xfrm>
+            <a:prstGeom prst="straightConnector1">
+              <a:avLst/>
+            </a:prstGeom>
+            <a:ln>
+              <a:tailEnd type="triangle"/>
+            </a:ln>
+          </p:spPr>
+          <p:style>
+            <a:lnRef idx="1">
+              <a:schemeClr val="accent4"/>
+            </a:lnRef>
+            <a:fillRef idx="0">
+              <a:schemeClr val="accent4"/>
+            </a:fillRef>
+            <a:effectRef idx="0">
+              <a:schemeClr val="accent4"/>
+            </a:effectRef>
+            <a:fontRef idx="minor">
+              <a:schemeClr val="tx1"/>
+            </a:fontRef>
+          </p:style>
+        </p:cxnSp>
+        <p:cxnSp>
+          <p:nvCxnSpPr>
+            <p:cNvPr id="25" name="Straight Connector 24">
+              <a:extLst>
+                <a:ext uri="{FF2B5EF4-FFF2-40B4-BE49-F238E27FC236}">
+                  <a16:creationId xmlns:a16="http://schemas.microsoft.com/office/drawing/2014/main" id="{F6F597A6-C578-4C62-A573-DFA8DF038339}"/>
+                </a:ext>
+              </a:extLst>
+            </p:cNvPr>
+            <p:cNvCxnSpPr>
+              <a:cxnSpLocks/>
+            </p:cNvCxnSpPr>
+            <p:nvPr/>
+          </p:nvCxnSpPr>
+          <p:spPr>
+            <a:xfrm flipV="1">
+              <a:off x="2482567" y="2261154"/>
+              <a:ext cx="0" cy="377143"/>
+            </a:xfrm>
+            <a:prstGeom prst="line">
+              <a:avLst/>
+            </a:prstGeom>
+          </p:spPr>
+          <p:style>
+            <a:lnRef idx="1">
+              <a:schemeClr val="accent4"/>
+            </a:lnRef>
+            <a:fillRef idx="0">
+              <a:schemeClr val="accent4"/>
+            </a:fillRef>
+            <a:effectRef idx="0">
+              <a:schemeClr val="accent4"/>
+            </a:effectRef>
+            <a:fontRef idx="minor">
+              <a:schemeClr val="tx1"/>
+            </a:fontRef>
+          </p:style>
+        </p:cxnSp>
+        <p:cxnSp>
+          <p:nvCxnSpPr>
+            <p:cNvPr id="29" name="Straight Connector 28">
+              <a:extLst>
+                <a:ext uri="{FF2B5EF4-FFF2-40B4-BE49-F238E27FC236}">
+                  <a16:creationId xmlns:a16="http://schemas.microsoft.com/office/drawing/2014/main" id="{88793CDA-DAAA-4BAC-BF86-992D6E72226B}"/>
+                </a:ext>
+              </a:extLst>
+            </p:cNvPr>
+            <p:cNvCxnSpPr>
+              <a:cxnSpLocks/>
+            </p:cNvCxnSpPr>
+            <p:nvPr/>
+          </p:nvCxnSpPr>
+          <p:spPr>
+            <a:xfrm flipH="1" flipV="1">
+              <a:off x="10638107" y="2240319"/>
+              <a:ext cx="6684" cy="421372"/>
+            </a:xfrm>
+            <a:prstGeom prst="line">
+              <a:avLst/>
+            </a:prstGeom>
+          </p:spPr>
+          <p:style>
+            <a:lnRef idx="1">
+              <a:schemeClr val="accent4"/>
+            </a:lnRef>
+            <a:fillRef idx="0">
+              <a:schemeClr val="accent4"/>
+            </a:fillRef>
+            <a:effectRef idx="0">
+              <a:schemeClr val="accent4"/>
+            </a:effectRef>
+            <a:fontRef idx="minor">
+              <a:schemeClr val="tx1"/>
+            </a:fontRef>
+          </p:style>
+        </p:cxnSp>
+        <p:cxnSp>
+          <p:nvCxnSpPr>
+            <p:cNvPr id="30" name="Straight Connector 29">
+              <a:extLst>
+                <a:ext uri="{FF2B5EF4-FFF2-40B4-BE49-F238E27FC236}">
+                  <a16:creationId xmlns:a16="http://schemas.microsoft.com/office/drawing/2014/main" id="{4D101FE4-6192-4827-B853-BDBFDB44B5BC}"/>
+                </a:ext>
+              </a:extLst>
+            </p:cNvPr>
+            <p:cNvCxnSpPr>
+              <a:cxnSpLocks/>
+            </p:cNvCxnSpPr>
+            <p:nvPr/>
+          </p:nvCxnSpPr>
+          <p:spPr>
+            <a:xfrm flipV="1">
+              <a:off x="2482567" y="2997413"/>
+              <a:ext cx="0" cy="1613584"/>
+            </a:xfrm>
+            <a:prstGeom prst="line">
+              <a:avLst/>
+            </a:prstGeom>
+          </p:spPr>
+          <p:style>
+            <a:lnRef idx="1">
+              <a:schemeClr val="accent4"/>
+            </a:lnRef>
+            <a:fillRef idx="0">
+              <a:schemeClr val="accent4"/>
+            </a:fillRef>
+            <a:effectRef idx="0">
+              <a:schemeClr val="accent4"/>
+            </a:effectRef>
+            <a:fontRef idx="minor">
+              <a:schemeClr val="tx1"/>
+            </a:fontRef>
+          </p:style>
+        </p:cxnSp>
+        <p:cxnSp>
+          <p:nvCxnSpPr>
+            <p:cNvPr id="27" name="Straight Connector 26">
+              <a:extLst>
+                <a:ext uri="{FF2B5EF4-FFF2-40B4-BE49-F238E27FC236}">
+                  <a16:creationId xmlns:a16="http://schemas.microsoft.com/office/drawing/2014/main" id="{0846EC11-0D99-468D-ADE0-0635FF6436B5}"/>
+                </a:ext>
+              </a:extLst>
+            </p:cNvPr>
+            <p:cNvCxnSpPr>
+              <a:cxnSpLocks/>
+              <a:endCxn id="11" idx="2"/>
+            </p:cNvCxnSpPr>
+            <p:nvPr/>
+          </p:nvCxnSpPr>
+          <p:spPr>
+            <a:xfrm flipH="1" flipV="1">
+              <a:off x="6625518" y="3032847"/>
+              <a:ext cx="2" cy="1648866"/>
+            </a:xfrm>
+            <a:prstGeom prst="line">
+              <a:avLst/>
+            </a:prstGeom>
+          </p:spPr>
+          <p:style>
+            <a:lnRef idx="1">
+              <a:schemeClr val="accent4"/>
+            </a:lnRef>
+            <a:fillRef idx="0">
+              <a:schemeClr val="accent4"/>
+            </a:fillRef>
+            <a:effectRef idx="0">
+              <a:schemeClr val="accent4"/>
+            </a:effectRef>
+            <a:fontRef idx="minor">
+              <a:schemeClr val="tx1"/>
+            </a:fontRef>
+          </p:style>
+        </p:cxnSp>
+      </p:grpSp>
     </p:spTree>
     <p:extLst>
       <p:ext uri="{BB962C8B-B14F-4D97-AF65-F5344CB8AC3E}">

</xml_diff>